<commit_message>
I don't know why intelliJ doesn't detect pptx changes
</commit_message>
<xml_diff>
--- a/docs/diagrams/UiComponentClassDiagram.pptx
+++ b/docs/diagrams/UiComponentClassDiagram.pptx
@@ -5557,17 +5557,7 @@
                   </a:schemeClr>
                 </a:solidFill>
               </a:rPr>
-              <a:t>Search</a:t>
-            </a:r>
-            <a:r>
-              <a:rPr lang="en-US" sz="1050" b="1" dirty="0" err="1" smtClean="0">
-                <a:solidFill>
-                  <a:schemeClr val="accent3">
-                    <a:lumMod val="75000"/>
-                  </a:schemeClr>
-                </a:solidFill>
-              </a:rPr>
-              <a:t>Box</a:t>
+              <a:t>SearchBox</a:t>
             </a:r>
             <a:endParaRPr lang="en-SG" sz="1050" b="1" dirty="0">
               <a:solidFill>

</xml_diff>

<commit_message>
Update DevGuide and UiComponentClassDiagram to fit ProfilePanel and SearchBox
</commit_message>
<xml_diff>
--- a/docs/diagrams/UiComponentClassDiagram.pptx
+++ b/docs/diagrams/UiComponentClassDiagram.pptx
@@ -208,7 +208,7 @@
           <a:p>
             <a:fld id="{F5CC4B3F-88C1-4FFA-B1B6-F41C21DC6924}" type="datetimeFigureOut">
               <a:rPr lang="en-US" smtClean="0"/>
-              <a:t>1/7/2017</a:t>
+              <a:t>10/18/2017</a:t>
             </a:fld>
             <a:endParaRPr lang="en-US"/>
           </a:p>
@@ -654,7 +654,7 @@
           <a:p>
             <a:fld id="{78C97017-6FC3-485B-9764-EAC9E56C1D49}" type="datetimeFigureOut">
               <a:rPr lang="en-US" smtClean="0"/>
-              <a:t>1/7/2017</a:t>
+              <a:t>10/18/2017</a:t>
             </a:fld>
             <a:endParaRPr lang="en-US"/>
           </a:p>
@@ -822,7 +822,7 @@
           <a:p>
             <a:fld id="{78C97017-6FC3-485B-9764-EAC9E56C1D49}" type="datetimeFigureOut">
               <a:rPr lang="en-US" smtClean="0"/>
-              <a:t>1/7/2017</a:t>
+              <a:t>10/18/2017</a:t>
             </a:fld>
             <a:endParaRPr lang="en-US"/>
           </a:p>
@@ -1000,7 +1000,7 @@
           <a:p>
             <a:fld id="{78C97017-6FC3-485B-9764-EAC9E56C1D49}" type="datetimeFigureOut">
               <a:rPr lang="en-US" smtClean="0"/>
-              <a:t>1/7/2017</a:t>
+              <a:t>10/18/2017</a:t>
             </a:fld>
             <a:endParaRPr lang="en-US"/>
           </a:p>
@@ -1168,7 +1168,7 @@
           <a:p>
             <a:fld id="{78C97017-6FC3-485B-9764-EAC9E56C1D49}" type="datetimeFigureOut">
               <a:rPr lang="en-US" smtClean="0"/>
-              <a:t>1/7/2017</a:t>
+              <a:t>10/18/2017</a:t>
             </a:fld>
             <a:endParaRPr lang="en-US"/>
           </a:p>
@@ -1413,7 +1413,7 @@
           <a:p>
             <a:fld id="{78C97017-6FC3-485B-9764-EAC9E56C1D49}" type="datetimeFigureOut">
               <a:rPr lang="en-US" smtClean="0"/>
-              <a:t>1/7/2017</a:t>
+              <a:t>10/18/2017</a:t>
             </a:fld>
             <a:endParaRPr lang="en-US"/>
           </a:p>
@@ -1698,7 +1698,7 @@
           <a:p>
             <a:fld id="{78C97017-6FC3-485B-9764-EAC9E56C1D49}" type="datetimeFigureOut">
               <a:rPr lang="en-US" smtClean="0"/>
-              <a:t>1/7/2017</a:t>
+              <a:t>10/18/2017</a:t>
             </a:fld>
             <a:endParaRPr lang="en-US"/>
           </a:p>
@@ -2117,7 +2117,7 @@
           <a:p>
             <a:fld id="{78C97017-6FC3-485B-9764-EAC9E56C1D49}" type="datetimeFigureOut">
               <a:rPr lang="en-US" smtClean="0"/>
-              <a:t>1/7/2017</a:t>
+              <a:t>10/18/2017</a:t>
             </a:fld>
             <a:endParaRPr lang="en-US"/>
           </a:p>
@@ -2234,7 +2234,7 @@
           <a:p>
             <a:fld id="{78C97017-6FC3-485B-9764-EAC9E56C1D49}" type="datetimeFigureOut">
               <a:rPr lang="en-US" smtClean="0"/>
-              <a:t>1/7/2017</a:t>
+              <a:t>10/18/2017</a:t>
             </a:fld>
             <a:endParaRPr lang="en-US"/>
           </a:p>
@@ -2329,7 +2329,7 @@
           <a:p>
             <a:fld id="{78C97017-6FC3-485B-9764-EAC9E56C1D49}" type="datetimeFigureOut">
               <a:rPr lang="en-US" smtClean="0"/>
-              <a:t>1/7/2017</a:t>
+              <a:t>10/18/2017</a:t>
             </a:fld>
             <a:endParaRPr lang="en-US"/>
           </a:p>
@@ -2604,7 +2604,7 @@
           <a:p>
             <a:fld id="{78C97017-6FC3-485B-9764-EAC9E56C1D49}" type="datetimeFigureOut">
               <a:rPr lang="en-US" smtClean="0"/>
-              <a:t>1/7/2017</a:t>
+              <a:t>10/18/2017</a:t>
             </a:fld>
             <a:endParaRPr lang="en-US"/>
           </a:p>
@@ -2856,7 +2856,7 @@
           <a:p>
             <a:fld id="{78C97017-6FC3-485B-9764-EAC9E56C1D49}" type="datetimeFigureOut">
               <a:rPr lang="en-US" smtClean="0"/>
-              <a:t>1/7/2017</a:t>
+              <a:t>10/18/2017</a:t>
             </a:fld>
             <a:endParaRPr lang="en-US"/>
           </a:p>
@@ -3067,7 +3067,7 @@
           <a:p>
             <a:fld id="{78C97017-6FC3-485B-9764-EAC9E56C1D49}" type="datetimeFigureOut">
               <a:rPr lang="en-US" smtClean="0"/>
-              <a:t>1/7/2017</a:t>
+              <a:t>10/18/2017</a:t>
             </a:fld>
             <a:endParaRPr lang="en-US"/>
           </a:p>
@@ -3572,7 +3572,7 @@
         </p:nvSpPr>
         <p:spPr>
           <a:xfrm>
-            <a:off x="2592528" y="2971800"/>
+            <a:off x="2584109" y="3213297"/>
             <a:ext cx="1093635" cy="236841"/>
           </a:xfrm>
           <a:prstGeom prst="rect">
@@ -3605,14 +3605,24 @@
           <a:p>
             <a:pPr algn="ctr"/>
             <a:r>
-              <a:rPr lang="en-US" sz="1050" b="1" dirty="0" err="1">
+              <a:rPr lang="en-US" sz="1050" b="1" dirty="0" err="1" smtClean="0">
                 <a:solidFill>
                   <a:schemeClr val="accent3">
                     <a:lumMod val="75000"/>
                   </a:schemeClr>
                 </a:solidFill>
               </a:rPr>
-              <a:t>CommandBox</a:t>
+              <a:t>Search</a:t>
+            </a:r>
+            <a:r>
+              <a:rPr lang="en-US" sz="1050" b="1" dirty="0" err="1" smtClean="0">
+                <a:solidFill>
+                  <a:schemeClr val="accent3">
+                    <a:lumMod val="75000"/>
+                  </a:schemeClr>
+                </a:solidFill>
+              </a:rPr>
+              <a:t>Box</a:t>
             </a:r>
             <a:endParaRPr lang="en-SG" sz="1050" b="1" dirty="0">
               <a:solidFill>
@@ -3885,7 +3895,7 @@
         </p:nvSpPr>
         <p:spPr>
           <a:xfrm>
-            <a:off x="2592528" y="3649359"/>
+            <a:off x="2588896" y="3899121"/>
             <a:ext cx="1093635" cy="236841"/>
           </a:xfrm>
           <a:prstGeom prst="rect">
@@ -3918,14 +3928,24 @@
           <a:p>
             <a:pPr algn="ctr"/>
             <a:r>
-              <a:rPr lang="en-US" sz="1050" b="1" dirty="0" err="1">
+              <a:rPr lang="en-US" sz="1050" b="1" dirty="0" err="1" smtClean="0">
                 <a:solidFill>
                   <a:schemeClr val="accent3">
                     <a:lumMod val="75000"/>
                   </a:schemeClr>
                 </a:solidFill>
               </a:rPr>
-              <a:t>BrowserPanel</a:t>
+              <a:t>Profile</a:t>
+            </a:r>
+            <a:r>
+              <a:rPr lang="en-US" sz="1050" b="1" dirty="0" err="1" smtClean="0">
+                <a:solidFill>
+                  <a:schemeClr val="accent3">
+                    <a:lumMod val="75000"/>
+                  </a:schemeClr>
+                </a:solidFill>
+              </a:rPr>
+              <a:t>Panel</a:t>
             </a:r>
             <a:endParaRPr lang="en-SG" sz="1050" b="1" dirty="0">
               <a:solidFill>
@@ -3945,7 +3965,7 @@
         </p:nvSpPr>
         <p:spPr>
           <a:xfrm>
-            <a:off x="2592527" y="4563759"/>
+            <a:off x="2589339" y="4701170"/>
             <a:ext cx="1093635" cy="236841"/>
           </a:xfrm>
           <a:prstGeom prst="rect">
@@ -4005,7 +4025,7 @@
         </p:nvSpPr>
         <p:spPr>
           <a:xfrm>
-            <a:off x="2592526" y="3991960"/>
+            <a:off x="2588894" y="4241722"/>
             <a:ext cx="1093635" cy="236841"/>
           </a:xfrm>
           <a:prstGeom prst="rect">
@@ -4065,7 +4085,7 @@
         </p:nvSpPr>
         <p:spPr>
           <a:xfrm>
-            <a:off x="3839323" y="4228801"/>
+            <a:off x="3835894" y="4449320"/>
             <a:ext cx="1040906" cy="236841"/>
           </a:xfrm>
           <a:prstGeom prst="rect">
@@ -4125,7 +4145,7 @@
         </p:nvSpPr>
         <p:spPr>
           <a:xfrm>
-            <a:off x="2592528" y="4966000"/>
+            <a:off x="2595945" y="5015301"/>
             <a:ext cx="1093635" cy="236841"/>
           </a:xfrm>
           <a:prstGeom prst="rect">
@@ -4228,16 +4248,13 @@
       <p:cxnSp>
         <p:nvCxnSpPr>
           <p:cNvPr id="40" name="Elbow Connector 63"/>
-          <p:cNvCxnSpPr>
-            <a:stCxn id="39" idx="2"/>
-            <a:endCxn id="3" idx="1"/>
-          </p:cNvCxnSpPr>
+          <p:cNvCxnSpPr/>
           <p:nvPr/>
         </p:nvCxnSpPr>
         <p:spPr>
           <a:xfrm rot="16200000" flipH="1">
-            <a:off x="2393229" y="2890922"/>
-            <a:ext cx="222196" cy="176402"/>
+            <a:off x="2302118" y="3068377"/>
+            <a:ext cx="390218" cy="166245"/>
           </a:xfrm>
           <a:prstGeom prst="bentConnector2">
             <a:avLst/>
@@ -4274,7 +4291,7 @@
         </p:nvSpPr>
         <p:spPr>
           <a:xfrm>
-            <a:off x="2590799" y="3304308"/>
+            <a:off x="2587167" y="3554070"/>
             <a:ext cx="1095361" cy="236841"/>
           </a:xfrm>
           <a:prstGeom prst="rect">
@@ -4330,15 +4347,14 @@
         <p:nvCxnSpPr>
           <p:cNvPr id="44" name="Elbow Connector 63"/>
           <p:cNvCxnSpPr>
-            <a:stCxn id="39" idx="2"/>
             <a:endCxn id="34" idx="1"/>
           </p:cNvCxnSpPr>
           <p:nvPr/>
         </p:nvCxnSpPr>
         <p:spPr>
           <a:xfrm rot="16200000" flipH="1">
-            <a:off x="2054450" y="3229701"/>
-            <a:ext cx="899755" cy="176402"/>
+            <a:off x="1942272" y="3370918"/>
+            <a:ext cx="1120274" cy="172973"/>
           </a:xfrm>
           <a:prstGeom prst="bentConnector2">
             <a:avLst/>
@@ -4371,15 +4387,14 @@
         <p:nvCxnSpPr>
           <p:cNvPr id="47" name="Elbow Connector 63"/>
           <p:cNvCxnSpPr>
-            <a:stCxn id="39" idx="2"/>
             <a:endCxn id="36" idx="1"/>
           </p:cNvCxnSpPr>
           <p:nvPr/>
         </p:nvCxnSpPr>
         <p:spPr>
           <a:xfrm rot="16200000" flipH="1">
-            <a:off x="1883148" y="3401003"/>
-            <a:ext cx="1242356" cy="176400"/>
+            <a:off x="1795561" y="3566810"/>
+            <a:ext cx="1410266" cy="176400"/>
           </a:xfrm>
           <a:prstGeom prst="bentConnector2">
             <a:avLst/>
@@ -4411,15 +4426,12 @@
       <p:cxnSp>
         <p:nvCxnSpPr>
           <p:cNvPr id="50" name="Elbow Connector 63"/>
-          <p:cNvCxnSpPr>
-            <a:stCxn id="39" idx="2"/>
-            <a:endCxn id="35" idx="1"/>
-          </p:cNvCxnSpPr>
+          <p:cNvCxnSpPr/>
           <p:nvPr/>
         </p:nvCxnSpPr>
         <p:spPr>
           <a:xfrm rot="16200000" flipH="1">
-            <a:off x="1597249" y="3686901"/>
+            <a:off x="1589717" y="3828716"/>
             <a:ext cx="1814155" cy="176401"/>
           </a:xfrm>
           <a:prstGeom prst="bentConnector2">
@@ -4459,8 +4471,8 @@
         </p:nvCxnSpPr>
         <p:spPr>
           <a:xfrm rot="16200000" flipH="1">
-            <a:off x="1184119" y="3676012"/>
-            <a:ext cx="2396440" cy="420377"/>
+            <a:off x="1155971" y="3693748"/>
+            <a:ext cx="2445740" cy="434208"/>
           </a:xfrm>
           <a:prstGeom prst="bentConnector2">
             <a:avLst/>
@@ -4579,8 +4591,8 @@
         </p:nvCxnSpPr>
         <p:spPr>
           <a:xfrm flipV="1">
-            <a:off x="3686160" y="2286000"/>
-            <a:ext cx="1843809" cy="1136729"/>
+            <a:off x="3682528" y="2286000"/>
+            <a:ext cx="1847441" cy="1386491"/>
           </a:xfrm>
           <a:prstGeom prst="bentConnector2">
             <a:avLst/>
@@ -4620,8 +4632,8 @@
         </p:nvCxnSpPr>
         <p:spPr>
           <a:xfrm rot="5400000">
-            <a:off x="4174488" y="2991741"/>
-            <a:ext cx="2061222" cy="649740"/>
+            <a:off x="4062515" y="3100286"/>
+            <a:ext cx="2281741" cy="653169"/>
           </a:xfrm>
           <a:prstGeom prst="bentConnector2">
             <a:avLst/>
@@ -4661,8 +4673,8 @@
         </p:nvCxnSpPr>
         <p:spPr>
           <a:xfrm rot="5400000">
-            <a:off x="3867176" y="2104987"/>
-            <a:ext cx="1481780" cy="1843806"/>
+            <a:off x="3740479" y="2228052"/>
+            <a:ext cx="1731542" cy="1847438"/>
           </a:xfrm>
           <a:prstGeom prst="bentConnector2">
             <a:avLst/>
@@ -4743,8 +4755,8 @@
         </p:nvCxnSpPr>
         <p:spPr>
           <a:xfrm rot="5400000">
-            <a:off x="3409976" y="2562187"/>
-            <a:ext cx="2396180" cy="1843807"/>
+            <a:off x="3339677" y="2629298"/>
+            <a:ext cx="2533591" cy="1846995"/>
           </a:xfrm>
           <a:prstGeom prst="bentConnector2">
             <a:avLst/>
@@ -4784,8 +4796,8 @@
         </p:nvCxnSpPr>
         <p:spPr>
           <a:xfrm rot="5400000">
-            <a:off x="3208856" y="2763307"/>
-            <a:ext cx="2798421" cy="1843806"/>
+            <a:off x="3185914" y="2789667"/>
+            <a:ext cx="2847722" cy="1840389"/>
           </a:xfrm>
           <a:prstGeom prst="bentConnector2">
             <a:avLst/>
@@ -5078,15 +5090,12 @@
       <p:cxnSp>
         <p:nvCxnSpPr>
           <p:cNvPr id="131" name="Elbow Connector 130"/>
-          <p:cNvCxnSpPr>
-            <a:stCxn id="39" idx="2"/>
-            <a:endCxn id="43" idx="1"/>
-          </p:cNvCxnSpPr>
+          <p:cNvCxnSpPr/>
           <p:nvPr/>
         </p:nvCxnSpPr>
         <p:spPr>
           <a:xfrm rot="16200000" flipH="1">
-            <a:off x="2226110" y="3058040"/>
+            <a:off x="2222478" y="3292911"/>
             <a:ext cx="554704" cy="174673"/>
           </a:xfrm>
           <a:prstGeom prst="bentConnector2">
@@ -5127,8 +5136,8 @@
         </p:nvCxnSpPr>
         <p:spPr>
           <a:xfrm rot="5400000">
-            <a:off x="4205956" y="1766207"/>
-            <a:ext cx="804221" cy="1843806"/>
+            <a:off x="4080998" y="1882747"/>
+            <a:ext cx="1045718" cy="1852225"/>
           </a:xfrm>
           <a:prstGeom prst="bentConnector2">
             <a:avLst/>
@@ -5168,8 +5177,8 @@
         </p:nvCxnSpPr>
         <p:spPr>
           <a:xfrm rot="16200000" flipH="1">
-            <a:off x="3430123" y="3938021"/>
-            <a:ext cx="118421" cy="699979"/>
+            <a:off x="3441214" y="4173061"/>
+            <a:ext cx="89178" cy="700182"/>
           </a:xfrm>
           <a:prstGeom prst="bentConnector2">
             <a:avLst/>
@@ -5209,8 +5218,8 @@
         </p:nvCxnSpPr>
         <p:spPr>
           <a:xfrm rot="5400000">
-            <a:off x="3695875" y="2276286"/>
-            <a:ext cx="1824381" cy="1843808"/>
+            <a:off x="3569178" y="2399351"/>
+            <a:ext cx="2074143" cy="1847440"/>
           </a:xfrm>
           <a:prstGeom prst="bentConnector2">
             <a:avLst/>
@@ -5241,67 +5250,14 @@
       </p:cxnSp>
       <p:sp>
         <p:nvSpPr>
-          <p:cNvPr id="143" name="Rectangle 142"/>
-          <p:cNvSpPr/>
-          <p:nvPr/>
-        </p:nvSpPr>
-        <p:spPr>
-          <a:xfrm>
-            <a:off x="5435896" y="2743200"/>
-            <a:ext cx="229325" cy="166560"/>
-          </a:xfrm>
-          <a:prstGeom prst="rect">
-            <a:avLst/>
-          </a:prstGeom>
-          <a:solidFill>
-            <a:schemeClr val="accent3">
-              <a:lumMod val="20000"/>
-              <a:lumOff val="80000"/>
-              <a:alpha val="80000"/>
-            </a:schemeClr>
-          </a:solidFill>
-          <a:ln>
-            <a:noFill/>
-          </a:ln>
-          <a:effectLst>
-            <a:softEdge rad="31750"/>
-          </a:effectLst>
-        </p:spPr>
-        <p:style>
-          <a:lnRef idx="2">
-            <a:schemeClr val="accent1">
-              <a:shade val="50000"/>
-            </a:schemeClr>
-          </a:lnRef>
-          <a:fillRef idx="1">
-            <a:schemeClr val="accent1"/>
-          </a:fillRef>
-          <a:effectRef idx="0">
-            <a:schemeClr val="accent1"/>
-          </a:effectRef>
-          <a:fontRef idx="minor">
-            <a:schemeClr val="lt1"/>
-          </a:fontRef>
-        </p:style>
-        <p:txBody>
-          <a:bodyPr rtlCol="0" anchor="ctr"/>
-          <a:lstStyle/>
-          <a:p>
-            <a:pPr algn="ctr"/>
-            <a:endParaRPr lang="en-SG"/>
-          </a:p>
-        </p:txBody>
-      </p:sp>
-      <p:sp>
-        <p:nvSpPr>
           <p:cNvPr id="116" name="Freeform 115"/>
           <p:cNvSpPr/>
           <p:nvPr/>
         </p:nvSpPr>
         <p:spPr>
           <a:xfrm>
-            <a:off x="3687515" y="2828802"/>
-            <a:ext cx="3048000" cy="203200"/>
+            <a:off x="3687516" y="3191540"/>
+            <a:ext cx="3065154" cy="160295"/>
           </a:xfrm>
           <a:custGeom>
             <a:avLst/>
@@ -5376,67 +5332,14 @@
       </p:sp>
       <p:sp>
         <p:nvSpPr>
-          <p:cNvPr id="144" name="Rectangle 143"/>
-          <p:cNvSpPr/>
-          <p:nvPr/>
-        </p:nvSpPr>
-        <p:spPr>
-          <a:xfrm>
-            <a:off x="5431573" y="4488138"/>
-            <a:ext cx="229325" cy="160062"/>
-          </a:xfrm>
-          <a:prstGeom prst="rect">
-            <a:avLst/>
-          </a:prstGeom>
-          <a:solidFill>
-            <a:schemeClr val="accent3">
-              <a:lumMod val="20000"/>
-              <a:lumOff val="80000"/>
-              <a:alpha val="80000"/>
-            </a:schemeClr>
-          </a:solidFill>
-          <a:ln>
-            <a:noFill/>
-          </a:ln>
-          <a:effectLst>
-            <a:softEdge rad="31750"/>
-          </a:effectLst>
-        </p:spPr>
-        <p:style>
-          <a:lnRef idx="2">
-            <a:schemeClr val="accent1">
-              <a:shade val="50000"/>
-            </a:schemeClr>
-          </a:lnRef>
-          <a:fillRef idx="1">
-            <a:schemeClr val="accent1"/>
-          </a:fillRef>
-          <a:effectRef idx="0">
-            <a:schemeClr val="accent1"/>
-          </a:effectRef>
-          <a:fontRef idx="minor">
-            <a:schemeClr val="lt1"/>
-          </a:fontRef>
-        </p:style>
-        <p:txBody>
-          <a:bodyPr rtlCol="0" anchor="ctr"/>
-          <a:lstStyle/>
-          <a:p>
-            <a:pPr algn="ctr"/>
-            <a:endParaRPr lang="en-SG"/>
-          </a:p>
-        </p:txBody>
-      </p:sp>
-      <p:sp>
-        <p:nvSpPr>
           <p:cNvPr id="118" name="Freeform 117"/>
           <p:cNvSpPr/>
           <p:nvPr/>
         </p:nvSpPr>
         <p:spPr>
           <a:xfrm flipV="1">
-            <a:off x="4114799" y="4472708"/>
-            <a:ext cx="2642195" cy="101600"/>
+            <a:off x="4343400" y="4719556"/>
+            <a:ext cx="2409270" cy="259224"/>
           </a:xfrm>
           <a:custGeom>
             <a:avLst/>
@@ -5481,6 +5384,226 @@
               <a:schemeClr val="accent3"/>
             </a:solidFill>
             <a:prstDash val="sysDot"/>
+            <a:headEnd type="none" w="med" len="med"/>
+            <a:tailEnd type="arrow" w="med" len="med"/>
+          </a:ln>
+          <a:effectLst/>
+        </p:spPr>
+        <p:style>
+          <a:lnRef idx="1">
+            <a:schemeClr val="accent2"/>
+          </a:lnRef>
+          <a:fillRef idx="2">
+            <a:schemeClr val="accent2"/>
+          </a:fillRef>
+          <a:effectRef idx="1">
+            <a:schemeClr val="accent2"/>
+          </a:effectRef>
+          <a:fontRef idx="minor">
+            <a:schemeClr val="dk1"/>
+          </a:fontRef>
+        </p:style>
+        <p:txBody>
+          <a:bodyPr rtlCol="0" anchor="ctr"/>
+          <a:lstStyle/>
+          <a:p>
+            <a:pPr algn="ctr"/>
+            <a:endParaRPr lang="en-SG"/>
+          </a:p>
+        </p:txBody>
+      </p:sp>
+      <p:sp>
+        <p:nvSpPr>
+          <p:cNvPr id="59" name="Rectangle 11"/>
+          <p:cNvSpPr/>
+          <p:nvPr/>
+        </p:nvSpPr>
+        <p:spPr>
+          <a:xfrm>
+            <a:off x="2574415" y="2880536"/>
+            <a:ext cx="1093635" cy="236841"/>
+          </a:xfrm>
+          <a:prstGeom prst="rect">
+            <a:avLst/>
+          </a:prstGeom>
+          <a:ln w="19050">
+            <a:solidFill>
+              <a:schemeClr val="accent3"/>
+            </a:solidFill>
+          </a:ln>
+          <a:effectLst/>
+        </p:spPr>
+        <p:style>
+          <a:lnRef idx="1">
+            <a:schemeClr val="accent3"/>
+          </a:lnRef>
+          <a:fillRef idx="2">
+            <a:schemeClr val="accent3"/>
+          </a:fillRef>
+          <a:effectRef idx="1">
+            <a:schemeClr val="accent3"/>
+          </a:effectRef>
+          <a:fontRef idx="minor">
+            <a:schemeClr val="dk1"/>
+          </a:fontRef>
+        </p:style>
+        <p:txBody>
+          <a:bodyPr rtlCol="0" anchor="ctr"/>
+          <a:lstStyle/>
+          <a:p>
+            <a:pPr algn="ctr"/>
+            <a:r>
+              <a:rPr lang="en-US" sz="1050" b="1" dirty="0" err="1">
+                <a:solidFill>
+                  <a:schemeClr val="accent3">
+                    <a:lumMod val="75000"/>
+                  </a:schemeClr>
+                </a:solidFill>
+              </a:rPr>
+              <a:t>CommandBox</a:t>
+            </a:r>
+            <a:endParaRPr lang="en-SG" sz="1050" b="1" dirty="0">
+              <a:solidFill>
+                <a:schemeClr val="accent3">
+                  <a:lumMod val="75000"/>
+                </a:schemeClr>
+              </a:solidFill>
+            </a:endParaRPr>
+          </a:p>
+        </p:txBody>
+      </p:sp>
+      <p:cxnSp>
+        <p:nvCxnSpPr>
+          <p:cNvPr id="60" name="Elbow Connector 63"/>
+          <p:cNvCxnSpPr/>
+          <p:nvPr/>
+        </p:nvCxnSpPr>
+        <p:spPr>
+          <a:xfrm rot="16200000" flipH="1">
+            <a:off x="2400268" y="2830034"/>
+            <a:ext cx="179555" cy="158289"/>
+          </a:xfrm>
+          <a:prstGeom prst="bentConnector2">
+            <a:avLst/>
+          </a:prstGeom>
+          <a:ln w="19050">
+            <a:solidFill>
+              <a:schemeClr val="accent3"/>
+            </a:solidFill>
+            <a:headEnd type="none" w="med" len="med"/>
+            <a:tailEnd type="arrow" w="med" len="med"/>
+          </a:ln>
+          <a:effectLst/>
+        </p:spPr>
+        <p:style>
+          <a:lnRef idx="1">
+            <a:schemeClr val="accent2"/>
+          </a:lnRef>
+          <a:fillRef idx="2">
+            <a:schemeClr val="accent2"/>
+          </a:fillRef>
+          <a:effectRef idx="1">
+            <a:schemeClr val="accent2"/>
+          </a:effectRef>
+          <a:fontRef idx="minor">
+            <a:schemeClr val="dk1"/>
+          </a:fontRef>
+        </p:style>
+      </p:cxnSp>
+      <p:cxnSp>
+        <p:nvCxnSpPr>
+          <p:cNvPr id="89" name="Elbow Connector 63"/>
+          <p:cNvCxnSpPr/>
+          <p:nvPr/>
+        </p:nvCxnSpPr>
+        <p:spPr>
+          <a:xfrm flipV="1">
+            <a:off x="3682528" y="2997589"/>
+            <a:ext cx="1857135" cy="336"/>
+          </a:xfrm>
+          <a:prstGeom prst="bentConnector3">
+            <a:avLst>
+              <a:gd name="adj1" fmla="val 50000"/>
+            </a:avLst>
+          </a:prstGeom>
+          <a:ln w="6350">
+            <a:solidFill>
+              <a:schemeClr val="accent3"/>
+            </a:solidFill>
+            <a:headEnd type="none" w="med" len="med"/>
+            <a:tailEnd type="none" w="med" len="med"/>
+          </a:ln>
+          <a:effectLst/>
+        </p:spPr>
+        <p:style>
+          <a:lnRef idx="1">
+            <a:schemeClr val="accent2"/>
+          </a:lnRef>
+          <a:fillRef idx="2">
+            <a:schemeClr val="accent2"/>
+          </a:fillRef>
+          <a:effectRef idx="1">
+            <a:schemeClr val="accent2"/>
+          </a:effectRef>
+          <a:fontRef idx="minor">
+            <a:schemeClr val="dk1"/>
+          </a:fontRef>
+        </p:style>
+      </p:cxnSp>
+      <p:sp>
+        <p:nvSpPr>
+          <p:cNvPr id="92" name="Freeform 91"/>
+          <p:cNvSpPr/>
+          <p:nvPr/>
+        </p:nvSpPr>
+        <p:spPr>
+          <a:xfrm flipV="1">
+            <a:off x="3673275" y="3039725"/>
+            <a:ext cx="3065154" cy="152401"/>
+          </a:xfrm>
+          <a:custGeom>
+            <a:avLst/>
+            <a:gdLst>
+              <a:gd name="connsiteX0" fmla="*/ 0 w 3048000"/>
+              <a:gd name="connsiteY0" fmla="*/ 203200 h 203200"/>
+              <a:gd name="connsiteX1" fmla="*/ 221673 w 3048000"/>
+              <a:gd name="connsiteY1" fmla="*/ 0 h 203200"/>
+              <a:gd name="connsiteX2" fmla="*/ 3048000 w 3048000"/>
+              <a:gd name="connsiteY2" fmla="*/ 0 h 203200"/>
+            </a:gdLst>
+            <a:ahLst/>
+            <a:cxnLst>
+              <a:cxn ang="0">
+                <a:pos x="connsiteX0" y="connsiteY0"/>
+              </a:cxn>
+              <a:cxn ang="0">
+                <a:pos x="connsiteX1" y="connsiteY1"/>
+              </a:cxn>
+              <a:cxn ang="0">
+                <a:pos x="connsiteX2" y="connsiteY2"/>
+              </a:cxn>
+            </a:cxnLst>
+            <a:rect l="l" t="t" r="r" b="b"/>
+            <a:pathLst>
+              <a:path w="3048000" h="203200">
+                <a:moveTo>
+                  <a:pt x="0" y="203200"/>
+                </a:moveTo>
+                <a:lnTo>
+                  <a:pt x="221673" y="0"/>
+                </a:lnTo>
+                <a:lnTo>
+                  <a:pt x="3048000" y="0"/>
+                </a:lnTo>
+              </a:path>
+            </a:pathLst>
+          </a:custGeom>
+          <a:noFill/>
+          <a:ln w="19050">
+            <a:solidFill>
+              <a:schemeClr val="accent3"/>
+            </a:solidFill>
+            <a:prstDash val="solid"/>
             <a:headEnd type="none" w="med" len="med"/>
             <a:tailEnd type="arrow" w="med" len="med"/>
           </a:ln>

</xml_diff>

<commit_message>
Update a few photos
</commit_message>
<xml_diff>
--- a/docs/diagrams/UiComponentClassDiagram.pptx
+++ b/docs/diagrams/UiComponentClassDiagram.pptx
@@ -3454,7 +3454,7 @@
         </p:nvSpPr>
         <p:spPr>
           <a:xfrm>
-            <a:off x="1217465" y="838200"/>
+            <a:off x="1143000" y="643580"/>
             <a:ext cx="5846096" cy="5181600"/>
           </a:xfrm>
           <a:prstGeom prst="roundRect">
@@ -3516,7 +3516,7 @@
         </p:nvSpPr>
         <p:spPr>
           <a:xfrm>
-            <a:off x="2095948" y="2341220"/>
+            <a:off x="2021483" y="1807820"/>
             <a:ext cx="1093635" cy="346760"/>
           </a:xfrm>
           <a:prstGeom prst="rect">
@@ -3576,7 +3576,7 @@
         </p:nvSpPr>
         <p:spPr>
           <a:xfrm>
-            <a:off x="2592528" y="2971800"/>
+            <a:off x="2518063" y="2438400"/>
             <a:ext cx="1093635" cy="236841"/>
           </a:xfrm>
           <a:prstGeom prst="rect">
@@ -3636,7 +3636,7 @@
         </p:nvSpPr>
         <p:spPr>
           <a:xfrm>
-            <a:off x="2092842" y="1770924"/>
+            <a:off x="2018377" y="1237524"/>
             <a:ext cx="1093635" cy="346760"/>
           </a:xfrm>
           <a:prstGeom prst="rect">
@@ -3698,7 +3698,7 @@
         </p:nvCxnSpPr>
         <p:spPr>
           <a:xfrm rot="16200000" flipH="1">
-            <a:off x="2529445" y="2227899"/>
+            <a:off x="2454980" y="1694499"/>
             <a:ext cx="223536" cy="3106"/>
           </a:xfrm>
           <a:prstGeom prst="bentConnector3">
@@ -3738,7 +3738,7 @@
         </p:nvSpPr>
         <p:spPr>
           <a:xfrm rot="10800000" flipV="1">
-            <a:off x="5394717" y="2110477"/>
+            <a:off x="5320252" y="1577077"/>
             <a:ext cx="270504" cy="175523"/>
           </a:xfrm>
           <a:prstGeom prst="triangle">
@@ -3788,7 +3788,7 @@
         </p:nvCxnSpPr>
         <p:spPr>
           <a:xfrm flipV="1">
-            <a:off x="644735" y="2991937"/>
+            <a:off x="570270" y="2458537"/>
             <a:ext cx="684904" cy="1"/>
           </a:xfrm>
           <a:prstGeom prst="bentConnector3">
@@ -3831,7 +3831,7 @@
         </p:nvSpPr>
         <p:spPr>
           <a:xfrm rot="16200000">
-            <a:off x="6104278" y="2044058"/>
+            <a:off x="6034007" y="1849090"/>
             <a:ext cx="3048000" cy="636284"/>
           </a:xfrm>
           <a:prstGeom prst="roundRect">
@@ -3891,7 +3891,7 @@
         </p:nvSpPr>
         <p:spPr>
           <a:xfrm>
-            <a:off x="2592528" y="3649359"/>
+            <a:off x="2518063" y="3115959"/>
             <a:ext cx="1093635" cy="236841"/>
           </a:xfrm>
           <a:prstGeom prst="rect">
@@ -3951,7 +3951,7 @@
         </p:nvSpPr>
         <p:spPr>
           <a:xfrm>
-            <a:off x="2592527" y="5040946"/>
+            <a:off x="2513182" y="5013242"/>
             <a:ext cx="1093635" cy="236841"/>
           </a:xfrm>
           <a:prstGeom prst="rect">
@@ -4011,7 +4011,7 @@
         </p:nvSpPr>
         <p:spPr>
           <a:xfrm>
-            <a:off x="2592526" y="3991960"/>
+            <a:off x="2518061" y="3458560"/>
             <a:ext cx="1093635" cy="236841"/>
           </a:xfrm>
           <a:prstGeom prst="rect">
@@ -4091,7 +4091,7 @@
         </p:nvSpPr>
         <p:spPr>
           <a:xfrm>
-            <a:off x="4332061" y="4420871"/>
+            <a:off x="4257596" y="3887471"/>
             <a:ext cx="1040906" cy="236841"/>
           </a:xfrm>
           <a:prstGeom prst="rect">
@@ -4151,7 +4151,7 @@
         </p:nvSpPr>
         <p:spPr>
           <a:xfrm>
-            <a:off x="2589447" y="5383548"/>
+            <a:off x="2521038" y="5459613"/>
             <a:ext cx="1093635" cy="236841"/>
           </a:xfrm>
           <a:prstGeom prst="rect">
@@ -4211,7 +4211,7 @@
         </p:nvSpPr>
         <p:spPr>
           <a:xfrm>
-            <a:off x="2324548" y="2706452"/>
+            <a:off x="2250083" y="2173052"/>
             <a:ext cx="183156" cy="161573"/>
           </a:xfrm>
           <a:prstGeom prst="flowChartDecision">
@@ -4262,7 +4262,7 @@
         </p:nvCxnSpPr>
         <p:spPr>
           <a:xfrm rot="16200000" flipH="1">
-            <a:off x="2393229" y="2890922"/>
+            <a:off x="2318764" y="2357522"/>
             <a:ext cx="222196" cy="176402"/>
           </a:xfrm>
           <a:prstGeom prst="bentConnector2">
@@ -4300,7 +4300,7 @@
         </p:nvSpPr>
         <p:spPr>
           <a:xfrm>
-            <a:off x="2590799" y="3304308"/>
+            <a:off x="2516334" y="2770908"/>
             <a:ext cx="1095361" cy="236841"/>
           </a:xfrm>
           <a:prstGeom prst="rect">
@@ -4363,7 +4363,7 @@
         </p:nvCxnSpPr>
         <p:spPr>
           <a:xfrm rot="16200000" flipH="1">
-            <a:off x="2054450" y="3229701"/>
+            <a:off x="1979985" y="2696301"/>
             <a:ext cx="899755" cy="176402"/>
           </a:xfrm>
           <a:prstGeom prst="bentConnector2">
@@ -4404,7 +4404,7 @@
         </p:nvCxnSpPr>
         <p:spPr>
           <a:xfrm rot="16200000" flipH="1">
-            <a:off x="1883148" y="3401003"/>
+            <a:off x="1808683" y="2867603"/>
             <a:ext cx="1242356" cy="176400"/>
           </a:xfrm>
           <a:prstGeom prst="bentConnector2">
@@ -4445,8 +4445,8 @@
         </p:nvCxnSpPr>
         <p:spPr>
           <a:xfrm rot="16200000" flipH="1">
-            <a:off x="1358655" y="3925495"/>
-            <a:ext cx="2291342" cy="176401"/>
+            <a:off x="1028902" y="3647383"/>
+            <a:ext cx="2797038" cy="171521"/>
           </a:xfrm>
           <a:prstGeom prst="bentConnector2">
             <a:avLst/>
@@ -4486,8 +4486,8 @@
         </p:nvCxnSpPr>
         <p:spPr>
           <a:xfrm rot="16200000" flipH="1">
-            <a:off x="965048" y="3877569"/>
-            <a:ext cx="2801335" cy="447463"/>
+            <a:off x="602082" y="3659077"/>
+            <a:ext cx="3423455" cy="414457"/>
           </a:xfrm>
           <a:prstGeom prst="bentConnector2">
             <a:avLst/>
@@ -4524,7 +4524,7 @@
         </p:nvSpPr>
         <p:spPr>
           <a:xfrm>
-            <a:off x="5143948" y="1770924"/>
+            <a:off x="5069483" y="1237524"/>
             <a:ext cx="772043" cy="346760"/>
           </a:xfrm>
           <a:prstGeom prst="rect">
@@ -4606,7 +4606,7 @@
         </p:nvCxnSpPr>
         <p:spPr>
           <a:xfrm flipV="1">
-            <a:off x="3686160" y="2286000"/>
+            <a:off x="3611695" y="1752600"/>
             <a:ext cx="1843809" cy="1136729"/>
           </a:xfrm>
           <a:prstGeom prst="bentConnector2">
@@ -4647,7 +4647,7 @@
         </p:nvCxnSpPr>
         <p:spPr>
           <a:xfrm rot="5400000">
-            <a:off x="4324822" y="3334145"/>
+            <a:off x="4250357" y="2800745"/>
             <a:ext cx="2253292" cy="157002"/>
           </a:xfrm>
           <a:prstGeom prst="bentConnector2">
@@ -4688,7 +4688,7 @@
         </p:nvCxnSpPr>
         <p:spPr>
           <a:xfrm rot="5400000">
-            <a:off x="3867176" y="2104987"/>
+            <a:off x="3792711" y="1571587"/>
             <a:ext cx="1481780" cy="1843806"/>
           </a:xfrm>
           <a:prstGeom prst="bentConnector2">
@@ -4729,7 +4729,7 @@
         </p:nvCxnSpPr>
         <p:spPr>
           <a:xfrm flipV="1">
-            <a:off x="3189583" y="2286000"/>
+            <a:off x="3115118" y="1752600"/>
             <a:ext cx="2340386" cy="228600"/>
           </a:xfrm>
           <a:prstGeom prst="bentConnector2">
@@ -4770,8 +4770,8 @@
         </p:nvCxnSpPr>
         <p:spPr>
           <a:xfrm rot="5400000">
-            <a:off x="3171383" y="2800780"/>
-            <a:ext cx="2873367" cy="1843807"/>
+            <a:off x="2841630" y="2517788"/>
+            <a:ext cx="3379063" cy="1848687"/>
           </a:xfrm>
           <a:prstGeom prst="bentConnector2">
             <a:avLst/>
@@ -4811,8 +4811,8 @@
         </p:nvCxnSpPr>
         <p:spPr>
           <a:xfrm rot="5400000">
-            <a:off x="2998542" y="2970541"/>
-            <a:ext cx="3215969" cy="1846887"/>
+            <a:off x="2622372" y="2744902"/>
+            <a:ext cx="3825434" cy="1840831"/>
           </a:xfrm>
           <a:prstGeom prst="bentConnector2">
             <a:avLst/>
@@ -4852,7 +4852,7 @@
         </p:nvCxnSpPr>
         <p:spPr>
           <a:xfrm rot="5400000" flipH="1" flipV="1">
-            <a:off x="4918379" y="-618235"/>
+            <a:off x="4843914" y="-1151635"/>
             <a:ext cx="110441" cy="4667879"/>
           </a:xfrm>
           <a:prstGeom prst="bentConnector2">
@@ -4891,7 +4891,7 @@
         </p:nvSpPr>
         <p:spPr>
           <a:xfrm rot="16200000">
-            <a:off x="6657877" y="4748619"/>
+            <a:off x="6606046" y="4553999"/>
             <a:ext cx="1905000" cy="637362"/>
           </a:xfrm>
           <a:prstGeom prst="roundRect">
@@ -4951,7 +4951,7 @@
         </p:nvSpPr>
         <p:spPr>
           <a:xfrm rot="16200000">
-            <a:off x="956202" y="2861202"/>
+            <a:off x="881737" y="2327802"/>
             <a:ext cx="1093635" cy="346760"/>
           </a:xfrm>
           <a:prstGeom prst="rect">
@@ -5021,7 +5021,7 @@
         </p:nvSpPr>
         <p:spPr>
           <a:xfrm flipV="1">
-            <a:off x="1367767" y="2286001"/>
+            <a:off x="1293302" y="1752601"/>
             <a:ext cx="270504" cy="175523"/>
           </a:xfrm>
           <a:prstGeom prst="triangle">
@@ -5072,7 +5072,7 @@
         </p:nvCxnSpPr>
         <p:spPr>
           <a:xfrm rot="10800000" flipV="1">
-            <a:off x="1503020" y="1944303"/>
+            <a:off x="1428555" y="1410903"/>
             <a:ext cx="589823" cy="341697"/>
           </a:xfrm>
           <a:prstGeom prst="bentConnector2">
@@ -5114,7 +5114,7 @@
         </p:nvCxnSpPr>
         <p:spPr>
           <a:xfrm rot="16200000" flipH="1">
-            <a:off x="2226110" y="3058040"/>
+            <a:off x="2151645" y="2524640"/>
             <a:ext cx="554704" cy="174673"/>
           </a:xfrm>
           <a:prstGeom prst="bentConnector2">
@@ -5155,7 +5155,7 @@
         </p:nvCxnSpPr>
         <p:spPr>
           <a:xfrm rot="5400000">
-            <a:off x="4205956" y="1766207"/>
+            <a:off x="4131491" y="1232807"/>
             <a:ext cx="804221" cy="1843806"/>
           </a:xfrm>
           <a:prstGeom prst="bentConnector2">
@@ -5197,7 +5197,7 @@
         </p:nvCxnSpPr>
         <p:spPr>
           <a:xfrm rot="16200000" flipH="1">
-            <a:off x="3244337" y="4123807"/>
+            <a:off x="3169872" y="3590407"/>
             <a:ext cx="189338" cy="399325"/>
           </a:xfrm>
           <a:prstGeom prst="bentConnector3">
@@ -5240,7 +5240,7 @@
         </p:nvCxnSpPr>
         <p:spPr>
           <a:xfrm rot="5400000">
-            <a:off x="3695875" y="2276286"/>
+            <a:off x="3621410" y="1742886"/>
             <a:ext cx="1824381" cy="1843808"/>
           </a:xfrm>
           <a:prstGeom prst="bentConnector2">
@@ -5278,7 +5278,7 @@
         </p:nvSpPr>
         <p:spPr>
           <a:xfrm>
-            <a:off x="5435896" y="2743200"/>
+            <a:off x="5361431" y="2209800"/>
             <a:ext cx="229325" cy="166560"/>
           </a:xfrm>
           <a:prstGeom prst="rect">
@@ -5331,7 +5331,7 @@
         </p:nvSpPr>
         <p:spPr>
           <a:xfrm>
-            <a:off x="3687515" y="2743199"/>
+            <a:off x="3613050" y="2209799"/>
             <a:ext cx="3620022" cy="288803"/>
           </a:xfrm>
           <a:custGeom>
@@ -5413,7 +5413,7 @@
         </p:nvSpPr>
         <p:spPr>
           <a:xfrm flipV="1">
-            <a:off x="3687515" y="4170018"/>
+            <a:off x="3613050" y="3636618"/>
             <a:ext cx="3604181" cy="1614863"/>
           </a:xfrm>
           <a:custGeom>
@@ -5501,7 +5501,7 @@
         </p:nvSpPr>
         <p:spPr>
           <a:xfrm>
-            <a:off x="2991851" y="4418139"/>
+            <a:off x="2917386" y="3884739"/>
             <a:ext cx="1093635" cy="236841"/>
           </a:xfrm>
           <a:prstGeom prst="rect">
@@ -5571,7 +5571,7 @@
         </p:nvCxnSpPr>
         <p:spPr>
           <a:xfrm>
-            <a:off x="4085486" y="4536560"/>
+            <a:off x="4011021" y="4003160"/>
             <a:ext cx="246575" cy="2732"/>
           </a:xfrm>
           <a:prstGeom prst="bentConnector3">
@@ -5617,7 +5617,7 @@
         </p:nvSpPr>
         <p:spPr>
           <a:xfrm>
-            <a:off x="2991851" y="4739403"/>
+            <a:off x="2917386" y="4206003"/>
             <a:ext cx="1093635" cy="236841"/>
           </a:xfrm>
           <a:prstGeom prst="rect">
@@ -5683,7 +5683,7 @@
         </p:nvSpPr>
         <p:spPr>
           <a:xfrm>
-            <a:off x="4332061" y="4733722"/>
+            <a:off x="4257596" y="4200322"/>
             <a:ext cx="1040906" cy="236841"/>
           </a:xfrm>
           <a:prstGeom prst="rect">
@@ -5753,7 +5753,7 @@
         </p:nvCxnSpPr>
         <p:spPr>
           <a:xfrm flipV="1">
-            <a:off x="4085486" y="4852143"/>
+            <a:off x="4011021" y="4318743"/>
             <a:ext cx="246575" cy="5681"/>
           </a:xfrm>
           <a:prstGeom prst="bentConnector3">
@@ -5803,8 +5803,170 @@
         </p:nvCxnSpPr>
         <p:spPr>
           <a:xfrm rot="5400000">
-            <a:off x="4168397" y="3490570"/>
+            <a:off x="4093932" y="2957170"/>
             <a:ext cx="2566143" cy="157002"/>
+          </a:xfrm>
+          <a:prstGeom prst="bentConnector2">
+            <a:avLst/>
+          </a:prstGeom>
+          <a:ln w="6350">
+            <a:solidFill>
+              <a:schemeClr val="accent3"/>
+            </a:solidFill>
+            <a:headEnd type="none" w="med" len="med"/>
+            <a:tailEnd type="none" w="med" len="med"/>
+          </a:ln>
+          <a:effectLst/>
+        </p:spPr>
+        <p:style>
+          <a:lnRef idx="1">
+            <a:schemeClr val="accent2"/>
+          </a:lnRef>
+          <a:fillRef idx="2">
+            <a:schemeClr val="accent2"/>
+          </a:fillRef>
+          <a:effectRef idx="1">
+            <a:schemeClr val="accent2"/>
+          </a:effectRef>
+          <a:fontRef idx="minor">
+            <a:schemeClr val="dk1"/>
+          </a:fontRef>
+        </p:style>
+      </p:cxnSp>
+      <p:sp>
+        <p:nvSpPr>
+          <p:cNvPr id="85" name="Rectangle 11">
+            <a:extLst>
+              <a:ext uri="{FF2B5EF4-FFF2-40B4-BE49-F238E27FC236}">
+                <a16:creationId xmlns:a16="http://schemas.microsoft.com/office/drawing/2014/main" id="{03870EF4-D78F-4ADC-A610-505B6A5FD7BC}"/>
+              </a:ext>
+            </a:extLst>
+          </p:cNvPr>
+          <p:cNvSpPr/>
+          <p:nvPr/>
+        </p:nvSpPr>
+        <p:spPr>
+          <a:xfrm>
+            <a:off x="2509721" y="4633187"/>
+            <a:ext cx="1093635" cy="236841"/>
+          </a:xfrm>
+          <a:prstGeom prst="rect">
+            <a:avLst/>
+          </a:prstGeom>
+          <a:ln w="19050">
+            <a:solidFill>
+              <a:schemeClr val="accent3"/>
+            </a:solidFill>
+          </a:ln>
+          <a:effectLst/>
+        </p:spPr>
+        <p:style>
+          <a:lnRef idx="1">
+            <a:schemeClr val="accent3"/>
+          </a:lnRef>
+          <a:fillRef idx="2">
+            <a:schemeClr val="accent3"/>
+          </a:fillRef>
+          <a:effectRef idx="1">
+            <a:schemeClr val="accent3"/>
+          </a:effectRef>
+          <a:fontRef idx="minor">
+            <a:schemeClr val="dk1"/>
+          </a:fontRef>
+        </p:style>
+        <p:txBody>
+          <a:bodyPr rtlCol="0" anchor="ctr"/>
+          <a:lstStyle/>
+          <a:p>
+            <a:pPr algn="ctr"/>
+            <a:r>
+              <a:rPr lang="en-US" sz="1050" b="1" dirty="0" err="1">
+                <a:solidFill>
+                  <a:schemeClr val="accent3">
+                    <a:lumMod val="75000"/>
+                  </a:schemeClr>
+                </a:solidFill>
+              </a:rPr>
+              <a:t>SideBarButton</a:t>
+            </a:r>
+            <a:endParaRPr lang="en-SG" sz="1050" b="1" dirty="0">
+              <a:solidFill>
+                <a:schemeClr val="accent3">
+                  <a:lumMod val="75000"/>
+                </a:schemeClr>
+              </a:solidFill>
+            </a:endParaRPr>
+          </a:p>
+        </p:txBody>
+      </p:sp>
+      <p:cxnSp>
+        <p:nvCxnSpPr>
+          <p:cNvPr id="86" name="Elbow Connector 63">
+            <a:extLst>
+              <a:ext uri="{FF2B5EF4-FFF2-40B4-BE49-F238E27FC236}">
+                <a16:creationId xmlns:a16="http://schemas.microsoft.com/office/drawing/2014/main" id="{586B54D1-E98C-42E1-AA1B-0B907019BA34}"/>
+              </a:ext>
+            </a:extLst>
+          </p:cNvPr>
+          <p:cNvCxnSpPr>
+            <a:cxnSpLocks/>
+            <a:stCxn id="39" idx="2"/>
+            <a:endCxn id="85" idx="1"/>
+          </p:cNvCxnSpPr>
+          <p:nvPr/>
+        </p:nvCxnSpPr>
+        <p:spPr>
+          <a:xfrm rot="16200000" flipH="1">
+            <a:off x="1217200" y="3459086"/>
+            <a:ext cx="2416983" cy="168060"/>
+          </a:xfrm>
+          <a:prstGeom prst="bentConnector2">
+            <a:avLst/>
+          </a:prstGeom>
+          <a:ln w="19050">
+            <a:solidFill>
+              <a:schemeClr val="accent3"/>
+            </a:solidFill>
+            <a:headEnd type="none" w="med" len="med"/>
+            <a:tailEnd type="arrow" w="med" len="med"/>
+          </a:ln>
+          <a:effectLst/>
+        </p:spPr>
+        <p:style>
+          <a:lnRef idx="1">
+            <a:schemeClr val="accent2"/>
+          </a:lnRef>
+          <a:fillRef idx="2">
+            <a:schemeClr val="accent2"/>
+          </a:fillRef>
+          <a:effectRef idx="1">
+            <a:schemeClr val="accent2"/>
+          </a:effectRef>
+          <a:fontRef idx="minor">
+            <a:schemeClr val="dk1"/>
+          </a:fontRef>
+        </p:style>
+      </p:cxnSp>
+      <p:cxnSp>
+        <p:nvCxnSpPr>
+          <p:cNvPr id="89" name="Elbow Connector 63">
+            <a:extLst>
+              <a:ext uri="{FF2B5EF4-FFF2-40B4-BE49-F238E27FC236}">
+                <a16:creationId xmlns:a16="http://schemas.microsoft.com/office/drawing/2014/main" id="{0480771D-9779-47B1-A504-A984DE7DC6CE}"/>
+              </a:ext>
+            </a:extLst>
+          </p:cNvPr>
+          <p:cNvCxnSpPr>
+            <a:cxnSpLocks/>
+            <a:stCxn id="16" idx="3"/>
+            <a:endCxn id="85" idx="3"/>
+          </p:cNvCxnSpPr>
+          <p:nvPr/>
+        </p:nvCxnSpPr>
+        <p:spPr>
+          <a:xfrm rot="5400000">
+            <a:off x="3029926" y="2326030"/>
+            <a:ext cx="2999008" cy="1852148"/>
           </a:xfrm>
           <a:prstGeom prst="bentConnector2">
             <a:avLst/>

</xml_diff>

<commit_message>
DeveloperGuide: Add implementation section for hotkeys
</commit_message>
<xml_diff>
--- a/docs/diagrams/UiComponentClassDiagram.pptx
+++ b/docs/diagrams/UiComponentClassDiagram.pptx
@@ -126,6 +126,10 @@
 </p:presentation>
 </file>
 
+<file path=ppt/revisionInfo.xml><?xml version="1.0" encoding="utf-8"?>
+<p1510:revInfo xmlns:a="http://schemas.openxmlformats.org/drawingml/2006/main" xmlns:r="http://schemas.openxmlformats.org/officeDocument/2006/relationships" xmlns:p1510="http://schemas.microsoft.com/office/powerpoint/2015/10/main"/>
+</file>
+
 <file path=ppt/notesMasters/notesMaster1.xml><?xml version="1.0" encoding="utf-8"?>
 <p:notesMaster xmlns:a="http://schemas.openxmlformats.org/drawingml/2006/main" xmlns:r="http://schemas.openxmlformats.org/officeDocument/2006/relationships" xmlns:p="http://schemas.openxmlformats.org/presentationml/2006/main">
   <p:cSld>
@@ -208,7 +212,7 @@
           <a:p>
             <a:fld id="{F5CC4B3F-88C1-4FFA-B1B6-F41C21DC6924}" type="datetimeFigureOut">
               <a:rPr lang="en-US" smtClean="0"/>
-              <a:t>1/7/2017</a:t>
+              <a:t>10/19/2017</a:t>
             </a:fld>
             <a:endParaRPr lang="en-US"/>
           </a:p>
@@ -654,7 +658,7 @@
           <a:p>
             <a:fld id="{78C97017-6FC3-485B-9764-EAC9E56C1D49}" type="datetimeFigureOut">
               <a:rPr lang="en-US" smtClean="0"/>
-              <a:t>1/7/2017</a:t>
+              <a:t>10/19/2017</a:t>
             </a:fld>
             <a:endParaRPr lang="en-US"/>
           </a:p>
@@ -822,7 +826,7 @@
           <a:p>
             <a:fld id="{78C97017-6FC3-485B-9764-EAC9E56C1D49}" type="datetimeFigureOut">
               <a:rPr lang="en-US" smtClean="0"/>
-              <a:t>1/7/2017</a:t>
+              <a:t>10/19/2017</a:t>
             </a:fld>
             <a:endParaRPr lang="en-US"/>
           </a:p>
@@ -1000,7 +1004,7 @@
           <a:p>
             <a:fld id="{78C97017-6FC3-485B-9764-EAC9E56C1D49}" type="datetimeFigureOut">
               <a:rPr lang="en-US" smtClean="0"/>
-              <a:t>1/7/2017</a:t>
+              <a:t>10/19/2017</a:t>
             </a:fld>
             <a:endParaRPr lang="en-US"/>
           </a:p>
@@ -1168,7 +1172,7 @@
           <a:p>
             <a:fld id="{78C97017-6FC3-485B-9764-EAC9E56C1D49}" type="datetimeFigureOut">
               <a:rPr lang="en-US" smtClean="0"/>
-              <a:t>1/7/2017</a:t>
+              <a:t>10/19/2017</a:t>
             </a:fld>
             <a:endParaRPr lang="en-US"/>
           </a:p>
@@ -1413,7 +1417,7 @@
           <a:p>
             <a:fld id="{78C97017-6FC3-485B-9764-EAC9E56C1D49}" type="datetimeFigureOut">
               <a:rPr lang="en-US" smtClean="0"/>
-              <a:t>1/7/2017</a:t>
+              <a:t>10/19/2017</a:t>
             </a:fld>
             <a:endParaRPr lang="en-US"/>
           </a:p>
@@ -1698,7 +1702,7 @@
           <a:p>
             <a:fld id="{78C97017-6FC3-485B-9764-EAC9E56C1D49}" type="datetimeFigureOut">
               <a:rPr lang="en-US" smtClean="0"/>
-              <a:t>1/7/2017</a:t>
+              <a:t>10/19/2017</a:t>
             </a:fld>
             <a:endParaRPr lang="en-US"/>
           </a:p>
@@ -2117,7 +2121,7 @@
           <a:p>
             <a:fld id="{78C97017-6FC3-485B-9764-EAC9E56C1D49}" type="datetimeFigureOut">
               <a:rPr lang="en-US" smtClean="0"/>
-              <a:t>1/7/2017</a:t>
+              <a:t>10/19/2017</a:t>
             </a:fld>
             <a:endParaRPr lang="en-US"/>
           </a:p>
@@ -2234,7 +2238,7 @@
           <a:p>
             <a:fld id="{78C97017-6FC3-485B-9764-EAC9E56C1D49}" type="datetimeFigureOut">
               <a:rPr lang="en-US" smtClean="0"/>
-              <a:t>1/7/2017</a:t>
+              <a:t>10/19/2017</a:t>
             </a:fld>
             <a:endParaRPr lang="en-US"/>
           </a:p>
@@ -2329,7 +2333,7 @@
           <a:p>
             <a:fld id="{78C97017-6FC3-485B-9764-EAC9E56C1D49}" type="datetimeFigureOut">
               <a:rPr lang="en-US" smtClean="0"/>
-              <a:t>1/7/2017</a:t>
+              <a:t>10/19/2017</a:t>
             </a:fld>
             <a:endParaRPr lang="en-US"/>
           </a:p>
@@ -2604,7 +2608,7 @@
           <a:p>
             <a:fld id="{78C97017-6FC3-485B-9764-EAC9E56C1D49}" type="datetimeFigureOut">
               <a:rPr lang="en-US" smtClean="0"/>
-              <a:t>1/7/2017</a:t>
+              <a:t>10/19/2017</a:t>
             </a:fld>
             <a:endParaRPr lang="en-US"/>
           </a:p>
@@ -2856,7 +2860,7 @@
           <a:p>
             <a:fld id="{78C97017-6FC3-485B-9764-EAC9E56C1D49}" type="datetimeFigureOut">
               <a:rPr lang="en-US" smtClean="0"/>
-              <a:t>1/7/2017</a:t>
+              <a:t>10/19/2017</a:t>
             </a:fld>
             <a:endParaRPr lang="en-US"/>
           </a:p>
@@ -3067,7 +3071,7 @@
           <a:p>
             <a:fld id="{78C97017-6FC3-485B-9764-EAC9E56C1D49}" type="datetimeFigureOut">
               <a:rPr lang="en-US" smtClean="0"/>
-              <a:t>1/7/2017</a:t>
+              <a:t>10/19/2017</a:t>
             </a:fld>
             <a:endParaRPr lang="en-US"/>
           </a:p>
@@ -3450,8 +3454,8 @@
         </p:nvSpPr>
         <p:spPr>
           <a:xfrm>
-            <a:off x="1217465" y="1447800"/>
-            <a:ext cx="4917083" cy="3962400"/>
+            <a:off x="762000" y="685799"/>
+            <a:ext cx="6324599" cy="4800600"/>
           </a:xfrm>
           <a:prstGeom prst="roundRect">
             <a:avLst>
@@ -3512,8 +3516,8 @@
         </p:nvSpPr>
         <p:spPr>
           <a:xfrm>
-            <a:off x="2095948" y="2341220"/>
-            <a:ext cx="1093635" cy="346760"/>
+            <a:off x="2592168" y="1710640"/>
+            <a:ext cx="1252695" cy="346760"/>
           </a:xfrm>
           <a:prstGeom prst="rect">
             <a:avLst/>
@@ -3572,8 +3576,8 @@
         </p:nvSpPr>
         <p:spPr>
           <a:xfrm>
-            <a:off x="2592528" y="2971800"/>
-            <a:ext cx="1093635" cy="236841"/>
+            <a:off x="3506929" y="2994484"/>
+            <a:ext cx="1188000" cy="236841"/>
           </a:xfrm>
           <a:prstGeom prst="rect">
             <a:avLst/>
@@ -3632,8 +3636,8 @@
         </p:nvSpPr>
         <p:spPr>
           <a:xfrm>
-            <a:off x="2092842" y="1770924"/>
-            <a:ext cx="1093635" cy="346760"/>
+            <a:off x="2589062" y="1128048"/>
+            <a:ext cx="1252695" cy="346760"/>
           </a:xfrm>
           <a:prstGeom prst="rect">
             <a:avLst/>
@@ -3687,6 +3691,7 @@
         <p:nvCxnSpPr>
           <p:cNvPr id="10" name="Elbow Connector 63"/>
           <p:cNvCxnSpPr>
+            <a:cxnSpLocks/>
             <a:stCxn id="9" idx="2"/>
             <a:endCxn id="2" idx="0"/>
           </p:cNvCxnSpPr>
@@ -3694,8 +3699,8 @@
         </p:nvCxnSpPr>
         <p:spPr>
           <a:xfrm rot="16200000" flipH="1">
-            <a:off x="2529445" y="2227899"/>
-            <a:ext cx="223536" cy="3106"/>
+            <a:off x="3099047" y="1591171"/>
+            <a:ext cx="235832" cy="3106"/>
           </a:xfrm>
           <a:prstGeom prst="bentConnector3">
             <a:avLst>
@@ -3734,7 +3739,7 @@
         </p:nvSpPr>
         <p:spPr>
           <a:xfrm rot="10800000" flipV="1">
-            <a:off x="5394717" y="2110477"/>
+            <a:off x="6270398" y="1461592"/>
             <a:ext cx="270504" cy="175523"/>
           </a:xfrm>
           <a:prstGeom prst="triangle">
@@ -3782,7 +3787,7 @@
         </p:nvCxnSpPr>
         <p:spPr>
           <a:xfrm flipV="1">
-            <a:off x="644735" y="2991937"/>
+            <a:off x="297064" y="2962083"/>
             <a:ext cx="684904" cy="1"/>
           </a:xfrm>
           <a:prstGeom prst="bentConnector3">
@@ -3825,8 +3830,8 @@
         </p:nvSpPr>
         <p:spPr>
           <a:xfrm rot="16200000">
-            <a:off x="5703829" y="2464877"/>
-            <a:ext cx="2362201" cy="328045"/>
+            <a:off x="6180239" y="1779076"/>
+            <a:ext cx="2514598" cy="328045"/>
           </a:xfrm>
           <a:prstGeom prst="roundRect">
             <a:avLst/>
@@ -3885,8 +3890,8 @@
         </p:nvSpPr>
         <p:spPr>
           <a:xfrm>
-            <a:off x="2592528" y="3649359"/>
-            <a:ext cx="1093635" cy="236841"/>
+            <a:off x="3506929" y="3672043"/>
+            <a:ext cx="1188000" cy="236841"/>
           </a:xfrm>
           <a:prstGeom prst="rect">
             <a:avLst/>
@@ -3918,16 +3923,16 @@
           <a:p>
             <a:pPr algn="ctr"/>
             <a:r>
-              <a:rPr lang="en-US" sz="1050" b="1" dirty="0" err="1">
+              <a:rPr lang="en-US" sz="1000" b="1" dirty="0" err="1">
                 <a:solidFill>
                   <a:schemeClr val="accent3">
                     <a:lumMod val="75000"/>
                   </a:schemeClr>
                 </a:solidFill>
               </a:rPr>
-              <a:t>BrowserPanel</a:t>
-            </a:r>
-            <a:endParaRPr lang="en-SG" sz="1050" b="1" dirty="0">
+              <a:t>PersonDetailPanel</a:t>
+            </a:r>
+            <a:endParaRPr lang="en-SG" sz="1000" b="1" dirty="0">
               <a:solidFill>
                 <a:schemeClr val="accent3">
                   <a:lumMod val="75000"/>
@@ -3945,8 +3950,8 @@
         </p:nvSpPr>
         <p:spPr>
           <a:xfrm>
-            <a:off x="2592527" y="4563759"/>
-            <a:ext cx="1093635" cy="236841"/>
+            <a:off x="3506928" y="4586443"/>
+            <a:ext cx="1188000" cy="236841"/>
           </a:xfrm>
           <a:prstGeom prst="rect">
             <a:avLst/>
@@ -4005,8 +4010,8 @@
         </p:nvSpPr>
         <p:spPr>
           <a:xfrm>
-            <a:off x="2592526" y="3991960"/>
-            <a:ext cx="1093635" cy="236841"/>
+            <a:off x="3506927" y="4014644"/>
+            <a:ext cx="1188000" cy="236841"/>
           </a:xfrm>
           <a:prstGeom prst="rect">
             <a:avLst/>
@@ -4065,8 +4070,8 @@
         </p:nvSpPr>
         <p:spPr>
           <a:xfrm>
-            <a:off x="3839323" y="4228801"/>
-            <a:ext cx="1040906" cy="236841"/>
+            <a:off x="4933484" y="4256574"/>
+            <a:ext cx="1188000" cy="236841"/>
           </a:xfrm>
           <a:prstGeom prst="rect">
             <a:avLst/>
@@ -4125,8 +4130,8 @@
         </p:nvSpPr>
         <p:spPr>
           <a:xfrm>
-            <a:off x="2592528" y="4966000"/>
-            <a:ext cx="1093635" cy="236841"/>
+            <a:off x="3505200" y="5018225"/>
+            <a:ext cx="1188000" cy="236841"/>
           </a:xfrm>
           <a:prstGeom prst="rect">
             <a:avLst/>
@@ -4185,7 +4190,7 @@
         </p:nvSpPr>
         <p:spPr>
           <a:xfrm>
-            <a:off x="2324548" y="2706452"/>
+            <a:off x="3124786" y="2080722"/>
             <a:ext cx="183156" cy="161573"/>
           </a:xfrm>
           <a:prstGeom prst="flowChartDecision">
@@ -4229,6 +4234,7 @@
         <p:nvCxnSpPr>
           <p:cNvPr id="40" name="Elbow Connector 63"/>
           <p:cNvCxnSpPr>
+            <a:cxnSpLocks/>
             <a:stCxn id="39" idx="2"/>
             <a:endCxn id="3" idx="1"/>
           </p:cNvCxnSpPr>
@@ -4236,8 +4242,8 @@
         </p:nvCxnSpPr>
         <p:spPr>
           <a:xfrm rot="16200000" flipH="1">
-            <a:off x="2393229" y="2890922"/>
-            <a:ext cx="222196" cy="176402"/>
+            <a:off x="2926341" y="2532317"/>
+            <a:ext cx="870610" cy="290565"/>
           </a:xfrm>
           <a:prstGeom prst="bentConnector2">
             <a:avLst/>
@@ -4274,8 +4280,8 @@
         </p:nvSpPr>
         <p:spPr>
           <a:xfrm>
-            <a:off x="2590799" y="3304308"/>
-            <a:ext cx="1095361" cy="236841"/>
+            <a:off x="3505200" y="3326992"/>
+            <a:ext cx="1188000" cy="236841"/>
           </a:xfrm>
           <a:prstGeom prst="rect">
             <a:avLst/>
@@ -4330,6 +4336,7 @@
         <p:nvCxnSpPr>
           <p:cNvPr id="44" name="Elbow Connector 63"/>
           <p:cNvCxnSpPr>
+            <a:cxnSpLocks/>
             <a:stCxn id="39" idx="2"/>
             <a:endCxn id="34" idx="1"/>
           </p:cNvCxnSpPr>
@@ -4337,8 +4344,8 @@
         </p:nvCxnSpPr>
         <p:spPr>
           <a:xfrm rot="16200000" flipH="1">
-            <a:off x="2054450" y="3229701"/>
-            <a:ext cx="899755" cy="176402"/>
+            <a:off x="2587562" y="2871096"/>
+            <a:ext cx="1548169" cy="290565"/>
           </a:xfrm>
           <a:prstGeom prst="bentConnector2">
             <a:avLst/>
@@ -4371,6 +4378,7 @@
         <p:nvCxnSpPr>
           <p:cNvPr id="47" name="Elbow Connector 63"/>
           <p:cNvCxnSpPr>
+            <a:cxnSpLocks/>
             <a:stCxn id="39" idx="2"/>
             <a:endCxn id="36" idx="1"/>
           </p:cNvCxnSpPr>
@@ -4378,8 +4386,8 @@
         </p:nvCxnSpPr>
         <p:spPr>
           <a:xfrm rot="16200000" flipH="1">
-            <a:off x="1883148" y="3401003"/>
-            <a:ext cx="1242356" cy="176400"/>
+            <a:off x="2416260" y="3042398"/>
+            <a:ext cx="1890770" cy="290563"/>
           </a:xfrm>
           <a:prstGeom prst="bentConnector2">
             <a:avLst/>
@@ -4412,6 +4420,7 @@
         <p:nvCxnSpPr>
           <p:cNvPr id="50" name="Elbow Connector 63"/>
           <p:cNvCxnSpPr>
+            <a:cxnSpLocks/>
             <a:stCxn id="39" idx="2"/>
             <a:endCxn id="35" idx="1"/>
           </p:cNvCxnSpPr>
@@ -4419,8 +4428,8 @@
         </p:nvCxnSpPr>
         <p:spPr>
           <a:xfrm rot="16200000" flipH="1">
-            <a:off x="1597249" y="3686901"/>
-            <a:ext cx="1814155" cy="176401"/>
+            <a:off x="2130362" y="3328297"/>
+            <a:ext cx="2462569" cy="290564"/>
           </a:xfrm>
           <a:prstGeom prst="bentConnector2">
             <a:avLst/>
@@ -4453,17 +4462,21 @@
         <p:nvCxnSpPr>
           <p:cNvPr id="53" name="Elbow Connector 63"/>
           <p:cNvCxnSpPr>
+            <a:cxnSpLocks/>
+            <a:stCxn id="2" idx="1"/>
             <a:endCxn id="38" idx="1"/>
           </p:cNvCxnSpPr>
           <p:nvPr/>
         </p:nvCxnSpPr>
         <p:spPr>
-          <a:xfrm rot="16200000" flipH="1">
-            <a:off x="1184119" y="3676012"/>
-            <a:ext cx="2396440" cy="420377"/>
-          </a:xfrm>
-          <a:prstGeom prst="bentConnector2">
-            <a:avLst/>
+          <a:xfrm rot="10800000" flipH="1" flipV="1">
+            <a:off x="2592168" y="1884020"/>
+            <a:ext cx="913032" cy="3252626"/>
+          </a:xfrm>
+          <a:prstGeom prst="bentConnector3">
+            <a:avLst>
+              <a:gd name="adj1" fmla="val -113085"/>
+            </a:avLst>
           </a:prstGeom>
           <a:ln w="19050">
             <a:solidFill>
@@ -4497,7 +4510,7 @@
         </p:nvSpPr>
         <p:spPr>
           <a:xfrm>
-            <a:off x="5143948" y="1770924"/>
+            <a:off x="6019629" y="1122039"/>
             <a:ext cx="772043" cy="346760"/>
           </a:xfrm>
           <a:prstGeom prst="rect">
@@ -4572,6 +4585,7 @@
         <p:nvCxnSpPr>
           <p:cNvPr id="74" name="Elbow Connector 63"/>
           <p:cNvCxnSpPr>
+            <a:cxnSpLocks/>
             <a:stCxn id="43" idx="3"/>
             <a:endCxn id="16" idx="3"/>
           </p:cNvCxnSpPr>
@@ -4579,8 +4593,8 @@
         </p:nvCxnSpPr>
         <p:spPr>
           <a:xfrm flipV="1">
-            <a:off x="3686160" y="2286000"/>
-            <a:ext cx="1843809" cy="1136729"/>
+            <a:off x="4693200" y="1637115"/>
+            <a:ext cx="1712450" cy="1808298"/>
           </a:xfrm>
           <a:prstGeom prst="bentConnector2">
             <a:avLst/>
@@ -4613,6 +4627,7 @@
         <p:nvCxnSpPr>
           <p:cNvPr id="77" name="Elbow Connector 63"/>
           <p:cNvCxnSpPr>
+            <a:cxnSpLocks/>
             <a:stCxn id="16" idx="3"/>
             <a:endCxn id="37" idx="3"/>
           </p:cNvCxnSpPr>
@@ -4620,8 +4635,8 @@
         </p:nvCxnSpPr>
         <p:spPr>
           <a:xfrm rot="5400000">
-            <a:off x="4174488" y="2991741"/>
-            <a:ext cx="2061222" cy="649740"/>
+            <a:off x="4894627" y="2863972"/>
+            <a:ext cx="2737880" cy="284166"/>
           </a:xfrm>
           <a:prstGeom prst="bentConnector2">
             <a:avLst/>
@@ -4654,6 +4669,7 @@
         <p:nvCxnSpPr>
           <p:cNvPr id="82" name="Elbow Connector 63"/>
           <p:cNvCxnSpPr>
+            <a:cxnSpLocks/>
             <a:stCxn id="16" idx="3"/>
             <a:endCxn id="34" idx="3"/>
           </p:cNvCxnSpPr>
@@ -4661,8 +4677,8 @@
         </p:nvCxnSpPr>
         <p:spPr>
           <a:xfrm rot="5400000">
-            <a:off x="3867176" y="2104987"/>
-            <a:ext cx="1481780" cy="1843806"/>
+            <a:off x="4473616" y="1858429"/>
+            <a:ext cx="2153349" cy="1710721"/>
           </a:xfrm>
           <a:prstGeom prst="bentConnector2">
             <a:avLst/>
@@ -4695,6 +4711,7 @@
         <p:nvCxnSpPr>
           <p:cNvPr id="88" name="Elbow Connector 63"/>
           <p:cNvCxnSpPr>
+            <a:cxnSpLocks/>
             <a:stCxn id="2" idx="3"/>
             <a:endCxn id="16" idx="3"/>
           </p:cNvCxnSpPr>
@@ -4702,8 +4719,8 @@
         </p:nvCxnSpPr>
         <p:spPr>
           <a:xfrm flipV="1">
-            <a:off x="3189583" y="2286000"/>
-            <a:ext cx="2340386" cy="228600"/>
+            <a:off x="3844863" y="1637115"/>
+            <a:ext cx="2560787" cy="246905"/>
           </a:xfrm>
           <a:prstGeom prst="bentConnector2">
             <a:avLst/>
@@ -4736,6 +4753,7 @@
         <p:nvCxnSpPr>
           <p:cNvPr id="91" name="Elbow Connector 63"/>
           <p:cNvCxnSpPr>
+            <a:cxnSpLocks/>
             <a:stCxn id="16" idx="3"/>
             <a:endCxn id="35" idx="3"/>
           </p:cNvCxnSpPr>
@@ -4743,8 +4761,8 @@
         </p:nvCxnSpPr>
         <p:spPr>
           <a:xfrm rot="5400000">
-            <a:off x="3409976" y="2562187"/>
-            <a:ext cx="2396180" cy="1843807"/>
+            <a:off x="4016415" y="2315628"/>
+            <a:ext cx="3067749" cy="1710722"/>
           </a:xfrm>
           <a:prstGeom prst="bentConnector2">
             <a:avLst/>
@@ -4777,6 +4795,7 @@
         <p:nvCxnSpPr>
           <p:cNvPr id="94" name="Elbow Connector 63"/>
           <p:cNvCxnSpPr>
+            <a:cxnSpLocks/>
             <a:stCxn id="16" idx="3"/>
             <a:endCxn id="38" idx="3"/>
           </p:cNvCxnSpPr>
@@ -4784,8 +4803,8 @@
         </p:nvCxnSpPr>
         <p:spPr>
           <a:xfrm rot="5400000">
-            <a:off x="3208856" y="2763307"/>
-            <a:ext cx="2798421" cy="1843806"/>
+            <a:off x="3799660" y="2530655"/>
+            <a:ext cx="3499531" cy="1712450"/>
           </a:xfrm>
           <a:prstGeom prst="bentConnector2">
             <a:avLst/>
@@ -4818,14 +4837,15 @@
         <p:nvCxnSpPr>
           <p:cNvPr id="107" name="Elbow Connector 106"/>
           <p:cNvCxnSpPr>
+            <a:cxnSpLocks/>
             <a:stCxn id="9" idx="0"/>
           </p:cNvCxnSpPr>
           <p:nvPr/>
         </p:nvCxnSpPr>
         <p:spPr>
           <a:xfrm rot="5400000" flipH="1" flipV="1">
-            <a:off x="4594921" y="-355061"/>
-            <a:ext cx="170724" cy="4081246"/>
+            <a:off x="5140007" y="-1010197"/>
+            <a:ext cx="213648" cy="4062843"/>
           </a:xfrm>
           <a:prstGeom prst="bentConnector2">
             <a:avLst/>
@@ -4863,8 +4883,8 @@
         </p:nvSpPr>
         <p:spPr>
           <a:xfrm rot="16200000">
-            <a:off x="6213739" y="4560376"/>
-            <a:ext cx="1371599" cy="328045"/>
+            <a:off x="6413576" y="4293675"/>
+            <a:ext cx="2057402" cy="328045"/>
           </a:xfrm>
           <a:prstGeom prst="roundRect">
             <a:avLst/>
@@ -4923,7 +4943,7 @@
         </p:nvSpPr>
         <p:spPr>
           <a:xfrm rot="16200000">
-            <a:off x="956202" y="2861202"/>
+            <a:off x="608531" y="2831348"/>
             <a:ext cx="1093635" cy="346760"/>
           </a:xfrm>
           <a:prstGeom prst="rect">
@@ -4993,7 +5013,7 @@
         </p:nvSpPr>
         <p:spPr>
           <a:xfrm flipV="1">
-            <a:off x="1367767" y="2286001"/>
+            <a:off x="1020096" y="2256147"/>
             <a:ext cx="270504" cy="175523"/>
           </a:xfrm>
           <a:prstGeom prst="triangle">
@@ -5037,6 +5057,7 @@
         <p:nvCxnSpPr>
           <p:cNvPr id="121" name="Elbow Connector 63"/>
           <p:cNvCxnSpPr>
+            <a:cxnSpLocks/>
             <a:stCxn id="9" idx="1"/>
             <a:endCxn id="120" idx="3"/>
           </p:cNvCxnSpPr>
@@ -5044,8 +5065,8 @@
         </p:nvCxnSpPr>
         <p:spPr>
           <a:xfrm rot="10800000" flipV="1">
-            <a:off x="1503020" y="1944303"/>
-            <a:ext cx="589823" cy="341697"/>
+            <a:off x="1155348" y="1301427"/>
+            <a:ext cx="1433714" cy="954719"/>
           </a:xfrm>
           <a:prstGeom prst="bentConnector2">
             <a:avLst/>
@@ -5079,6 +5100,7 @@
         <p:nvCxnSpPr>
           <p:cNvPr id="131" name="Elbow Connector 130"/>
           <p:cNvCxnSpPr>
+            <a:cxnSpLocks/>
             <a:stCxn id="39" idx="2"/>
             <a:endCxn id="43" idx="1"/>
           </p:cNvCxnSpPr>
@@ -5086,8 +5108,8 @@
         </p:nvCxnSpPr>
         <p:spPr>
           <a:xfrm rot="16200000" flipH="1">
-            <a:off x="2226110" y="3058040"/>
-            <a:ext cx="554704" cy="174673"/>
+            <a:off x="2759223" y="2699436"/>
+            <a:ext cx="1203118" cy="288836"/>
           </a:xfrm>
           <a:prstGeom prst="bentConnector2">
             <a:avLst/>
@@ -5120,6 +5142,7 @@
         <p:nvCxnSpPr>
           <p:cNvPr id="132" name="Elbow Connector 63"/>
           <p:cNvCxnSpPr>
+            <a:cxnSpLocks/>
             <a:stCxn id="16" idx="3"/>
             <a:endCxn id="3" idx="3"/>
           </p:cNvCxnSpPr>
@@ -5127,8 +5150,8 @@
         </p:nvCxnSpPr>
         <p:spPr>
           <a:xfrm rot="5400000">
-            <a:off x="4205956" y="1766207"/>
-            <a:ext cx="804221" cy="1843806"/>
+            <a:off x="4812395" y="1519650"/>
+            <a:ext cx="1475790" cy="1710721"/>
           </a:xfrm>
           <a:prstGeom prst="bentConnector2">
             <a:avLst/>
@@ -5161,6 +5184,7 @@
         <p:nvCxnSpPr>
           <p:cNvPr id="137" name="Elbow Connector 136"/>
           <p:cNvCxnSpPr>
+            <a:cxnSpLocks/>
             <a:stCxn id="36" idx="2"/>
             <a:endCxn id="37" idx="1"/>
           </p:cNvCxnSpPr>
@@ -5168,8 +5192,8 @@
         </p:nvCxnSpPr>
         <p:spPr>
           <a:xfrm rot="16200000" flipH="1">
-            <a:off x="3430123" y="3938021"/>
-            <a:ext cx="118421" cy="699979"/>
+            <a:off x="4455450" y="3896961"/>
+            <a:ext cx="123510" cy="832557"/>
           </a:xfrm>
           <a:prstGeom prst="bentConnector2">
             <a:avLst/>
@@ -5202,6 +5226,7 @@
         <p:nvCxnSpPr>
           <p:cNvPr id="140" name="Elbow Connector 63"/>
           <p:cNvCxnSpPr>
+            <a:cxnSpLocks/>
             <a:stCxn id="16" idx="3"/>
             <a:endCxn id="36" idx="3"/>
           </p:cNvCxnSpPr>
@@ -5209,8 +5234,8 @@
         </p:nvCxnSpPr>
         <p:spPr>
           <a:xfrm rot="5400000">
-            <a:off x="3695875" y="2276286"/>
-            <a:ext cx="1824381" cy="1843808"/>
+            <a:off x="4302314" y="2029729"/>
+            <a:ext cx="2495950" cy="1710723"/>
           </a:xfrm>
           <a:prstGeom prst="bentConnector2">
             <a:avLst/>
@@ -5247,7 +5272,7 @@
         </p:nvSpPr>
         <p:spPr>
           <a:xfrm>
-            <a:off x="5435896" y="2743200"/>
+            <a:off x="6293849" y="4538303"/>
             <a:ext cx="229325" cy="166560"/>
           </a:xfrm>
           <a:prstGeom prst="rect">
@@ -5294,14 +5319,67 @@
       </p:sp>
       <p:sp>
         <p:nvSpPr>
+          <p:cNvPr id="144" name="Rectangle 143"/>
+          <p:cNvSpPr/>
+          <p:nvPr/>
+        </p:nvSpPr>
+        <p:spPr>
+          <a:xfrm>
+            <a:off x="6293849" y="2711814"/>
+            <a:ext cx="229325" cy="160062"/>
+          </a:xfrm>
+          <a:prstGeom prst="rect">
+            <a:avLst/>
+          </a:prstGeom>
+          <a:solidFill>
+            <a:schemeClr val="accent3">
+              <a:lumMod val="20000"/>
+              <a:lumOff val="80000"/>
+              <a:alpha val="80000"/>
+            </a:schemeClr>
+          </a:solidFill>
+          <a:ln>
+            <a:noFill/>
+          </a:ln>
+          <a:effectLst>
+            <a:softEdge rad="31750"/>
+          </a:effectLst>
+        </p:spPr>
+        <p:style>
+          <a:lnRef idx="2">
+            <a:schemeClr val="accent1">
+              <a:shade val="50000"/>
+            </a:schemeClr>
+          </a:lnRef>
+          <a:fillRef idx="1">
+            <a:schemeClr val="accent1"/>
+          </a:fillRef>
+          <a:effectRef idx="0">
+            <a:schemeClr val="accent1"/>
+          </a:effectRef>
+          <a:fontRef idx="minor">
+            <a:schemeClr val="lt1"/>
+          </a:fontRef>
+        </p:style>
+        <p:txBody>
+          <a:bodyPr rtlCol="0" anchor="ctr"/>
+          <a:lstStyle/>
+          <a:p>
+            <a:pPr algn="ctr"/>
+            <a:endParaRPr lang="en-SG"/>
+          </a:p>
+        </p:txBody>
+      </p:sp>
+      <p:sp>
+        <p:nvSpPr>
           <p:cNvPr id="116" name="Freeform 115"/>
           <p:cNvSpPr/>
           <p:nvPr/>
         </p:nvSpPr>
         <p:spPr>
           <a:xfrm>
-            <a:off x="3687515" y="2828802"/>
-            <a:ext cx="3048000" cy="203200"/>
+            <a:off x="4445940" y="2752556"/>
+            <a:ext cx="2826148" cy="239382"/>
           </a:xfrm>
           <a:custGeom>
             <a:avLst/>
@@ -5376,67 +5454,14 @@
       </p:sp>
       <p:sp>
         <p:nvSpPr>
-          <p:cNvPr id="144" name="Rectangle 143"/>
-          <p:cNvSpPr/>
-          <p:nvPr/>
-        </p:nvSpPr>
-        <p:spPr>
-          <a:xfrm>
-            <a:off x="5431573" y="4488138"/>
-            <a:ext cx="229325" cy="160062"/>
-          </a:xfrm>
-          <a:prstGeom prst="rect">
-            <a:avLst/>
-          </a:prstGeom>
-          <a:solidFill>
-            <a:schemeClr val="accent3">
-              <a:lumMod val="20000"/>
-              <a:lumOff val="80000"/>
-              <a:alpha val="80000"/>
-            </a:schemeClr>
-          </a:solidFill>
-          <a:ln>
-            <a:noFill/>
-          </a:ln>
-          <a:effectLst>
-            <a:softEdge rad="31750"/>
-          </a:effectLst>
-        </p:spPr>
-        <p:style>
-          <a:lnRef idx="2">
-            <a:schemeClr val="accent1">
-              <a:shade val="50000"/>
-            </a:schemeClr>
-          </a:lnRef>
-          <a:fillRef idx="1">
-            <a:schemeClr val="accent1"/>
-          </a:fillRef>
-          <a:effectRef idx="0">
-            <a:schemeClr val="accent1"/>
-          </a:effectRef>
-          <a:fontRef idx="minor">
-            <a:schemeClr val="lt1"/>
-          </a:fontRef>
-        </p:style>
-        <p:txBody>
-          <a:bodyPr rtlCol="0" anchor="ctr"/>
-          <a:lstStyle/>
-          <a:p>
-            <a:pPr algn="ctr"/>
-            <a:endParaRPr lang="en-SG"/>
-          </a:p>
-        </p:txBody>
-      </p:sp>
-      <p:sp>
-        <p:nvSpPr>
           <p:cNvPr id="118" name="Freeform 117"/>
           <p:cNvSpPr/>
           <p:nvPr/>
         </p:nvSpPr>
         <p:spPr>
           <a:xfrm flipV="1">
-            <a:off x="4114799" y="4472708"/>
-            <a:ext cx="2642195" cy="101600"/>
+            <a:off x="5191200" y="4510819"/>
+            <a:ext cx="2090488" cy="106104"/>
           </a:xfrm>
           <a:custGeom>
             <a:avLst/>
@@ -5509,6 +5534,385 @@
           </a:p>
         </p:txBody>
       </p:sp>
+      <p:sp>
+        <p:nvSpPr>
+          <p:cNvPr id="42" name="Rectangle 11">
+            <a:extLst>
+              <a:ext uri="{FF2B5EF4-FFF2-40B4-BE49-F238E27FC236}">
+                <a16:creationId xmlns:a16="http://schemas.microsoft.com/office/drawing/2014/main" id="{BA6C2568-3196-4CB5-8611-6D5E0271621D}"/>
+              </a:ext>
+            </a:extLst>
+          </p:cNvPr>
+          <p:cNvSpPr/>
+          <p:nvPr/>
+        </p:nvSpPr>
+        <p:spPr>
+          <a:xfrm>
+            <a:off x="1720611" y="2667000"/>
+            <a:ext cx="1188000" cy="236841"/>
+          </a:xfrm>
+          <a:prstGeom prst="rect">
+            <a:avLst/>
+          </a:prstGeom>
+          <a:ln w="19050">
+            <a:solidFill>
+              <a:schemeClr val="accent3"/>
+            </a:solidFill>
+          </a:ln>
+          <a:effectLst/>
+        </p:spPr>
+        <p:style>
+          <a:lnRef idx="1">
+            <a:schemeClr val="accent3"/>
+          </a:lnRef>
+          <a:fillRef idx="2">
+            <a:schemeClr val="accent3"/>
+          </a:fillRef>
+          <a:effectRef idx="1">
+            <a:schemeClr val="accent3"/>
+          </a:effectRef>
+          <a:fontRef idx="minor">
+            <a:schemeClr val="dk1"/>
+          </a:fontRef>
+        </p:style>
+        <p:txBody>
+          <a:bodyPr rtlCol="0" anchor="ctr"/>
+          <a:lstStyle/>
+          <a:p>
+            <a:pPr algn="ctr"/>
+            <a:r>
+              <a:rPr lang="en-US" sz="1050" b="1" dirty="0" err="1">
+                <a:solidFill>
+                  <a:schemeClr val="accent3">
+                    <a:lumMod val="75000"/>
+                  </a:schemeClr>
+                </a:solidFill>
+              </a:rPr>
+              <a:t>KeyListener</a:t>
+            </a:r>
+            <a:endParaRPr lang="en-SG" sz="1050" b="1" dirty="0">
+              <a:solidFill>
+                <a:schemeClr val="accent3">
+                  <a:lumMod val="75000"/>
+                </a:schemeClr>
+              </a:solidFill>
+            </a:endParaRPr>
+          </a:p>
+        </p:txBody>
+      </p:sp>
+      <p:cxnSp>
+        <p:nvCxnSpPr>
+          <p:cNvPr id="63" name="Elbow Connector 63">
+            <a:extLst>
+              <a:ext uri="{FF2B5EF4-FFF2-40B4-BE49-F238E27FC236}">
+                <a16:creationId xmlns:a16="http://schemas.microsoft.com/office/drawing/2014/main" id="{90E00371-C5F3-41F3-B795-A4CDF24132E9}"/>
+              </a:ext>
+            </a:extLst>
+          </p:cNvPr>
+          <p:cNvCxnSpPr>
+            <a:cxnSpLocks/>
+            <a:stCxn id="39" idx="2"/>
+            <a:endCxn id="42" idx="0"/>
+          </p:cNvCxnSpPr>
+          <p:nvPr/>
+        </p:nvCxnSpPr>
+        <p:spPr>
+          <a:xfrm rot="5400000">
+            <a:off x="2553136" y="2003771"/>
+            <a:ext cx="424705" cy="901753"/>
+          </a:xfrm>
+          <a:prstGeom prst="bentConnector3">
+            <a:avLst>
+              <a:gd name="adj1" fmla="val 50000"/>
+            </a:avLst>
+          </a:prstGeom>
+          <a:ln w="19050">
+            <a:solidFill>
+              <a:schemeClr val="accent3"/>
+            </a:solidFill>
+            <a:headEnd type="none" w="med" len="med"/>
+            <a:tailEnd type="arrow" w="med" len="med"/>
+          </a:ln>
+          <a:effectLst/>
+        </p:spPr>
+        <p:style>
+          <a:lnRef idx="1">
+            <a:schemeClr val="accent2"/>
+          </a:lnRef>
+          <a:fillRef idx="2">
+            <a:schemeClr val="accent2"/>
+          </a:fillRef>
+          <a:effectRef idx="1">
+            <a:schemeClr val="accent2"/>
+          </a:effectRef>
+          <a:fontRef idx="minor">
+            <a:schemeClr val="dk1"/>
+          </a:fontRef>
+        </p:style>
+      </p:cxnSp>
+      <p:cxnSp>
+        <p:nvCxnSpPr>
+          <p:cNvPr id="249" name="Elbow Connector 63">
+            <a:extLst>
+              <a:ext uri="{FF2B5EF4-FFF2-40B4-BE49-F238E27FC236}">
+                <a16:creationId xmlns:a16="http://schemas.microsoft.com/office/drawing/2014/main" id="{4670A71F-BB7E-4C9E-A295-E5E088252918}"/>
+              </a:ext>
+            </a:extLst>
+          </p:cNvPr>
+          <p:cNvCxnSpPr>
+            <a:cxnSpLocks/>
+            <a:stCxn id="42" idx="2"/>
+            <a:endCxn id="36" idx="1"/>
+          </p:cNvCxnSpPr>
+          <p:nvPr/>
+        </p:nvCxnSpPr>
+        <p:spPr>
+          <a:xfrm rot="16200000" flipH="1">
+            <a:off x="2296157" y="2922295"/>
+            <a:ext cx="1229224" cy="1192316"/>
+          </a:xfrm>
+          <a:prstGeom prst="bentConnector2">
+            <a:avLst/>
+          </a:prstGeom>
+          <a:ln w="19050">
+            <a:solidFill>
+              <a:schemeClr val="accent3"/>
+            </a:solidFill>
+            <a:headEnd type="none" w="med" len="med"/>
+            <a:tailEnd type="arrow" w="med" len="med"/>
+          </a:ln>
+          <a:effectLst/>
+        </p:spPr>
+        <p:style>
+          <a:lnRef idx="1">
+            <a:schemeClr val="accent2"/>
+          </a:lnRef>
+          <a:fillRef idx="2">
+            <a:schemeClr val="accent2"/>
+          </a:fillRef>
+          <a:effectRef idx="1">
+            <a:schemeClr val="accent2"/>
+          </a:effectRef>
+          <a:fontRef idx="minor">
+            <a:schemeClr val="dk1"/>
+          </a:fontRef>
+        </p:style>
+      </p:cxnSp>
+      <p:cxnSp>
+        <p:nvCxnSpPr>
+          <p:cNvPr id="255" name="Elbow Connector 63">
+            <a:extLst>
+              <a:ext uri="{FF2B5EF4-FFF2-40B4-BE49-F238E27FC236}">
+                <a16:creationId xmlns:a16="http://schemas.microsoft.com/office/drawing/2014/main" id="{13BCB348-5D6E-4DFB-9109-F47FA16F3500}"/>
+              </a:ext>
+            </a:extLst>
+          </p:cNvPr>
+          <p:cNvCxnSpPr>
+            <a:cxnSpLocks/>
+            <a:stCxn id="42" idx="2"/>
+            <a:endCxn id="3" idx="1"/>
+          </p:cNvCxnSpPr>
+          <p:nvPr/>
+        </p:nvCxnSpPr>
+        <p:spPr>
+          <a:xfrm rot="16200000" flipH="1">
+            <a:off x="2806238" y="2412214"/>
+            <a:ext cx="209064" cy="1192318"/>
+          </a:xfrm>
+          <a:prstGeom prst="bentConnector2">
+            <a:avLst/>
+          </a:prstGeom>
+          <a:ln w="19050">
+            <a:solidFill>
+              <a:schemeClr val="accent3"/>
+            </a:solidFill>
+            <a:headEnd type="none" w="med" len="med"/>
+            <a:tailEnd type="arrow" w="med" len="med"/>
+          </a:ln>
+          <a:effectLst/>
+        </p:spPr>
+        <p:style>
+          <a:lnRef idx="1">
+            <a:schemeClr val="accent2"/>
+          </a:lnRef>
+          <a:fillRef idx="2">
+            <a:schemeClr val="accent2"/>
+          </a:fillRef>
+          <a:effectRef idx="1">
+            <a:schemeClr val="accent2"/>
+          </a:effectRef>
+          <a:fontRef idx="minor">
+            <a:schemeClr val="dk1"/>
+          </a:fontRef>
+        </p:style>
+      </p:cxnSp>
+      <p:sp>
+        <p:nvSpPr>
+          <p:cNvPr id="282" name="Rectangle 281">
+            <a:extLst>
+              <a:ext uri="{FF2B5EF4-FFF2-40B4-BE49-F238E27FC236}">
+                <a16:creationId xmlns:a16="http://schemas.microsoft.com/office/drawing/2014/main" id="{23BDF593-3F49-4BB6-8F10-69DF04E12E17}"/>
+              </a:ext>
+            </a:extLst>
+          </p:cNvPr>
+          <p:cNvSpPr/>
+          <p:nvPr/>
+        </p:nvSpPr>
+        <p:spPr>
+          <a:xfrm>
+            <a:off x="3090947" y="2679659"/>
+            <a:ext cx="229325" cy="160062"/>
+          </a:xfrm>
+          <a:prstGeom prst="rect">
+            <a:avLst/>
+          </a:prstGeom>
+          <a:solidFill>
+            <a:schemeClr val="accent3">
+              <a:lumMod val="20000"/>
+              <a:lumOff val="80000"/>
+              <a:alpha val="80000"/>
+            </a:schemeClr>
+          </a:solidFill>
+          <a:ln>
+            <a:noFill/>
+          </a:ln>
+          <a:effectLst>
+            <a:softEdge rad="31750"/>
+          </a:effectLst>
+        </p:spPr>
+        <p:style>
+          <a:lnRef idx="2">
+            <a:schemeClr val="accent1">
+              <a:shade val="50000"/>
+            </a:schemeClr>
+          </a:lnRef>
+          <a:fillRef idx="1">
+            <a:schemeClr val="accent1"/>
+          </a:fillRef>
+          <a:effectRef idx="0">
+            <a:schemeClr val="accent1"/>
+          </a:effectRef>
+          <a:fontRef idx="minor">
+            <a:schemeClr val="lt1"/>
+          </a:fontRef>
+        </p:style>
+        <p:txBody>
+          <a:bodyPr rtlCol="0" anchor="ctr"/>
+          <a:lstStyle/>
+          <a:p>
+            <a:pPr algn="ctr"/>
+            <a:endParaRPr lang="en-SG"/>
+          </a:p>
+        </p:txBody>
+      </p:sp>
+      <p:sp>
+        <p:nvSpPr>
+          <p:cNvPr id="294" name="Rectangle 293">
+            <a:extLst>
+              <a:ext uri="{FF2B5EF4-FFF2-40B4-BE49-F238E27FC236}">
+                <a16:creationId xmlns:a16="http://schemas.microsoft.com/office/drawing/2014/main" id="{7EB60FF5-6921-42A9-85CB-D09585A0C358}"/>
+              </a:ext>
+            </a:extLst>
+          </p:cNvPr>
+          <p:cNvSpPr/>
+          <p:nvPr/>
+        </p:nvSpPr>
+        <p:spPr>
+          <a:xfrm>
+            <a:off x="6293849" y="2666730"/>
+            <a:ext cx="229325" cy="166560"/>
+          </a:xfrm>
+          <a:prstGeom prst="rect">
+            <a:avLst/>
+          </a:prstGeom>
+          <a:solidFill>
+            <a:schemeClr val="accent3">
+              <a:lumMod val="20000"/>
+              <a:lumOff val="80000"/>
+              <a:alpha val="80000"/>
+            </a:schemeClr>
+          </a:solidFill>
+          <a:ln>
+            <a:noFill/>
+          </a:ln>
+          <a:effectLst>
+            <a:softEdge rad="31750"/>
+          </a:effectLst>
+        </p:spPr>
+        <p:style>
+          <a:lnRef idx="2">
+            <a:schemeClr val="accent1">
+              <a:shade val="50000"/>
+            </a:schemeClr>
+          </a:lnRef>
+          <a:fillRef idx="1">
+            <a:schemeClr val="accent1"/>
+          </a:fillRef>
+          <a:effectRef idx="0">
+            <a:schemeClr val="accent1"/>
+          </a:effectRef>
+          <a:fontRef idx="minor">
+            <a:schemeClr val="lt1"/>
+          </a:fontRef>
+        </p:style>
+        <p:txBody>
+          <a:bodyPr rtlCol="0" anchor="ctr"/>
+          <a:lstStyle/>
+          <a:p>
+            <a:pPr algn="ctr"/>
+            <a:endParaRPr lang="en-SG"/>
+          </a:p>
+        </p:txBody>
+      </p:sp>
+      <p:cxnSp>
+        <p:nvCxnSpPr>
+          <p:cNvPr id="297" name="Elbow Connector 63">
+            <a:extLst>
+              <a:ext uri="{FF2B5EF4-FFF2-40B4-BE49-F238E27FC236}">
+                <a16:creationId xmlns:a16="http://schemas.microsoft.com/office/drawing/2014/main" id="{3665886F-36DA-4176-92E4-CBDB0221EB2A}"/>
+              </a:ext>
+            </a:extLst>
+          </p:cNvPr>
+          <p:cNvCxnSpPr>
+            <a:cxnSpLocks/>
+            <a:stCxn id="42" idx="3"/>
+          </p:cNvCxnSpPr>
+          <p:nvPr/>
+        </p:nvCxnSpPr>
+        <p:spPr>
+          <a:xfrm flipV="1">
+            <a:off x="2908611" y="2753288"/>
+            <a:ext cx="4376223" cy="32133"/>
+          </a:xfrm>
+          <a:prstGeom prst="bentConnector3">
+            <a:avLst>
+              <a:gd name="adj1" fmla="val 9"/>
+            </a:avLst>
+          </a:prstGeom>
+          <a:ln w="19050">
+            <a:solidFill>
+              <a:schemeClr val="accent3"/>
+            </a:solidFill>
+            <a:headEnd type="none" w="med" len="med"/>
+            <a:tailEnd type="arrow" w="med" len="med"/>
+          </a:ln>
+          <a:effectLst/>
+        </p:spPr>
+        <p:style>
+          <a:lnRef idx="1">
+            <a:schemeClr val="accent2"/>
+          </a:lnRef>
+          <a:fillRef idx="2">
+            <a:schemeClr val="accent2"/>
+          </a:fillRef>
+          <a:effectRef idx="1">
+            <a:schemeClr val="accent2"/>
+          </a:effectRef>
+          <a:fontRef idx="minor">
+            <a:schemeClr val="dk1"/>
+          </a:fontRef>
+        </p:style>
+      </p:cxnSp>
     </p:spTree>
     <p:extLst>
       <p:ext uri="{BB962C8B-B14F-4D97-AF65-F5344CB8AC3E}">

</xml_diff>

<commit_message>
Update developer guide for integrated graph display
</commit_message>
<xml_diff>
--- a/docs/diagrams/UiComponentClassDiagram.pptx
+++ b/docs/diagrams/UiComponentClassDiagram.pptx
@@ -208,7 +208,7 @@
           <a:p>
             <a:fld id="{F5CC4B3F-88C1-4FFA-B1B6-F41C21DC6924}" type="datetimeFigureOut">
               <a:rPr lang="en-US" smtClean="0"/>
-              <a:t>1/7/2017</a:t>
+              <a:t>11/1/17</a:t>
             </a:fld>
             <a:endParaRPr lang="en-US"/>
           </a:p>
@@ -654,7 +654,7 @@
           <a:p>
             <a:fld id="{78C97017-6FC3-485B-9764-EAC9E56C1D49}" type="datetimeFigureOut">
               <a:rPr lang="en-US" smtClean="0"/>
-              <a:t>1/7/2017</a:t>
+              <a:t>11/1/17</a:t>
             </a:fld>
             <a:endParaRPr lang="en-US"/>
           </a:p>
@@ -822,7 +822,7 @@
           <a:p>
             <a:fld id="{78C97017-6FC3-485B-9764-EAC9E56C1D49}" type="datetimeFigureOut">
               <a:rPr lang="en-US" smtClean="0"/>
-              <a:t>1/7/2017</a:t>
+              <a:t>11/1/17</a:t>
             </a:fld>
             <a:endParaRPr lang="en-US"/>
           </a:p>
@@ -1000,7 +1000,7 @@
           <a:p>
             <a:fld id="{78C97017-6FC3-485B-9764-EAC9E56C1D49}" type="datetimeFigureOut">
               <a:rPr lang="en-US" smtClean="0"/>
-              <a:t>1/7/2017</a:t>
+              <a:t>11/1/17</a:t>
             </a:fld>
             <a:endParaRPr lang="en-US"/>
           </a:p>
@@ -1168,7 +1168,7 @@
           <a:p>
             <a:fld id="{78C97017-6FC3-485B-9764-EAC9E56C1D49}" type="datetimeFigureOut">
               <a:rPr lang="en-US" smtClean="0"/>
-              <a:t>1/7/2017</a:t>
+              <a:t>11/1/17</a:t>
             </a:fld>
             <a:endParaRPr lang="en-US"/>
           </a:p>
@@ -1413,7 +1413,7 @@
           <a:p>
             <a:fld id="{78C97017-6FC3-485B-9764-EAC9E56C1D49}" type="datetimeFigureOut">
               <a:rPr lang="en-US" smtClean="0"/>
-              <a:t>1/7/2017</a:t>
+              <a:t>11/1/17</a:t>
             </a:fld>
             <a:endParaRPr lang="en-US"/>
           </a:p>
@@ -1698,7 +1698,7 @@
           <a:p>
             <a:fld id="{78C97017-6FC3-485B-9764-EAC9E56C1D49}" type="datetimeFigureOut">
               <a:rPr lang="en-US" smtClean="0"/>
-              <a:t>1/7/2017</a:t>
+              <a:t>11/1/17</a:t>
             </a:fld>
             <a:endParaRPr lang="en-US"/>
           </a:p>
@@ -2117,7 +2117,7 @@
           <a:p>
             <a:fld id="{78C97017-6FC3-485B-9764-EAC9E56C1D49}" type="datetimeFigureOut">
               <a:rPr lang="en-US" smtClean="0"/>
-              <a:t>1/7/2017</a:t>
+              <a:t>11/1/17</a:t>
             </a:fld>
             <a:endParaRPr lang="en-US"/>
           </a:p>
@@ -2234,7 +2234,7 @@
           <a:p>
             <a:fld id="{78C97017-6FC3-485B-9764-EAC9E56C1D49}" type="datetimeFigureOut">
               <a:rPr lang="en-US" smtClean="0"/>
-              <a:t>1/7/2017</a:t>
+              <a:t>11/1/17</a:t>
             </a:fld>
             <a:endParaRPr lang="en-US"/>
           </a:p>
@@ -2329,7 +2329,7 @@
           <a:p>
             <a:fld id="{78C97017-6FC3-485B-9764-EAC9E56C1D49}" type="datetimeFigureOut">
               <a:rPr lang="en-US" smtClean="0"/>
-              <a:t>1/7/2017</a:t>
+              <a:t>11/1/17</a:t>
             </a:fld>
             <a:endParaRPr lang="en-US"/>
           </a:p>
@@ -2604,7 +2604,7 @@
           <a:p>
             <a:fld id="{78C97017-6FC3-485B-9764-EAC9E56C1D49}" type="datetimeFigureOut">
               <a:rPr lang="en-US" smtClean="0"/>
-              <a:t>1/7/2017</a:t>
+              <a:t>11/1/17</a:t>
             </a:fld>
             <a:endParaRPr lang="en-US"/>
           </a:p>
@@ -2856,7 +2856,7 @@
           <a:p>
             <a:fld id="{78C97017-6FC3-485B-9764-EAC9E56C1D49}" type="datetimeFigureOut">
               <a:rPr lang="en-US" smtClean="0"/>
-              <a:t>1/7/2017</a:t>
+              <a:t>11/1/17</a:t>
             </a:fld>
             <a:endParaRPr lang="en-US"/>
           </a:p>
@@ -3067,7 +3067,7 @@
           <a:p>
             <a:fld id="{78C97017-6FC3-485B-9764-EAC9E56C1D49}" type="datetimeFigureOut">
               <a:rPr lang="en-US" smtClean="0"/>
-              <a:t>1/7/2017</a:t>
+              <a:t>11/1/17</a:t>
             </a:fld>
             <a:endParaRPr lang="en-US"/>
           </a:p>
@@ -3918,14 +3918,14 @@
           <a:p>
             <a:pPr algn="ctr"/>
             <a:r>
-              <a:rPr lang="en-US" sz="1050" b="1" dirty="0" err="1">
+              <a:rPr lang="en-US" sz="1050" b="1" dirty="0" err="1" smtClean="0">
                 <a:solidFill>
                   <a:schemeClr val="accent3">
                     <a:lumMod val="75000"/>
                   </a:schemeClr>
                 </a:solidFill>
               </a:rPr>
-              <a:t>BrowserPanel</a:t>
+              <a:t>GraphDisplay</a:t>
             </a:r>
             <a:endParaRPr lang="en-SG" sz="1050" b="1" dirty="0">
               <a:solidFill>

</xml_diff>

<commit_message>
UGDG v1.5: added remarks sequence diagra, updated ui componenet and graphs segment
</commit_message>
<xml_diff>
--- a/docs/diagrams/UiComponentClassDiagram.pptx
+++ b/docs/diagrams/UiComponentClassDiagram.pptx
@@ -109,7 +109,7 @@
   </p:defaultTextStyle>
   <p:extLst>
     <p:ext uri="{EFAFB233-063F-42B5-8137-9DF3F51BA10A}">
-      <p15:sldGuideLst xmlns:p15="http://schemas.microsoft.com/office/powerpoint/2012/main">
+      <p15:sldGuideLst xmlns:p15="http://schemas.microsoft.com/office/powerpoint/2012/main" xmlns="">
         <p15:guide id="1" orient="horz" pos="1488">
           <p15:clr>
             <a:srgbClr val="A4A3A4"/>
@@ -208,7 +208,7 @@
           <a:p>
             <a:fld id="{F5CC4B3F-88C1-4FFA-B1B6-F41C21DC6924}" type="datetimeFigureOut">
               <a:rPr lang="en-US" smtClean="0"/>
-              <a:t>1/7/2017</a:t>
+              <a:t>11/3/2017</a:t>
             </a:fld>
             <a:endParaRPr lang="en-US"/>
           </a:p>
@@ -654,7 +654,7 @@
           <a:p>
             <a:fld id="{78C97017-6FC3-485B-9764-EAC9E56C1D49}" type="datetimeFigureOut">
               <a:rPr lang="en-US" smtClean="0"/>
-              <a:t>1/7/2017</a:t>
+              <a:t>11/3/2017</a:t>
             </a:fld>
             <a:endParaRPr lang="en-US"/>
           </a:p>
@@ -822,7 +822,7 @@
           <a:p>
             <a:fld id="{78C97017-6FC3-485B-9764-EAC9E56C1D49}" type="datetimeFigureOut">
               <a:rPr lang="en-US" smtClean="0"/>
-              <a:t>1/7/2017</a:t>
+              <a:t>11/3/2017</a:t>
             </a:fld>
             <a:endParaRPr lang="en-US"/>
           </a:p>
@@ -1000,7 +1000,7 @@
           <a:p>
             <a:fld id="{78C97017-6FC3-485B-9764-EAC9E56C1D49}" type="datetimeFigureOut">
               <a:rPr lang="en-US" smtClean="0"/>
-              <a:t>1/7/2017</a:t>
+              <a:t>11/3/2017</a:t>
             </a:fld>
             <a:endParaRPr lang="en-US"/>
           </a:p>
@@ -1168,7 +1168,7 @@
           <a:p>
             <a:fld id="{78C97017-6FC3-485B-9764-EAC9E56C1D49}" type="datetimeFigureOut">
               <a:rPr lang="en-US" smtClean="0"/>
-              <a:t>1/7/2017</a:t>
+              <a:t>11/3/2017</a:t>
             </a:fld>
             <a:endParaRPr lang="en-US"/>
           </a:p>
@@ -1413,7 +1413,7 @@
           <a:p>
             <a:fld id="{78C97017-6FC3-485B-9764-EAC9E56C1D49}" type="datetimeFigureOut">
               <a:rPr lang="en-US" smtClean="0"/>
-              <a:t>1/7/2017</a:t>
+              <a:t>11/3/2017</a:t>
             </a:fld>
             <a:endParaRPr lang="en-US"/>
           </a:p>
@@ -1698,7 +1698,7 @@
           <a:p>
             <a:fld id="{78C97017-6FC3-485B-9764-EAC9E56C1D49}" type="datetimeFigureOut">
               <a:rPr lang="en-US" smtClean="0"/>
-              <a:t>1/7/2017</a:t>
+              <a:t>11/3/2017</a:t>
             </a:fld>
             <a:endParaRPr lang="en-US"/>
           </a:p>
@@ -2117,7 +2117,7 @@
           <a:p>
             <a:fld id="{78C97017-6FC3-485B-9764-EAC9E56C1D49}" type="datetimeFigureOut">
               <a:rPr lang="en-US" smtClean="0"/>
-              <a:t>1/7/2017</a:t>
+              <a:t>11/3/2017</a:t>
             </a:fld>
             <a:endParaRPr lang="en-US"/>
           </a:p>
@@ -2234,7 +2234,7 @@
           <a:p>
             <a:fld id="{78C97017-6FC3-485B-9764-EAC9E56C1D49}" type="datetimeFigureOut">
               <a:rPr lang="en-US" smtClean="0"/>
-              <a:t>1/7/2017</a:t>
+              <a:t>11/3/2017</a:t>
             </a:fld>
             <a:endParaRPr lang="en-US"/>
           </a:p>
@@ -2329,7 +2329,7 @@
           <a:p>
             <a:fld id="{78C97017-6FC3-485B-9764-EAC9E56C1D49}" type="datetimeFigureOut">
               <a:rPr lang="en-US" smtClean="0"/>
-              <a:t>1/7/2017</a:t>
+              <a:t>11/3/2017</a:t>
             </a:fld>
             <a:endParaRPr lang="en-US"/>
           </a:p>
@@ -2604,7 +2604,7 @@
           <a:p>
             <a:fld id="{78C97017-6FC3-485B-9764-EAC9E56C1D49}" type="datetimeFigureOut">
               <a:rPr lang="en-US" smtClean="0"/>
-              <a:t>1/7/2017</a:t>
+              <a:t>11/3/2017</a:t>
             </a:fld>
             <a:endParaRPr lang="en-US"/>
           </a:p>
@@ -2856,7 +2856,7 @@
           <a:p>
             <a:fld id="{78C97017-6FC3-485B-9764-EAC9E56C1D49}" type="datetimeFigureOut">
               <a:rPr lang="en-US" smtClean="0"/>
-              <a:t>1/7/2017</a:t>
+              <a:t>11/3/2017</a:t>
             </a:fld>
             <a:endParaRPr lang="en-US"/>
           </a:p>
@@ -3067,7 +3067,7 @@
           <a:p>
             <a:fld id="{78C97017-6FC3-485B-9764-EAC9E56C1D49}" type="datetimeFigureOut">
               <a:rPr lang="en-US" smtClean="0"/>
-              <a:t>1/7/2017</a:t>
+              <a:t>11/3/2017</a:t>
             </a:fld>
             <a:endParaRPr lang="en-US"/>
           </a:p>
@@ -3512,7 +3512,7 @@
         </p:nvSpPr>
         <p:spPr>
           <a:xfrm>
-            <a:off x="2095948" y="2341220"/>
+            <a:off x="2095948" y="2277212"/>
             <a:ext cx="1093635" cy="346760"/>
           </a:xfrm>
           <a:prstGeom prst="rect">
@@ -3572,7 +3572,7 @@
         </p:nvSpPr>
         <p:spPr>
           <a:xfrm>
-            <a:off x="2592528" y="2971800"/>
+            <a:off x="2568732" y="2776584"/>
             <a:ext cx="1093635" cy="236841"/>
           </a:xfrm>
           <a:prstGeom prst="rect">
@@ -3694,8 +3694,8 @@
         </p:nvCxnSpPr>
         <p:spPr>
           <a:xfrm rot="16200000" flipH="1">
-            <a:off x="2529445" y="2227899"/>
-            <a:ext cx="223536" cy="3106"/>
+            <a:off x="2561449" y="2195895"/>
+            <a:ext cx="159528" cy="3106"/>
           </a:xfrm>
           <a:prstGeom prst="bentConnector3">
             <a:avLst>
@@ -3885,8 +3885,8 @@
         </p:nvSpPr>
         <p:spPr>
           <a:xfrm>
-            <a:off x="2592528" y="3649359"/>
-            <a:ext cx="1093635" cy="236841"/>
+            <a:off x="2586690" y="3662265"/>
+            <a:ext cx="1093635" cy="215310"/>
           </a:xfrm>
           <a:prstGeom prst="rect">
             <a:avLst/>
@@ -3925,7 +3925,7 @@
                   </a:schemeClr>
                 </a:solidFill>
               </a:rPr>
-              <a:t>BrowserPanel</a:t>
+              <a:t>ResultDisplay</a:t>
             </a:r>
             <a:endParaRPr lang="en-SG" sz="1050" b="1" dirty="0">
               <a:solidFill>
@@ -3945,7 +3945,7 @@
         </p:nvSpPr>
         <p:spPr>
           <a:xfrm>
-            <a:off x="2592527" y="4563759"/>
+            <a:off x="2592527" y="4796178"/>
             <a:ext cx="1093635" cy="236841"/>
           </a:xfrm>
           <a:prstGeom prst="rect">
@@ -4005,7 +4005,7 @@
         </p:nvSpPr>
         <p:spPr>
           <a:xfrm>
-            <a:off x="2592526" y="3991960"/>
+            <a:off x="2592526" y="4353837"/>
             <a:ext cx="1093635" cy="236841"/>
           </a:xfrm>
           <a:prstGeom prst="rect">
@@ -4065,7 +4065,7 @@
         </p:nvSpPr>
         <p:spPr>
           <a:xfrm>
-            <a:off x="3839323" y="4228801"/>
+            <a:off x="3829167" y="4542138"/>
             <a:ext cx="1040906" cy="236841"/>
           </a:xfrm>
           <a:prstGeom prst="rect">
@@ -4125,7 +4125,7 @@
         </p:nvSpPr>
         <p:spPr>
           <a:xfrm>
-            <a:off x="2592528" y="4966000"/>
+            <a:off x="2592528" y="5128447"/>
             <a:ext cx="1093635" cy="236841"/>
           </a:xfrm>
           <a:prstGeom prst="rect">
@@ -4185,7 +4185,7 @@
         </p:nvSpPr>
         <p:spPr>
           <a:xfrm>
-            <a:off x="2324548" y="2706452"/>
+            <a:off x="2290762" y="2652457"/>
             <a:ext cx="183156" cy="161573"/>
           </a:xfrm>
           <a:prstGeom prst="flowChartDecision">
@@ -4228,16 +4228,13 @@
       <p:cxnSp>
         <p:nvCxnSpPr>
           <p:cNvPr id="40" name="Elbow Connector 63"/>
-          <p:cNvCxnSpPr>
-            <a:stCxn id="39" idx="2"/>
-            <a:endCxn id="3" idx="1"/>
-          </p:cNvCxnSpPr>
+          <p:cNvCxnSpPr/>
           <p:nvPr/>
         </p:nvCxnSpPr>
         <p:spPr>
           <a:xfrm rot="16200000" flipH="1">
-            <a:off x="2393229" y="2890922"/>
-            <a:ext cx="222196" cy="176402"/>
+            <a:off x="2444194" y="2814865"/>
+            <a:ext cx="62687" cy="186392"/>
           </a:xfrm>
           <a:prstGeom prst="bentConnector2">
             <a:avLst/>
@@ -4274,8 +4271,8 @@
         </p:nvSpPr>
         <p:spPr>
           <a:xfrm>
-            <a:off x="2590799" y="3304308"/>
-            <a:ext cx="1095361" cy="236841"/>
+            <a:off x="2567006" y="3949308"/>
+            <a:ext cx="1095361" cy="357516"/>
           </a:xfrm>
           <a:prstGeom prst="rect">
             <a:avLst/>
@@ -4307,14 +4304,14 @@
           <a:p>
             <a:pPr algn="ctr"/>
             <a:r>
-              <a:rPr lang="en-US" sz="1050" b="1" dirty="0" err="1">
+              <a:rPr lang="en-SG" sz="1050" b="1" dirty="0" err="1" smtClean="0">
                 <a:solidFill>
                   <a:schemeClr val="accent3">
                     <a:lumMod val="75000"/>
                   </a:schemeClr>
                 </a:solidFill>
               </a:rPr>
-              <a:t>ResultDisplay</a:t>
+              <a:t>ExtendedPersonCard</a:t>
             </a:r>
             <a:endParaRPr lang="en-SG" sz="1050" b="1" dirty="0">
               <a:solidFill>
@@ -4337,8 +4334,8 @@
         </p:nvCxnSpPr>
         <p:spPr>
           <a:xfrm rot="16200000" flipH="1">
-            <a:off x="2054450" y="3229701"/>
-            <a:ext cx="899755" cy="176402"/>
+            <a:off x="2006570" y="3189800"/>
+            <a:ext cx="955890" cy="204350"/>
           </a:xfrm>
           <a:prstGeom prst="bentConnector2">
             <a:avLst/>
@@ -4378,8 +4375,8 @@
         </p:nvCxnSpPr>
         <p:spPr>
           <a:xfrm rot="16200000" flipH="1">
-            <a:off x="1883148" y="3401003"/>
-            <a:ext cx="1242356" cy="176400"/>
+            <a:off x="1658319" y="3538051"/>
+            <a:ext cx="1658228" cy="210186"/>
           </a:xfrm>
           <a:prstGeom prst="bentConnector2">
             <a:avLst/>
@@ -4419,8 +4416,8 @@
         </p:nvCxnSpPr>
         <p:spPr>
           <a:xfrm rot="16200000" flipH="1">
-            <a:off x="1597249" y="3686901"/>
-            <a:ext cx="1814155" cy="176401"/>
+            <a:off x="1437149" y="3759220"/>
+            <a:ext cx="2100569" cy="210187"/>
           </a:xfrm>
           <a:prstGeom prst="bentConnector2">
             <a:avLst/>
@@ -4452,18 +4449,18 @@
       <p:cxnSp>
         <p:nvCxnSpPr>
           <p:cNvPr id="53" name="Elbow Connector 63"/>
-          <p:cNvCxnSpPr>
-            <a:endCxn id="38" idx="1"/>
-          </p:cNvCxnSpPr>
+          <p:cNvCxnSpPr/>
           <p:nvPr/>
         </p:nvCxnSpPr>
         <p:spPr>
           <a:xfrm rot="16200000" flipH="1">
-            <a:off x="1184119" y="3676012"/>
-            <a:ext cx="2396440" cy="420377"/>
-          </a:xfrm>
-          <a:prstGeom prst="bentConnector2">
-            <a:avLst/>
+            <a:off x="1064183" y="3750270"/>
+            <a:ext cx="2616001" cy="420376"/>
+          </a:xfrm>
+          <a:prstGeom prst="bentConnector3">
+            <a:avLst>
+              <a:gd name="adj1" fmla="val 99984"/>
+            </a:avLst>
           </a:prstGeom>
           <a:ln w="19050">
             <a:solidFill>
@@ -4571,16 +4568,13 @@
       <p:cxnSp>
         <p:nvCxnSpPr>
           <p:cNvPr id="74" name="Elbow Connector 63"/>
-          <p:cNvCxnSpPr>
-            <a:stCxn id="43" idx="3"/>
-            <a:endCxn id="16" idx="3"/>
-          </p:cNvCxnSpPr>
+          <p:cNvCxnSpPr/>
           <p:nvPr/>
         </p:nvCxnSpPr>
         <p:spPr>
           <a:xfrm flipV="1">
-            <a:off x="3686160" y="2286000"/>
-            <a:ext cx="1843809" cy="1136729"/>
+            <a:off x="3653223" y="2286000"/>
+            <a:ext cx="1867602" cy="927340"/>
           </a:xfrm>
           <a:prstGeom prst="bentConnector2">
             <a:avLst/>
@@ -4620,8 +4614,8 @@
         </p:nvCxnSpPr>
         <p:spPr>
           <a:xfrm rot="5400000">
-            <a:off x="4174488" y="2991741"/>
-            <a:ext cx="2061222" cy="649740"/>
+            <a:off x="4012742" y="3143331"/>
+            <a:ext cx="2374559" cy="659896"/>
           </a:xfrm>
           <a:prstGeom prst="bentConnector2">
             <a:avLst/>
@@ -4653,15 +4647,12 @@
       <p:cxnSp>
         <p:nvCxnSpPr>
           <p:cNvPr id="82" name="Elbow Connector 63"/>
-          <p:cNvCxnSpPr>
-            <a:stCxn id="16" idx="3"/>
-            <a:endCxn id="34" idx="3"/>
-          </p:cNvCxnSpPr>
+          <p:cNvCxnSpPr/>
           <p:nvPr/>
         </p:nvCxnSpPr>
         <p:spPr>
           <a:xfrm rot="5400000">
-            <a:off x="3867176" y="2104987"/>
+            <a:off x="3855278" y="2507097"/>
             <a:ext cx="1481780" cy="1843806"/>
           </a:xfrm>
           <a:prstGeom prst="bentConnector2">
@@ -4703,7 +4694,7 @@
         <p:spPr>
           <a:xfrm flipV="1">
             <a:off x="3189583" y="2286000"/>
-            <a:ext cx="2340386" cy="228600"/>
+            <a:ext cx="2340386" cy="164592"/>
           </a:xfrm>
           <a:prstGeom prst="bentConnector2">
             <a:avLst/>
@@ -4735,15 +4726,12 @@
       <p:cxnSp>
         <p:nvCxnSpPr>
           <p:cNvPr id="91" name="Elbow Connector 63"/>
-          <p:cNvCxnSpPr>
-            <a:stCxn id="16" idx="3"/>
-            <a:endCxn id="35" idx="3"/>
-          </p:cNvCxnSpPr>
+          <p:cNvCxnSpPr/>
           <p:nvPr/>
         </p:nvCxnSpPr>
         <p:spPr>
           <a:xfrm rot="5400000">
-            <a:off x="3409976" y="2562187"/>
+            <a:off x="3409976" y="2844531"/>
             <a:ext cx="2396180" cy="1843807"/>
           </a:xfrm>
           <a:prstGeom prst="bentConnector2">
@@ -4784,8 +4772,8 @@
         </p:nvCxnSpPr>
         <p:spPr>
           <a:xfrm rot="5400000">
-            <a:off x="3208856" y="2763307"/>
-            <a:ext cx="2798421" cy="1843806"/>
+            <a:off x="3127632" y="2844531"/>
+            <a:ext cx="2960868" cy="1843806"/>
           </a:xfrm>
           <a:prstGeom prst="bentConnector2">
             <a:avLst/>
@@ -5086,8 +5074,8 @@
         </p:nvCxnSpPr>
         <p:spPr>
           <a:xfrm rot="16200000" flipH="1">
-            <a:off x="2226110" y="3058040"/>
-            <a:ext cx="554704" cy="174673"/>
+            <a:off x="1817655" y="3378715"/>
+            <a:ext cx="1314036" cy="184666"/>
           </a:xfrm>
           <a:prstGeom prst="bentConnector2">
             <a:avLst/>
@@ -5119,16 +5107,13 @@
       <p:cxnSp>
         <p:nvCxnSpPr>
           <p:cNvPr id="132" name="Elbow Connector 63"/>
-          <p:cNvCxnSpPr>
-            <a:stCxn id="16" idx="3"/>
-            <a:endCxn id="3" idx="3"/>
-          </p:cNvCxnSpPr>
+          <p:cNvCxnSpPr/>
           <p:nvPr/>
         </p:nvCxnSpPr>
         <p:spPr>
           <a:xfrm rot="5400000">
-            <a:off x="4205956" y="1766207"/>
-            <a:ext cx="804221" cy="1843806"/>
+            <a:off x="4314526" y="1642985"/>
+            <a:ext cx="581573" cy="1867602"/>
           </a:xfrm>
           <a:prstGeom prst="bentConnector2">
             <a:avLst/>
@@ -5160,15 +5145,12 @@
       <p:cxnSp>
         <p:nvCxnSpPr>
           <p:cNvPr id="137" name="Elbow Connector 136"/>
-          <p:cNvCxnSpPr>
-            <a:stCxn id="36" idx="2"/>
-            <a:endCxn id="37" idx="1"/>
-          </p:cNvCxnSpPr>
+          <p:cNvCxnSpPr/>
           <p:nvPr/>
         </p:nvCxnSpPr>
         <p:spPr>
           <a:xfrm rot="16200000" flipH="1">
-            <a:off x="3430123" y="3938021"/>
+            <a:off x="3419967" y="4310570"/>
             <a:ext cx="118421" cy="699979"/>
           </a:xfrm>
           <a:prstGeom prst="bentConnector2">
@@ -5201,16 +5183,13 @@
       <p:cxnSp>
         <p:nvCxnSpPr>
           <p:cNvPr id="140" name="Elbow Connector 63"/>
-          <p:cNvCxnSpPr>
-            <a:stCxn id="16" idx="3"/>
-            <a:endCxn id="36" idx="3"/>
-          </p:cNvCxnSpPr>
+          <p:cNvCxnSpPr/>
           <p:nvPr/>
         </p:nvCxnSpPr>
         <p:spPr>
           <a:xfrm rot="5400000">
-            <a:off x="3695875" y="2276286"/>
-            <a:ext cx="1824381" cy="1843808"/>
+            <a:off x="3629065" y="2592858"/>
+            <a:ext cx="1949867" cy="1853963"/>
           </a:xfrm>
           <a:prstGeom prst="bentConnector2">
             <a:avLst/>
@@ -5241,66 +5220,13 @@
       </p:cxnSp>
       <p:sp>
         <p:nvSpPr>
-          <p:cNvPr id="143" name="Rectangle 142"/>
-          <p:cNvSpPr/>
-          <p:nvPr/>
-        </p:nvSpPr>
-        <p:spPr>
-          <a:xfrm>
-            <a:off x="5435896" y="2743200"/>
-            <a:ext cx="229325" cy="166560"/>
-          </a:xfrm>
-          <a:prstGeom prst="rect">
-            <a:avLst/>
-          </a:prstGeom>
-          <a:solidFill>
-            <a:schemeClr val="accent3">
-              <a:lumMod val="20000"/>
-              <a:lumOff val="80000"/>
-              <a:alpha val="80000"/>
-            </a:schemeClr>
-          </a:solidFill>
-          <a:ln>
-            <a:noFill/>
-          </a:ln>
-          <a:effectLst>
-            <a:softEdge rad="31750"/>
-          </a:effectLst>
-        </p:spPr>
-        <p:style>
-          <a:lnRef idx="2">
-            <a:schemeClr val="accent1">
-              <a:shade val="50000"/>
-            </a:schemeClr>
-          </a:lnRef>
-          <a:fillRef idx="1">
-            <a:schemeClr val="accent1"/>
-          </a:fillRef>
-          <a:effectRef idx="0">
-            <a:schemeClr val="accent1"/>
-          </a:effectRef>
-          <a:fontRef idx="minor">
-            <a:schemeClr val="lt1"/>
-          </a:fontRef>
-        </p:style>
-        <p:txBody>
-          <a:bodyPr rtlCol="0" anchor="ctr"/>
-          <a:lstStyle/>
-          <a:p>
-            <a:pPr algn="ctr"/>
-            <a:endParaRPr lang="en-SG"/>
-          </a:p>
-        </p:txBody>
-      </p:sp>
-      <p:sp>
-        <p:nvSpPr>
           <p:cNvPr id="116" name="Freeform 115"/>
           <p:cNvSpPr/>
           <p:nvPr/>
         </p:nvSpPr>
         <p:spPr>
           <a:xfrm>
-            <a:off x="3687515" y="2828802"/>
+            <a:off x="3700624" y="2652457"/>
             <a:ext cx="3048000" cy="203200"/>
           </a:xfrm>
           <a:custGeom>
@@ -5376,46 +5302,159 @@
       </p:sp>
       <p:sp>
         <p:nvSpPr>
-          <p:cNvPr id="144" name="Rectangle 143"/>
+          <p:cNvPr id="118" name="Freeform 117"/>
           <p:cNvSpPr/>
           <p:nvPr/>
         </p:nvSpPr>
         <p:spPr>
+          <a:xfrm flipV="1">
+            <a:off x="4110475" y="4796178"/>
+            <a:ext cx="2642195" cy="101600"/>
+          </a:xfrm>
+          <a:custGeom>
+            <a:avLst/>
+            <a:gdLst>
+              <a:gd name="connsiteX0" fmla="*/ 0 w 3048000"/>
+              <a:gd name="connsiteY0" fmla="*/ 203200 h 203200"/>
+              <a:gd name="connsiteX1" fmla="*/ 221673 w 3048000"/>
+              <a:gd name="connsiteY1" fmla="*/ 0 h 203200"/>
+              <a:gd name="connsiteX2" fmla="*/ 3048000 w 3048000"/>
+              <a:gd name="connsiteY2" fmla="*/ 0 h 203200"/>
+            </a:gdLst>
+            <a:ahLst/>
+            <a:cxnLst>
+              <a:cxn ang="0">
+                <a:pos x="connsiteX0" y="connsiteY0"/>
+              </a:cxn>
+              <a:cxn ang="0">
+                <a:pos x="connsiteX1" y="connsiteY1"/>
+              </a:cxn>
+              <a:cxn ang="0">
+                <a:pos x="connsiteX2" y="connsiteY2"/>
+              </a:cxn>
+            </a:cxnLst>
+            <a:rect l="l" t="t" r="r" b="b"/>
+            <a:pathLst>
+              <a:path w="3048000" h="203200">
+                <a:moveTo>
+                  <a:pt x="0" y="203200"/>
+                </a:moveTo>
+                <a:lnTo>
+                  <a:pt x="221673" y="0"/>
+                </a:lnTo>
+                <a:lnTo>
+                  <a:pt x="3048000" y="0"/>
+                </a:lnTo>
+              </a:path>
+            </a:pathLst>
+          </a:custGeom>
+          <a:noFill/>
+          <a:ln w="19050">
+            <a:solidFill>
+              <a:schemeClr val="accent3"/>
+            </a:solidFill>
+            <a:prstDash val="sysDot"/>
+            <a:headEnd type="none" w="med" len="med"/>
+            <a:tailEnd type="arrow" w="med" len="med"/>
+          </a:ln>
+          <a:effectLst/>
+        </p:spPr>
+        <p:style>
+          <a:lnRef idx="1">
+            <a:schemeClr val="accent2"/>
+          </a:lnRef>
+          <a:fillRef idx="2">
+            <a:schemeClr val="accent2"/>
+          </a:fillRef>
+          <a:effectRef idx="1">
+            <a:schemeClr val="accent2"/>
+          </a:effectRef>
+          <a:fontRef idx="minor">
+            <a:schemeClr val="dk1"/>
+          </a:fontRef>
+        </p:style>
+        <p:txBody>
+          <a:bodyPr rtlCol="0" anchor="ctr"/>
+          <a:lstStyle/>
+          <a:p>
+            <a:pPr algn="ctr"/>
+            <a:endParaRPr lang="en-SG"/>
+          </a:p>
+        </p:txBody>
+      </p:sp>
+      <p:cxnSp>
+        <p:nvCxnSpPr>
+          <p:cNvPr id="72" name="Elbow Connector 63"/>
+          <p:cNvCxnSpPr/>
+          <p:nvPr/>
+        </p:nvCxnSpPr>
+        <p:spPr>
+          <a:xfrm flipV="1">
+            <a:off x="3682381" y="2299703"/>
+            <a:ext cx="1894520" cy="1175540"/>
+          </a:xfrm>
+          <a:prstGeom prst="bentConnector3">
+            <a:avLst>
+              <a:gd name="adj1" fmla="val 97300"/>
+            </a:avLst>
+          </a:prstGeom>
+          <a:ln w="6350">
+            <a:solidFill>
+              <a:schemeClr val="accent3"/>
+            </a:solidFill>
+            <a:headEnd type="none" w="med" len="med"/>
+            <a:tailEnd type="none" w="med" len="med"/>
+          </a:ln>
+          <a:effectLst/>
+        </p:spPr>
+        <p:style>
+          <a:lnRef idx="1">
+            <a:schemeClr val="accent2"/>
+          </a:lnRef>
+          <a:fillRef idx="2">
+            <a:schemeClr val="accent2"/>
+          </a:fillRef>
+          <a:effectRef idx="1">
+            <a:schemeClr val="accent2"/>
+          </a:effectRef>
+          <a:fontRef idx="minor">
+            <a:schemeClr val="dk1"/>
+          </a:fontRef>
+        </p:style>
+      </p:cxnSp>
+      <p:sp>
+        <p:nvSpPr>
+          <p:cNvPr id="138" name="Rectangle 11"/>
+          <p:cNvSpPr/>
+          <p:nvPr/>
+        </p:nvSpPr>
+        <p:spPr>
           <a:xfrm>
-            <a:off x="5431573" y="4488138"/>
-            <a:ext cx="229325" cy="160062"/>
+            <a:off x="2568732" y="3098715"/>
+            <a:ext cx="1095361" cy="207760"/>
           </a:xfrm>
           <a:prstGeom prst="rect">
             <a:avLst/>
           </a:prstGeom>
-          <a:solidFill>
-            <a:schemeClr val="accent3">
-              <a:lumMod val="20000"/>
-              <a:lumOff val="80000"/>
-              <a:alpha val="80000"/>
-            </a:schemeClr>
-          </a:solidFill>
-          <a:ln>
-            <a:noFill/>
+          <a:ln w="19050">
+            <a:solidFill>
+              <a:schemeClr val="accent3"/>
+            </a:solidFill>
           </a:ln>
-          <a:effectLst>
-            <a:softEdge rad="31750"/>
-          </a:effectLst>
+          <a:effectLst/>
         </p:spPr>
         <p:style>
-          <a:lnRef idx="2">
-            <a:schemeClr val="accent1">
-              <a:shade val="50000"/>
-            </a:schemeClr>
+          <a:lnRef idx="1">
+            <a:schemeClr val="accent3"/>
           </a:lnRef>
-          <a:fillRef idx="1">
-            <a:schemeClr val="accent1"/>
+          <a:fillRef idx="2">
+            <a:schemeClr val="accent3"/>
           </a:fillRef>
-          <a:effectRef idx="0">
-            <a:schemeClr val="accent1"/>
+          <a:effectRef idx="1">
+            <a:schemeClr val="accent3"/>
           </a:effectRef>
           <a:fontRef idx="minor">
-            <a:schemeClr val="lt1"/>
+            <a:schemeClr val="dk1"/>
           </a:fontRef>
         </p:style>
         <p:txBody>
@@ -5423,20 +5462,298 @@
           <a:lstStyle/>
           <a:p>
             <a:pPr algn="ctr"/>
-            <a:endParaRPr lang="en-SG"/>
-          </a:p>
-        </p:txBody>
-      </p:sp>
-      <p:sp>
-        <p:nvSpPr>
-          <p:cNvPr id="118" name="Freeform 117"/>
+            <a:r>
+              <a:rPr lang="en-SG" sz="1050" b="1" dirty="0" err="1" smtClean="0">
+                <a:solidFill>
+                  <a:schemeClr val="accent3">
+                    <a:lumMod val="75000"/>
+                  </a:schemeClr>
+                </a:solidFill>
+              </a:rPr>
+              <a:t>GraphPanel</a:t>
+            </a:r>
+            <a:endParaRPr lang="en-SG" sz="1050" b="1" dirty="0">
+              <a:solidFill>
+                <a:schemeClr val="accent3">
+                  <a:lumMod val="75000"/>
+                </a:schemeClr>
+              </a:solidFill>
+            </a:endParaRPr>
+          </a:p>
+        </p:txBody>
+      </p:sp>
+      <p:cxnSp>
+        <p:nvCxnSpPr>
+          <p:cNvPr id="142" name="Elbow Connector 141"/>
+          <p:cNvCxnSpPr>
+            <a:endCxn id="138" idx="1"/>
+          </p:cNvCxnSpPr>
+          <p:nvPr/>
+        </p:nvCxnSpPr>
+        <p:spPr>
+          <a:xfrm rot="16200000" flipH="1">
+            <a:off x="2217362" y="2851224"/>
+            <a:ext cx="524741" cy="177999"/>
+          </a:xfrm>
+          <a:prstGeom prst="bentConnector2">
+            <a:avLst/>
+          </a:prstGeom>
+          <a:ln w="19050">
+            <a:solidFill>
+              <a:schemeClr val="accent3"/>
+            </a:solidFill>
+            <a:headEnd type="none" w="med" len="med"/>
+            <a:tailEnd type="arrow" w="med" len="med"/>
+          </a:ln>
+          <a:effectLst/>
+        </p:spPr>
+        <p:style>
+          <a:lnRef idx="1">
+            <a:schemeClr val="accent2"/>
+          </a:lnRef>
+          <a:fillRef idx="2">
+            <a:schemeClr val="accent2"/>
+          </a:fillRef>
+          <a:effectRef idx="1">
+            <a:schemeClr val="accent2"/>
+          </a:effectRef>
+          <a:fontRef idx="minor">
+            <a:schemeClr val="dk1"/>
+          </a:fontRef>
+        </p:style>
+      </p:cxnSp>
+      <p:sp>
+        <p:nvSpPr>
+          <p:cNvPr id="182" name="Rectangle 11"/>
           <p:cNvSpPr/>
           <p:nvPr/>
         </p:nvSpPr>
         <p:spPr>
+          <a:xfrm>
+            <a:off x="2582372" y="3386938"/>
+            <a:ext cx="1095361" cy="207760"/>
+          </a:xfrm>
+          <a:prstGeom prst="rect">
+            <a:avLst/>
+          </a:prstGeom>
+          <a:ln w="19050">
+            <a:solidFill>
+              <a:schemeClr val="accent3"/>
+            </a:solidFill>
+          </a:ln>
+          <a:effectLst/>
+        </p:spPr>
+        <p:style>
+          <a:lnRef idx="1">
+            <a:schemeClr val="accent3"/>
+          </a:lnRef>
+          <a:fillRef idx="2">
+            <a:schemeClr val="accent3"/>
+          </a:fillRef>
+          <a:effectRef idx="1">
+            <a:schemeClr val="accent3"/>
+          </a:effectRef>
+          <a:fontRef idx="minor">
+            <a:schemeClr val="dk1"/>
+          </a:fontRef>
+        </p:style>
+        <p:txBody>
+          <a:bodyPr rtlCol="0" anchor="ctr"/>
+          <a:lstStyle/>
+          <a:p>
+            <a:pPr algn="ctr"/>
+            <a:r>
+              <a:rPr lang="en-SG" sz="1050" b="1" dirty="0" err="1" smtClean="0">
+                <a:solidFill>
+                  <a:schemeClr val="accent3">
+                    <a:lumMod val="75000"/>
+                  </a:schemeClr>
+                </a:solidFill>
+              </a:rPr>
+              <a:t>StatisticsPanel</a:t>
+            </a:r>
+            <a:endParaRPr lang="en-SG" sz="1050" b="1" dirty="0">
+              <a:solidFill>
+                <a:schemeClr val="accent3">
+                  <a:lumMod val="75000"/>
+                </a:schemeClr>
+              </a:solidFill>
+            </a:endParaRPr>
+          </a:p>
+        </p:txBody>
+      </p:sp>
+      <p:cxnSp>
+        <p:nvCxnSpPr>
+          <p:cNvPr id="184" name="Elbow Connector 63"/>
+          <p:cNvCxnSpPr/>
+          <p:nvPr/>
+        </p:nvCxnSpPr>
+        <p:spPr>
           <a:xfrm flipV="1">
-            <a:off x="4114799" y="4472708"/>
-            <a:ext cx="2642195" cy="101600"/>
+            <a:off x="3689469" y="2202680"/>
+            <a:ext cx="1828914" cy="1567240"/>
+          </a:xfrm>
+          <a:prstGeom prst="bentConnector3">
+            <a:avLst>
+              <a:gd name="adj1" fmla="val 100497"/>
+            </a:avLst>
+          </a:prstGeom>
+          <a:ln w="6350">
+            <a:solidFill>
+              <a:schemeClr val="accent3"/>
+            </a:solidFill>
+            <a:headEnd type="none" w="med" len="med"/>
+            <a:tailEnd type="none" w="med" len="med"/>
+          </a:ln>
+          <a:effectLst/>
+        </p:spPr>
+        <p:style>
+          <a:lnRef idx="1">
+            <a:schemeClr val="accent2"/>
+          </a:lnRef>
+          <a:fillRef idx="2">
+            <a:schemeClr val="accent2"/>
+          </a:fillRef>
+          <a:effectRef idx="1">
+            <a:schemeClr val="accent2"/>
+          </a:effectRef>
+          <a:fontRef idx="minor">
+            <a:schemeClr val="dk1"/>
+          </a:fontRef>
+        </p:style>
+      </p:cxnSp>
+      <p:cxnSp>
+        <p:nvCxnSpPr>
+          <p:cNvPr id="186" name="Elbow Connector 185"/>
+          <p:cNvCxnSpPr>
+            <a:endCxn id="182" idx="1"/>
+          </p:cNvCxnSpPr>
+          <p:nvPr/>
+        </p:nvCxnSpPr>
+        <p:spPr>
+          <a:xfrm rot="16200000" flipH="1">
+            <a:off x="2146673" y="3055119"/>
+            <a:ext cx="679004" cy="192393"/>
+          </a:xfrm>
+          <a:prstGeom prst="bentConnector2">
+            <a:avLst/>
+          </a:prstGeom>
+          <a:ln w="19050">
+            <a:solidFill>
+              <a:schemeClr val="accent3"/>
+            </a:solidFill>
+            <a:headEnd type="none" w="med" len="med"/>
+            <a:tailEnd type="arrow" w="med" len="med"/>
+          </a:ln>
+          <a:effectLst/>
+        </p:spPr>
+        <p:style>
+          <a:lnRef idx="1">
+            <a:schemeClr val="accent2"/>
+          </a:lnRef>
+          <a:fillRef idx="2">
+            <a:schemeClr val="accent2"/>
+          </a:fillRef>
+          <a:effectRef idx="1">
+            <a:schemeClr val="accent2"/>
+          </a:effectRef>
+          <a:fontRef idx="minor">
+            <a:schemeClr val="dk1"/>
+          </a:fontRef>
+        </p:style>
+      </p:cxnSp>
+      <p:sp>
+        <p:nvSpPr>
+          <p:cNvPr id="193" name="Freeform 192"/>
+          <p:cNvSpPr/>
+          <p:nvPr/>
+        </p:nvSpPr>
+        <p:spPr>
+          <a:xfrm flipV="1">
+            <a:off x="3686457" y="4198769"/>
+            <a:ext cx="3034449" cy="155067"/>
+          </a:xfrm>
+          <a:custGeom>
+            <a:avLst/>
+            <a:gdLst>
+              <a:gd name="connsiteX0" fmla="*/ 0 w 3048000"/>
+              <a:gd name="connsiteY0" fmla="*/ 203200 h 203200"/>
+              <a:gd name="connsiteX1" fmla="*/ 221673 w 3048000"/>
+              <a:gd name="connsiteY1" fmla="*/ 0 h 203200"/>
+              <a:gd name="connsiteX2" fmla="*/ 3048000 w 3048000"/>
+              <a:gd name="connsiteY2" fmla="*/ 0 h 203200"/>
+            </a:gdLst>
+            <a:ahLst/>
+            <a:cxnLst>
+              <a:cxn ang="0">
+                <a:pos x="connsiteX0" y="connsiteY0"/>
+              </a:cxn>
+              <a:cxn ang="0">
+                <a:pos x="connsiteX1" y="connsiteY1"/>
+              </a:cxn>
+              <a:cxn ang="0">
+                <a:pos x="connsiteX2" y="connsiteY2"/>
+              </a:cxn>
+            </a:cxnLst>
+            <a:rect l="l" t="t" r="r" b="b"/>
+            <a:pathLst>
+              <a:path w="3048000" h="203200">
+                <a:moveTo>
+                  <a:pt x="0" y="203200"/>
+                </a:moveTo>
+                <a:lnTo>
+                  <a:pt x="221673" y="0"/>
+                </a:lnTo>
+                <a:lnTo>
+                  <a:pt x="3048000" y="0"/>
+                </a:lnTo>
+              </a:path>
+            </a:pathLst>
+          </a:custGeom>
+          <a:noFill/>
+          <a:ln w="19050">
+            <a:solidFill>
+              <a:schemeClr val="accent3"/>
+            </a:solidFill>
+            <a:prstDash val="sysDot"/>
+            <a:headEnd type="none" w="med" len="med"/>
+            <a:tailEnd type="arrow" w="med" len="med"/>
+          </a:ln>
+          <a:effectLst/>
+        </p:spPr>
+        <p:style>
+          <a:lnRef idx="1">
+            <a:schemeClr val="accent2"/>
+          </a:lnRef>
+          <a:fillRef idx="2">
+            <a:schemeClr val="accent2"/>
+          </a:fillRef>
+          <a:effectRef idx="1">
+            <a:schemeClr val="accent2"/>
+          </a:effectRef>
+          <a:fontRef idx="minor">
+            <a:schemeClr val="dk1"/>
+          </a:fontRef>
+        </p:style>
+        <p:txBody>
+          <a:bodyPr rtlCol="0" anchor="ctr"/>
+          <a:lstStyle/>
+          <a:p>
+            <a:pPr algn="ctr"/>
+            <a:endParaRPr lang="en-SG"/>
+          </a:p>
+        </p:txBody>
+      </p:sp>
+      <p:sp>
+        <p:nvSpPr>
+          <p:cNvPr id="194" name="Freeform 193"/>
+          <p:cNvSpPr/>
+          <p:nvPr/>
+        </p:nvSpPr>
+        <p:spPr>
+          <a:xfrm flipV="1">
+            <a:off x="3671547" y="3471046"/>
+            <a:ext cx="3034449" cy="155067"/>
           </a:xfrm>
           <a:custGeom>
             <a:avLst/>

</xml_diff>

<commit_message>
Added implementation for agenda in DG
</commit_message>
<xml_diff>
--- a/docs/diagrams/UiComponentClassDiagram.pptx
+++ b/docs/diagrams/UiComponentClassDiagram.pptx
@@ -109,7 +109,7 @@
   </p:defaultTextStyle>
   <p:extLst>
     <p:ext uri="{EFAFB233-063F-42B5-8137-9DF3F51BA10A}">
-      <p15:sldGuideLst xmlns:p15="http://schemas.microsoft.com/office/powerpoint/2012/main">
+      <p15:sldGuideLst xmlns="" xmlns:p15="http://schemas.microsoft.com/office/powerpoint/2012/main">
         <p15:guide id="1" orient="horz" pos="1488">
           <p15:clr>
             <a:srgbClr val="A4A3A4"/>
@@ -208,7 +208,7 @@
           <a:p>
             <a:fld id="{F5CC4B3F-88C1-4FFA-B1B6-F41C21DC6924}" type="datetimeFigureOut">
               <a:rPr lang="en-US" smtClean="0"/>
-              <a:t>1/7/2017</a:t>
+              <a:t>8/11/17</a:t>
             </a:fld>
             <a:endParaRPr lang="en-US"/>
           </a:p>
@@ -654,7 +654,7 @@
           <a:p>
             <a:fld id="{78C97017-6FC3-485B-9764-EAC9E56C1D49}" type="datetimeFigureOut">
               <a:rPr lang="en-US" smtClean="0"/>
-              <a:t>1/7/2017</a:t>
+              <a:t>8/11/17</a:t>
             </a:fld>
             <a:endParaRPr lang="en-US"/>
           </a:p>
@@ -822,7 +822,7 @@
           <a:p>
             <a:fld id="{78C97017-6FC3-485B-9764-EAC9E56C1D49}" type="datetimeFigureOut">
               <a:rPr lang="en-US" smtClean="0"/>
-              <a:t>1/7/2017</a:t>
+              <a:t>8/11/17</a:t>
             </a:fld>
             <a:endParaRPr lang="en-US"/>
           </a:p>
@@ -1000,7 +1000,7 @@
           <a:p>
             <a:fld id="{78C97017-6FC3-485B-9764-EAC9E56C1D49}" type="datetimeFigureOut">
               <a:rPr lang="en-US" smtClean="0"/>
-              <a:t>1/7/2017</a:t>
+              <a:t>8/11/17</a:t>
             </a:fld>
             <a:endParaRPr lang="en-US"/>
           </a:p>
@@ -1168,7 +1168,7 @@
           <a:p>
             <a:fld id="{78C97017-6FC3-485B-9764-EAC9E56C1D49}" type="datetimeFigureOut">
               <a:rPr lang="en-US" smtClean="0"/>
-              <a:t>1/7/2017</a:t>
+              <a:t>8/11/17</a:t>
             </a:fld>
             <a:endParaRPr lang="en-US"/>
           </a:p>
@@ -1413,7 +1413,7 @@
           <a:p>
             <a:fld id="{78C97017-6FC3-485B-9764-EAC9E56C1D49}" type="datetimeFigureOut">
               <a:rPr lang="en-US" smtClean="0"/>
-              <a:t>1/7/2017</a:t>
+              <a:t>8/11/17</a:t>
             </a:fld>
             <a:endParaRPr lang="en-US"/>
           </a:p>
@@ -1698,7 +1698,7 @@
           <a:p>
             <a:fld id="{78C97017-6FC3-485B-9764-EAC9E56C1D49}" type="datetimeFigureOut">
               <a:rPr lang="en-US" smtClean="0"/>
-              <a:t>1/7/2017</a:t>
+              <a:t>8/11/17</a:t>
             </a:fld>
             <a:endParaRPr lang="en-US"/>
           </a:p>
@@ -2117,7 +2117,7 @@
           <a:p>
             <a:fld id="{78C97017-6FC3-485B-9764-EAC9E56C1D49}" type="datetimeFigureOut">
               <a:rPr lang="en-US" smtClean="0"/>
-              <a:t>1/7/2017</a:t>
+              <a:t>8/11/17</a:t>
             </a:fld>
             <a:endParaRPr lang="en-US"/>
           </a:p>
@@ -2234,7 +2234,7 @@
           <a:p>
             <a:fld id="{78C97017-6FC3-485B-9764-EAC9E56C1D49}" type="datetimeFigureOut">
               <a:rPr lang="en-US" smtClean="0"/>
-              <a:t>1/7/2017</a:t>
+              <a:t>8/11/17</a:t>
             </a:fld>
             <a:endParaRPr lang="en-US"/>
           </a:p>
@@ -2329,7 +2329,7 @@
           <a:p>
             <a:fld id="{78C97017-6FC3-485B-9764-EAC9E56C1D49}" type="datetimeFigureOut">
               <a:rPr lang="en-US" smtClean="0"/>
-              <a:t>1/7/2017</a:t>
+              <a:t>8/11/17</a:t>
             </a:fld>
             <a:endParaRPr lang="en-US"/>
           </a:p>
@@ -2604,7 +2604,7 @@
           <a:p>
             <a:fld id="{78C97017-6FC3-485B-9764-EAC9E56C1D49}" type="datetimeFigureOut">
               <a:rPr lang="en-US" smtClean="0"/>
-              <a:t>1/7/2017</a:t>
+              <a:t>8/11/17</a:t>
             </a:fld>
             <a:endParaRPr lang="en-US"/>
           </a:p>
@@ -2856,7 +2856,7 @@
           <a:p>
             <a:fld id="{78C97017-6FC3-485B-9764-EAC9E56C1D49}" type="datetimeFigureOut">
               <a:rPr lang="en-US" smtClean="0"/>
-              <a:t>1/7/2017</a:t>
+              <a:t>8/11/17</a:t>
             </a:fld>
             <a:endParaRPr lang="en-US"/>
           </a:p>
@@ -3067,7 +3067,7 @@
           <a:p>
             <a:fld id="{78C97017-6FC3-485B-9764-EAC9E56C1D49}" type="datetimeFigureOut">
               <a:rPr lang="en-US" smtClean="0"/>
-              <a:t>1/7/2017</a:t>
+              <a:t>8/11/17</a:t>
             </a:fld>
             <a:endParaRPr lang="en-US"/>
           </a:p>
@@ -3945,7 +3945,7 @@
         </p:nvSpPr>
         <p:spPr>
           <a:xfrm>
-            <a:off x="2592527" y="4563759"/>
+            <a:off x="2590800" y="4800600"/>
             <a:ext cx="1093635" cy="236841"/>
           </a:xfrm>
           <a:prstGeom prst="rect">
@@ -4125,7 +4125,7 @@
         </p:nvSpPr>
         <p:spPr>
           <a:xfrm>
-            <a:off x="2592528" y="4966000"/>
+            <a:off x="2590800" y="5105400"/>
             <a:ext cx="1093635" cy="236841"/>
           </a:xfrm>
           <a:prstGeom prst="rect">
@@ -4419,8 +4419,8 @@
         </p:nvCxnSpPr>
         <p:spPr>
           <a:xfrm rot="16200000" flipH="1">
-            <a:off x="1597249" y="3686901"/>
-            <a:ext cx="1814155" cy="176401"/>
+            <a:off x="1477965" y="3806186"/>
+            <a:ext cx="2050996" cy="174674"/>
           </a:xfrm>
           <a:prstGeom prst="bentConnector2">
             <a:avLst/>
@@ -4453,17 +4453,20 @@
         <p:nvCxnSpPr>
           <p:cNvPr id="53" name="Elbow Connector 63"/>
           <p:cNvCxnSpPr>
+            <a:stCxn id="2" idx="1"/>
             <a:endCxn id="38" idx="1"/>
           </p:cNvCxnSpPr>
           <p:nvPr/>
         </p:nvCxnSpPr>
         <p:spPr>
-          <a:xfrm rot="16200000" flipH="1">
-            <a:off x="1184119" y="3676012"/>
-            <a:ext cx="2396440" cy="420377"/>
-          </a:xfrm>
-          <a:prstGeom prst="bentConnector2">
-            <a:avLst/>
+          <a:xfrm rot="10800000" flipH="1" flipV="1">
+            <a:off x="2095948" y="2514599"/>
+            <a:ext cx="494852" cy="2709221"/>
+          </a:xfrm>
+          <a:prstGeom prst="bentConnector3">
+            <a:avLst>
+              <a:gd name="adj1" fmla="val -46196"/>
+            </a:avLst>
           </a:prstGeom>
           <a:ln w="19050">
             <a:solidFill>
@@ -4743,8 +4746,8 @@
         </p:nvCxnSpPr>
         <p:spPr>
           <a:xfrm rot="5400000">
-            <a:off x="3409976" y="2562187"/>
-            <a:ext cx="2396180" cy="1843807"/>
+            <a:off x="3290692" y="2679743"/>
+            <a:ext cx="2633021" cy="1845534"/>
           </a:xfrm>
           <a:prstGeom prst="bentConnector2">
             <a:avLst/>
@@ -4784,8 +4787,8 @@
         </p:nvCxnSpPr>
         <p:spPr>
           <a:xfrm rot="5400000">
-            <a:off x="3208856" y="2763307"/>
-            <a:ext cx="2798421" cy="1843806"/>
+            <a:off x="3138292" y="2832143"/>
+            <a:ext cx="2937821" cy="1845534"/>
           </a:xfrm>
           <a:prstGeom prst="bentConnector2">
             <a:avLst/>
@@ -5509,6 +5512,438 @@
           </a:p>
         </p:txBody>
       </p:sp>
+      <p:sp>
+        <p:nvSpPr>
+          <p:cNvPr id="45" name="Rectangle 11"/>
+          <p:cNvSpPr/>
+          <p:nvPr/>
+        </p:nvSpPr>
+        <p:spPr>
+          <a:xfrm>
+            <a:off x="2590800" y="4495800"/>
+            <a:ext cx="1093635" cy="236841"/>
+          </a:xfrm>
+          <a:prstGeom prst="rect">
+            <a:avLst/>
+          </a:prstGeom>
+          <a:ln w="19050">
+            <a:solidFill>
+              <a:schemeClr val="accent3"/>
+            </a:solidFill>
+          </a:ln>
+          <a:effectLst/>
+        </p:spPr>
+        <p:style>
+          <a:lnRef idx="1">
+            <a:schemeClr val="accent3"/>
+          </a:lnRef>
+          <a:fillRef idx="2">
+            <a:schemeClr val="accent3"/>
+          </a:fillRef>
+          <a:effectRef idx="1">
+            <a:schemeClr val="accent3"/>
+          </a:effectRef>
+          <a:fontRef idx="minor">
+            <a:schemeClr val="dk1"/>
+          </a:fontRef>
+        </p:style>
+        <p:txBody>
+          <a:bodyPr rtlCol="0" anchor="ctr"/>
+          <a:lstStyle/>
+          <a:p>
+            <a:pPr algn="ctr"/>
+            <a:r>
+              <a:rPr lang="en-US" sz="1050" b="1" dirty="0" err="1" smtClean="0">
+                <a:solidFill>
+                  <a:schemeClr val="accent3">
+                    <a:lumMod val="75000"/>
+                  </a:schemeClr>
+                </a:solidFill>
+              </a:rPr>
+              <a:t>AgendaPanel</a:t>
+            </a:r>
+            <a:endParaRPr lang="en-SG" sz="1050" b="1" dirty="0">
+              <a:solidFill>
+                <a:schemeClr val="accent3">
+                  <a:lumMod val="75000"/>
+                </a:schemeClr>
+              </a:solidFill>
+            </a:endParaRPr>
+          </a:p>
+        </p:txBody>
+      </p:sp>
+      <p:cxnSp>
+        <p:nvCxnSpPr>
+          <p:cNvPr id="48" name="Elbow Connector 63"/>
+          <p:cNvCxnSpPr>
+            <a:stCxn id="39" idx="2"/>
+            <a:endCxn id="45" idx="1"/>
+          </p:cNvCxnSpPr>
+          <p:nvPr/>
+        </p:nvCxnSpPr>
+        <p:spPr>
+          <a:xfrm rot="16200000" flipH="1">
+            <a:off x="1630365" y="3653786"/>
+            <a:ext cx="1746196" cy="174674"/>
+          </a:xfrm>
+          <a:prstGeom prst="bentConnector2">
+            <a:avLst/>
+          </a:prstGeom>
+          <a:ln w="19050">
+            <a:solidFill>
+              <a:schemeClr val="accent3"/>
+            </a:solidFill>
+            <a:headEnd type="none" w="med" len="med"/>
+            <a:tailEnd type="arrow" w="med" len="med"/>
+          </a:ln>
+          <a:effectLst/>
+        </p:spPr>
+        <p:style>
+          <a:lnRef idx="1">
+            <a:schemeClr val="accent2"/>
+          </a:lnRef>
+          <a:fillRef idx="2">
+            <a:schemeClr val="accent2"/>
+          </a:fillRef>
+          <a:effectRef idx="1">
+            <a:schemeClr val="accent2"/>
+          </a:effectRef>
+          <a:fontRef idx="minor">
+            <a:schemeClr val="dk1"/>
+          </a:fontRef>
+        </p:style>
+      </p:cxnSp>
+      <p:sp>
+        <p:nvSpPr>
+          <p:cNvPr id="54" name="Rectangle 11"/>
+          <p:cNvSpPr/>
+          <p:nvPr/>
+        </p:nvSpPr>
+        <p:spPr>
+          <a:xfrm>
+            <a:off x="4038600" y="4648200"/>
+            <a:ext cx="1040906" cy="236841"/>
+          </a:xfrm>
+          <a:prstGeom prst="rect">
+            <a:avLst/>
+          </a:prstGeom>
+          <a:ln w="19050">
+            <a:solidFill>
+              <a:schemeClr val="accent3"/>
+            </a:solidFill>
+          </a:ln>
+          <a:effectLst/>
+        </p:spPr>
+        <p:style>
+          <a:lnRef idx="1">
+            <a:schemeClr val="accent3"/>
+          </a:lnRef>
+          <a:fillRef idx="2">
+            <a:schemeClr val="accent3"/>
+          </a:fillRef>
+          <a:effectRef idx="1">
+            <a:schemeClr val="accent3"/>
+          </a:effectRef>
+          <a:fontRef idx="minor">
+            <a:schemeClr val="dk1"/>
+          </a:fontRef>
+        </p:style>
+        <p:txBody>
+          <a:bodyPr rtlCol="0" anchor="ctr"/>
+          <a:lstStyle/>
+          <a:p>
+            <a:pPr algn="ctr"/>
+            <a:r>
+              <a:rPr lang="en-US" sz="1050" b="1" dirty="0" err="1" smtClean="0">
+                <a:solidFill>
+                  <a:schemeClr val="accent3">
+                    <a:lumMod val="75000"/>
+                  </a:schemeClr>
+                </a:solidFill>
+              </a:rPr>
+              <a:t>ScheduleCard</a:t>
+            </a:r>
+            <a:endParaRPr lang="en-SG" sz="1050" b="1" dirty="0">
+              <a:solidFill>
+                <a:schemeClr val="accent3">
+                  <a:lumMod val="75000"/>
+                </a:schemeClr>
+              </a:solidFill>
+            </a:endParaRPr>
+          </a:p>
+        </p:txBody>
+      </p:sp>
+      <p:cxnSp>
+        <p:nvCxnSpPr>
+          <p:cNvPr id="55" name="Elbow Connector 54"/>
+          <p:cNvCxnSpPr>
+            <a:stCxn id="45" idx="3"/>
+            <a:endCxn id="54" idx="1"/>
+          </p:cNvCxnSpPr>
+          <p:nvPr/>
+        </p:nvCxnSpPr>
+        <p:spPr>
+          <a:xfrm>
+            <a:off x="3684435" y="4614221"/>
+            <a:ext cx="354165" cy="152400"/>
+          </a:xfrm>
+          <a:prstGeom prst="bentConnector3">
+            <a:avLst>
+              <a:gd name="adj1" fmla="val 46016"/>
+            </a:avLst>
+          </a:prstGeom>
+          <a:ln w="19050">
+            <a:solidFill>
+              <a:schemeClr val="accent3"/>
+            </a:solidFill>
+            <a:headEnd type="none" w="med" len="med"/>
+            <a:tailEnd type="arrow" w="med" len="med"/>
+          </a:ln>
+          <a:effectLst/>
+        </p:spPr>
+        <p:style>
+          <a:lnRef idx="1">
+            <a:schemeClr val="accent2"/>
+          </a:lnRef>
+          <a:fillRef idx="2">
+            <a:schemeClr val="accent2"/>
+          </a:fillRef>
+          <a:effectRef idx="1">
+            <a:schemeClr val="accent2"/>
+          </a:effectRef>
+          <a:fontRef idx="minor">
+            <a:schemeClr val="dk1"/>
+          </a:fontRef>
+        </p:style>
+      </p:cxnSp>
+      <p:sp>
+        <p:nvSpPr>
+          <p:cNvPr id="63" name="Freeform 62"/>
+          <p:cNvSpPr/>
+          <p:nvPr/>
+        </p:nvSpPr>
+        <p:spPr>
+          <a:xfrm flipV="1">
+            <a:off x="4191000" y="4876800"/>
+            <a:ext cx="2565995" cy="457200"/>
+          </a:xfrm>
+          <a:custGeom>
+            <a:avLst/>
+            <a:gdLst>
+              <a:gd name="connsiteX0" fmla="*/ 0 w 3048000"/>
+              <a:gd name="connsiteY0" fmla="*/ 203200 h 203200"/>
+              <a:gd name="connsiteX1" fmla="*/ 221673 w 3048000"/>
+              <a:gd name="connsiteY1" fmla="*/ 0 h 203200"/>
+              <a:gd name="connsiteX2" fmla="*/ 3048000 w 3048000"/>
+              <a:gd name="connsiteY2" fmla="*/ 0 h 203200"/>
+            </a:gdLst>
+            <a:ahLst/>
+            <a:cxnLst>
+              <a:cxn ang="0">
+                <a:pos x="connsiteX0" y="connsiteY0"/>
+              </a:cxn>
+              <a:cxn ang="0">
+                <a:pos x="connsiteX1" y="connsiteY1"/>
+              </a:cxn>
+              <a:cxn ang="0">
+                <a:pos x="connsiteX2" y="connsiteY2"/>
+              </a:cxn>
+            </a:cxnLst>
+            <a:rect l="l" t="t" r="r" b="b"/>
+            <a:pathLst>
+              <a:path w="3048000" h="203200">
+                <a:moveTo>
+                  <a:pt x="0" y="203200"/>
+                </a:moveTo>
+                <a:lnTo>
+                  <a:pt x="221673" y="0"/>
+                </a:lnTo>
+                <a:lnTo>
+                  <a:pt x="3048000" y="0"/>
+                </a:lnTo>
+              </a:path>
+            </a:pathLst>
+          </a:custGeom>
+          <a:noFill/>
+          <a:ln w="19050">
+            <a:solidFill>
+              <a:schemeClr val="accent3"/>
+            </a:solidFill>
+            <a:prstDash val="sysDot"/>
+            <a:headEnd type="none" w="med" len="med"/>
+            <a:tailEnd type="arrow" w="med" len="med"/>
+          </a:ln>
+          <a:effectLst/>
+        </p:spPr>
+        <p:style>
+          <a:lnRef idx="1">
+            <a:schemeClr val="accent2"/>
+          </a:lnRef>
+          <a:fillRef idx="2">
+            <a:schemeClr val="accent2"/>
+          </a:fillRef>
+          <a:effectRef idx="1">
+            <a:schemeClr val="accent2"/>
+          </a:effectRef>
+          <a:fontRef idx="minor">
+            <a:schemeClr val="dk1"/>
+          </a:fontRef>
+        </p:style>
+        <p:txBody>
+          <a:bodyPr rtlCol="0" anchor="ctr"/>
+          <a:lstStyle/>
+          <a:p>
+            <a:pPr algn="ctr"/>
+            <a:endParaRPr lang="en-SG"/>
+          </a:p>
+        </p:txBody>
+      </p:sp>
+      <p:sp>
+        <p:nvSpPr>
+          <p:cNvPr id="49" name="Rectangle 8"/>
+          <p:cNvSpPr/>
+          <p:nvPr/>
+        </p:nvSpPr>
+        <p:spPr>
+          <a:xfrm>
+            <a:off x="3581400" y="1905000"/>
+            <a:ext cx="1219200" cy="346760"/>
+          </a:xfrm>
+          <a:prstGeom prst="rect">
+            <a:avLst/>
+          </a:prstGeom>
+          <a:ln w="19050">
+            <a:solidFill>
+              <a:schemeClr val="accent3"/>
+            </a:solidFill>
+          </a:ln>
+          <a:effectLst/>
+        </p:spPr>
+        <p:style>
+          <a:lnRef idx="1">
+            <a:schemeClr val="accent3"/>
+          </a:lnRef>
+          <a:fillRef idx="2">
+            <a:schemeClr val="accent3"/>
+          </a:fillRef>
+          <a:effectRef idx="1">
+            <a:schemeClr val="accent3"/>
+          </a:effectRef>
+          <a:fontRef idx="minor">
+            <a:schemeClr val="dk1"/>
+          </a:fontRef>
+        </p:style>
+        <p:txBody>
+          <a:bodyPr rtlCol="0" anchor="ctr"/>
+          <a:lstStyle/>
+          <a:p>
+            <a:pPr algn="ctr"/>
+            <a:r>
+              <a:rPr lang="en-US" sz="1050" b="1" dirty="0" err="1" smtClean="0">
+                <a:solidFill>
+                  <a:schemeClr val="accent3">
+                    <a:lumMod val="75000"/>
+                  </a:schemeClr>
+                </a:solidFill>
+              </a:rPr>
+              <a:t>ReminderWindow</a:t>
+            </a:r>
+            <a:endParaRPr lang="en-SG" sz="1050" b="1" dirty="0">
+              <a:solidFill>
+                <a:schemeClr val="accent3">
+                  <a:lumMod val="75000"/>
+                </a:schemeClr>
+              </a:solidFill>
+            </a:endParaRPr>
+          </a:p>
+        </p:txBody>
+      </p:sp>
+      <p:cxnSp>
+        <p:nvCxnSpPr>
+          <p:cNvPr id="51" name="Elbow Connector 63"/>
+          <p:cNvCxnSpPr>
+            <a:stCxn id="9" idx="3"/>
+            <a:endCxn id="49" idx="1"/>
+          </p:cNvCxnSpPr>
+          <p:nvPr/>
+        </p:nvCxnSpPr>
+        <p:spPr>
+          <a:xfrm>
+            <a:off x="3186477" y="1944304"/>
+            <a:ext cx="394923" cy="134076"/>
+          </a:xfrm>
+          <a:prstGeom prst="bentConnector3">
+            <a:avLst>
+              <a:gd name="adj1" fmla="val 50000"/>
+            </a:avLst>
+          </a:prstGeom>
+          <a:ln w="19050">
+            <a:solidFill>
+              <a:srgbClr val="00B050"/>
+            </a:solidFill>
+            <a:headEnd type="none" w="med" len="med"/>
+            <a:tailEnd type="arrow" w="med" len="med"/>
+          </a:ln>
+          <a:effectLst/>
+        </p:spPr>
+        <p:style>
+          <a:lnRef idx="1">
+            <a:schemeClr val="accent2"/>
+          </a:lnRef>
+          <a:fillRef idx="2">
+            <a:schemeClr val="accent2"/>
+          </a:fillRef>
+          <a:effectRef idx="1">
+            <a:schemeClr val="accent2"/>
+          </a:effectRef>
+          <a:fontRef idx="minor">
+            <a:schemeClr val="dk1"/>
+          </a:fontRef>
+        </p:style>
+      </p:cxnSp>
+      <p:cxnSp>
+        <p:nvCxnSpPr>
+          <p:cNvPr id="52" name="Elbow Connector 51"/>
+          <p:cNvCxnSpPr>
+            <a:endCxn id="54" idx="3"/>
+          </p:cNvCxnSpPr>
+          <p:nvPr/>
+        </p:nvCxnSpPr>
+        <p:spPr>
+          <a:xfrm rot="16200000" flipH="1">
+            <a:off x="3356843" y="3043957"/>
+            <a:ext cx="2480621" cy="964706"/>
+          </a:xfrm>
+          <a:prstGeom prst="bentConnector4">
+            <a:avLst>
+              <a:gd name="adj1" fmla="val 52909"/>
+              <a:gd name="adj2" fmla="val 123696"/>
+            </a:avLst>
+          </a:prstGeom>
+          <a:ln w="19050">
+            <a:solidFill>
+              <a:schemeClr val="accent3"/>
+            </a:solidFill>
+            <a:headEnd type="none" w="med" len="med"/>
+            <a:tailEnd type="arrow" w="med" len="med"/>
+          </a:ln>
+          <a:effectLst/>
+        </p:spPr>
+        <p:style>
+          <a:lnRef idx="1">
+            <a:schemeClr val="accent2"/>
+          </a:lnRef>
+          <a:fillRef idx="2">
+            <a:schemeClr val="accent2"/>
+          </a:fillRef>
+          <a:effectRef idx="1">
+            <a:schemeClr val="accent2"/>
+          </a:effectRef>
+          <a:fontRef idx="minor">
+            <a:schemeClr val="dk1"/>
+          </a:fontRef>
+        </p:style>
+      </p:cxnSp>
     </p:spTree>
     <p:extLst>
       <p:ext uri="{BB962C8B-B14F-4D97-AF65-F5344CB8AC3E}">
@@ -5519,6 +5954,13 @@
   <p:clrMapOvr>
     <a:masterClrMapping/>
   </p:clrMapOvr>
+  <p:timing>
+    <p:tnLst>
+      <p:par>
+        <p:cTn xmlns:p14="http://schemas.microsoft.com/office/powerpoint/2010/main" id="1" dur="indefinite" restart="never" nodeType="tmRoot"/>
+      </p:par>
+    </p:tnLst>
+  </p:timing>
 </p:sld>
 </file>
 

</xml_diff>

<commit_message>
Fix style and update more image
</commit_message>
<xml_diff>
--- a/docs/diagrams/UiComponentClassDiagram.pptx
+++ b/docs/diagrams/UiComponentClassDiagram.pptx
@@ -208,7 +208,7 @@
           <a:p>
             <a:fld id="{F5CC4B3F-88C1-4FFA-B1B6-F41C21DC6924}" type="datetimeFigureOut">
               <a:rPr lang="en-US" smtClean="0"/>
-              <a:t>10/25/2017</a:t>
+              <a:t>11/11/2017</a:t>
             </a:fld>
             <a:endParaRPr lang="en-US"/>
           </a:p>
@@ -654,7 +654,7 @@
           <a:p>
             <a:fld id="{78C97017-6FC3-485B-9764-EAC9E56C1D49}" type="datetimeFigureOut">
               <a:rPr lang="en-US" smtClean="0"/>
-              <a:t>10/25/2017</a:t>
+              <a:t>11/11/2017</a:t>
             </a:fld>
             <a:endParaRPr lang="en-US"/>
           </a:p>
@@ -822,7 +822,7 @@
           <a:p>
             <a:fld id="{78C97017-6FC3-485B-9764-EAC9E56C1D49}" type="datetimeFigureOut">
               <a:rPr lang="en-US" smtClean="0"/>
-              <a:t>10/25/2017</a:t>
+              <a:t>11/11/2017</a:t>
             </a:fld>
             <a:endParaRPr lang="en-US"/>
           </a:p>
@@ -1000,7 +1000,7 @@
           <a:p>
             <a:fld id="{78C97017-6FC3-485B-9764-EAC9E56C1D49}" type="datetimeFigureOut">
               <a:rPr lang="en-US" smtClean="0"/>
-              <a:t>10/25/2017</a:t>
+              <a:t>11/11/2017</a:t>
             </a:fld>
             <a:endParaRPr lang="en-US"/>
           </a:p>
@@ -1168,7 +1168,7 @@
           <a:p>
             <a:fld id="{78C97017-6FC3-485B-9764-EAC9E56C1D49}" type="datetimeFigureOut">
               <a:rPr lang="en-US" smtClean="0"/>
-              <a:t>10/25/2017</a:t>
+              <a:t>11/11/2017</a:t>
             </a:fld>
             <a:endParaRPr lang="en-US"/>
           </a:p>
@@ -1413,7 +1413,7 @@
           <a:p>
             <a:fld id="{78C97017-6FC3-485B-9764-EAC9E56C1D49}" type="datetimeFigureOut">
               <a:rPr lang="en-US" smtClean="0"/>
-              <a:t>10/25/2017</a:t>
+              <a:t>11/11/2017</a:t>
             </a:fld>
             <a:endParaRPr lang="en-US"/>
           </a:p>
@@ -1698,7 +1698,7 @@
           <a:p>
             <a:fld id="{78C97017-6FC3-485B-9764-EAC9E56C1D49}" type="datetimeFigureOut">
               <a:rPr lang="en-US" smtClean="0"/>
-              <a:t>10/25/2017</a:t>
+              <a:t>11/11/2017</a:t>
             </a:fld>
             <a:endParaRPr lang="en-US"/>
           </a:p>
@@ -2117,7 +2117,7 @@
           <a:p>
             <a:fld id="{78C97017-6FC3-485B-9764-EAC9E56C1D49}" type="datetimeFigureOut">
               <a:rPr lang="en-US" smtClean="0"/>
-              <a:t>10/25/2017</a:t>
+              <a:t>11/11/2017</a:t>
             </a:fld>
             <a:endParaRPr lang="en-US"/>
           </a:p>
@@ -2234,7 +2234,7 @@
           <a:p>
             <a:fld id="{78C97017-6FC3-485B-9764-EAC9E56C1D49}" type="datetimeFigureOut">
               <a:rPr lang="en-US" smtClean="0"/>
-              <a:t>10/25/2017</a:t>
+              <a:t>11/11/2017</a:t>
             </a:fld>
             <a:endParaRPr lang="en-US"/>
           </a:p>
@@ -2329,7 +2329,7 @@
           <a:p>
             <a:fld id="{78C97017-6FC3-485B-9764-EAC9E56C1D49}" type="datetimeFigureOut">
               <a:rPr lang="en-US" smtClean="0"/>
-              <a:t>10/25/2017</a:t>
+              <a:t>11/11/2017</a:t>
             </a:fld>
             <a:endParaRPr lang="en-US"/>
           </a:p>
@@ -2604,7 +2604,7 @@
           <a:p>
             <a:fld id="{78C97017-6FC3-485B-9764-EAC9E56C1D49}" type="datetimeFigureOut">
               <a:rPr lang="en-US" smtClean="0"/>
-              <a:t>10/25/2017</a:t>
+              <a:t>11/11/2017</a:t>
             </a:fld>
             <a:endParaRPr lang="en-US"/>
           </a:p>
@@ -2856,7 +2856,7 @@
           <a:p>
             <a:fld id="{78C97017-6FC3-485B-9764-EAC9E56C1D49}" type="datetimeFigureOut">
               <a:rPr lang="en-US" smtClean="0"/>
-              <a:t>10/25/2017</a:t>
+              <a:t>11/11/2017</a:t>
             </a:fld>
             <a:endParaRPr lang="en-US"/>
           </a:p>
@@ -3067,7 +3067,7 @@
           <a:p>
             <a:fld id="{78C97017-6FC3-485B-9764-EAC9E56C1D49}" type="datetimeFigureOut">
               <a:rPr lang="en-US" smtClean="0"/>
-              <a:t>10/25/2017</a:t>
+              <a:t>11/11/2017</a:t>
             </a:fld>
             <a:endParaRPr lang="en-US"/>
           </a:p>
@@ -3450,7 +3450,7 @@
         </p:nvSpPr>
         <p:spPr>
           <a:xfrm>
-            <a:off x="1217465" y="1447800"/>
+            <a:off x="1217465" y="1437350"/>
             <a:ext cx="4954735" cy="4343400"/>
           </a:xfrm>
           <a:prstGeom prst="roundRect">
@@ -3572,7 +3572,7 @@
         </p:nvSpPr>
         <p:spPr>
           <a:xfrm>
-            <a:off x="2584109" y="3213297"/>
+            <a:off x="2584134" y="3175169"/>
             <a:ext cx="1093635" cy="236841"/>
           </a:xfrm>
           <a:prstGeom prst="rect">
@@ -3885,7 +3885,7 @@
         </p:nvSpPr>
         <p:spPr>
           <a:xfrm>
-            <a:off x="2588534" y="3922409"/>
+            <a:off x="2588534" y="3765659"/>
             <a:ext cx="1093635" cy="236841"/>
           </a:xfrm>
           <a:prstGeom prst="rect">
@@ -3945,7 +3945,7 @@
         </p:nvSpPr>
         <p:spPr>
           <a:xfrm>
-            <a:off x="2587082" y="4988045"/>
+            <a:off x="2593881" y="5135238"/>
             <a:ext cx="1093635" cy="236841"/>
           </a:xfrm>
           <a:prstGeom prst="rect">
@@ -4005,8 +4005,8 @@
         </p:nvSpPr>
         <p:spPr>
           <a:xfrm>
-            <a:off x="2588533" y="4565955"/>
-            <a:ext cx="1093635" cy="236841"/>
+            <a:off x="2588533" y="4787100"/>
+            <a:ext cx="1242890" cy="236841"/>
           </a:xfrm>
           <a:prstGeom prst="rect">
             <a:avLst/>
@@ -4065,8 +4065,8 @@
         </p:nvSpPr>
         <p:spPr>
           <a:xfrm>
-            <a:off x="3839323" y="4784054"/>
-            <a:ext cx="1040906" cy="236841"/>
+            <a:off x="4035603" y="4971162"/>
+            <a:ext cx="1108343" cy="236841"/>
           </a:xfrm>
           <a:prstGeom prst="rect">
             <a:avLst/>
@@ -4125,7 +4125,7 @@
         </p:nvSpPr>
         <p:spPr>
           <a:xfrm>
-            <a:off x="2585897" y="5311093"/>
+            <a:off x="2586809" y="5460255"/>
             <a:ext cx="1093635" cy="236841"/>
           </a:xfrm>
           <a:prstGeom prst="rect">
@@ -4233,7 +4233,7 @@
         </p:nvCxnSpPr>
         <p:spPr>
           <a:xfrm rot="16200000" flipH="1">
-            <a:off x="2302118" y="3068377"/>
+            <a:off x="2302118" y="3024493"/>
             <a:ext cx="390218" cy="166245"/>
           </a:xfrm>
           <a:prstGeom prst="bentConnector2">
@@ -4271,7 +4271,7 @@
         </p:nvSpPr>
         <p:spPr>
           <a:xfrm>
-            <a:off x="2586809" y="3574948"/>
+            <a:off x="2586809" y="3470448"/>
             <a:ext cx="1095361" cy="236841"/>
           </a:xfrm>
           <a:prstGeom prst="rect">
@@ -4333,8 +4333,8 @@
         </p:nvCxnSpPr>
         <p:spPr>
           <a:xfrm rot="16200000" flipH="1">
-            <a:off x="1941910" y="3394206"/>
-            <a:ext cx="1120274" cy="172973"/>
+            <a:off x="1941909" y="3237455"/>
+            <a:ext cx="1120276" cy="172973"/>
           </a:xfrm>
           <a:prstGeom prst="bentConnector2">
             <a:avLst/>
@@ -4371,7 +4371,7 @@
         </p:nvCxnSpPr>
         <p:spPr>
           <a:xfrm rot="16200000" flipH="1">
-            <a:off x="1795200" y="3891043"/>
+            <a:off x="1795200" y="4113858"/>
             <a:ext cx="1410266" cy="176400"/>
           </a:xfrm>
           <a:prstGeom prst="bentConnector2">
@@ -4409,7 +4409,7 @@
         </p:nvCxnSpPr>
         <p:spPr>
           <a:xfrm rot="16200000" flipH="1">
-            <a:off x="1595155" y="4121461"/>
+            <a:off x="1594117" y="4258327"/>
             <a:ext cx="1814155" cy="176401"/>
           </a:xfrm>
           <a:prstGeom prst="bentConnector2">
@@ -4449,8 +4449,8 @@
         </p:nvCxnSpPr>
         <p:spPr>
           <a:xfrm rot="16200000" flipH="1">
-            <a:off x="1004462" y="3848079"/>
-            <a:ext cx="2741534" cy="421336"/>
+            <a:off x="928698" y="3920564"/>
+            <a:ext cx="2893975" cy="422248"/>
           </a:xfrm>
           <a:prstGeom prst="bentConnector2">
             <a:avLst/>
@@ -4570,7 +4570,7 @@
         <p:spPr>
           <a:xfrm flipV="1">
             <a:off x="3682170" y="2286000"/>
-            <a:ext cx="1847799" cy="1407369"/>
+            <a:ext cx="1847799" cy="1302869"/>
           </a:xfrm>
           <a:prstGeom prst="bentConnector2">
             <a:avLst/>
@@ -4610,8 +4610,8 @@
         </p:nvCxnSpPr>
         <p:spPr>
           <a:xfrm rot="5400000">
-            <a:off x="3896862" y="3269367"/>
-            <a:ext cx="2616475" cy="649740"/>
+            <a:off x="3935167" y="3494780"/>
+            <a:ext cx="2803583" cy="386023"/>
           </a:xfrm>
           <a:prstGeom prst="bentConnector2">
             <a:avLst/>
@@ -4651,8 +4651,8 @@
         </p:nvCxnSpPr>
         <p:spPr>
           <a:xfrm rot="5400000">
-            <a:off x="3728654" y="2239515"/>
-            <a:ext cx="1754830" cy="1847800"/>
+            <a:off x="3807029" y="2161140"/>
+            <a:ext cx="1598080" cy="1847800"/>
           </a:xfrm>
           <a:prstGeom prst="bentConnector2">
             <a:avLst/>
@@ -4733,8 +4733,8 @@
         </p:nvCxnSpPr>
         <p:spPr>
           <a:xfrm rot="5400000">
-            <a:off x="3195110" y="2771607"/>
-            <a:ext cx="2820466" cy="1849252"/>
+            <a:off x="3124914" y="2848603"/>
+            <a:ext cx="2967659" cy="1842453"/>
           </a:xfrm>
           <a:prstGeom prst="bentConnector2">
             <a:avLst/>
@@ -4774,8 +4774,8 @@
         </p:nvCxnSpPr>
         <p:spPr>
           <a:xfrm rot="5400000">
-            <a:off x="3032994" y="2932539"/>
-            <a:ext cx="3143514" cy="1850437"/>
+            <a:off x="2958869" y="3007576"/>
+            <a:ext cx="3292676" cy="1849525"/>
           </a:xfrm>
           <a:prstGeom prst="bentConnector2">
             <a:avLst/>
@@ -5073,7 +5073,7 @@
         </p:nvCxnSpPr>
         <p:spPr>
           <a:xfrm rot="16200000" flipH="1">
-            <a:off x="2221425" y="3323671"/>
+            <a:off x="2221425" y="3224396"/>
             <a:ext cx="554704" cy="174673"/>
           </a:xfrm>
           <a:prstGeom prst="bentConnector2">
@@ -5114,8 +5114,8 @@
         </p:nvCxnSpPr>
         <p:spPr>
           <a:xfrm rot="5400000">
-            <a:off x="4080998" y="1882747"/>
-            <a:ext cx="1045718" cy="1852225"/>
+            <a:off x="4100074" y="1863695"/>
+            <a:ext cx="1007590" cy="1852200"/>
           </a:xfrm>
           <a:prstGeom prst="bentConnector2">
             <a:avLst/>
@@ -5155,8 +5155,8 @@
         </p:nvCxnSpPr>
         <p:spPr>
           <a:xfrm rot="16200000" flipH="1">
-            <a:off x="3437498" y="4500649"/>
-            <a:ext cx="99679" cy="703972"/>
+            <a:off x="3589969" y="4643949"/>
+            <a:ext cx="65642" cy="825625"/>
           </a:xfrm>
           <a:prstGeom prst="bentConnector2">
             <a:avLst/>
@@ -5196,8 +5196,8 @@
         </p:nvCxnSpPr>
         <p:spPr>
           <a:xfrm rot="5400000">
-            <a:off x="3406881" y="2561288"/>
-            <a:ext cx="2398376" cy="1847801"/>
+            <a:off x="3370936" y="2746487"/>
+            <a:ext cx="2619521" cy="1698546"/>
           </a:xfrm>
           <a:prstGeom prst="bentConnector2">
             <a:avLst/>
@@ -5316,8 +5316,8 @@
         </p:nvSpPr>
         <p:spPr>
           <a:xfrm flipV="1">
-            <a:off x="4325334" y="5045077"/>
-            <a:ext cx="2409270" cy="259224"/>
+            <a:off x="4648200" y="5236391"/>
+            <a:ext cx="2086404" cy="156908"/>
           </a:xfrm>
           <a:custGeom>
             <a:avLst/>
@@ -5618,8 +5618,8 @@
         </p:nvSpPr>
         <p:spPr>
           <a:xfrm>
-            <a:off x="2584180" y="4240938"/>
-            <a:ext cx="1093635" cy="236841"/>
+            <a:off x="2584180" y="4057325"/>
+            <a:ext cx="1093635" cy="315236"/>
           </a:xfrm>
           <a:prstGeom prst="rect">
             <a:avLst/>
@@ -5658,9 +5658,9 @@
                   </a:schemeClr>
                 </a:solidFill>
               </a:rPr>
-              <a:t>InsuranceProfile</a:t>
-            </a:r>
-            <a:endParaRPr lang="en-SG" sz="1050" b="1" dirty="0">
+              <a:t>InsuranceProfilePanel</a:t>
+            </a:r>
+            <a:endParaRPr lang="en-US" sz="1050" b="1" dirty="0" smtClean="0">
               <a:solidFill>
                 <a:schemeClr val="accent3">
                   <a:lumMod val="75000"/>
@@ -5678,7 +5678,7 @@
         </p:nvCxnSpPr>
         <p:spPr>
           <a:xfrm rot="16200000" flipH="1">
-            <a:off x="1941817" y="3725291"/>
+            <a:off x="1941817" y="3578991"/>
             <a:ext cx="1120274" cy="172973"/>
           </a:xfrm>
           <a:prstGeom prst="bentConnector2">
@@ -5716,7 +5716,7 @@
         </p:nvSpPr>
         <p:spPr>
           <a:xfrm flipV="1">
-            <a:off x="3694832" y="4371915"/>
+            <a:off x="3694832" y="4214950"/>
             <a:ext cx="3039772" cy="183991"/>
           </a:xfrm>
           <a:custGeom>
@@ -5798,7 +5798,7 @@
         </p:nvSpPr>
         <p:spPr>
           <a:xfrm flipV="1">
-            <a:off x="3703852" y="4054369"/>
+            <a:off x="3703852" y="3899338"/>
             <a:ext cx="3039772" cy="183991"/>
           </a:xfrm>
           <a:custGeom>
@@ -5872,6 +5872,289 @@
           </a:p>
         </p:txBody>
       </p:sp>
+      <p:sp>
+        <p:nvSpPr>
+          <p:cNvPr id="66" name="Rectangle 11"/>
+          <p:cNvSpPr/>
+          <p:nvPr/>
+        </p:nvSpPr>
+        <p:spPr>
+          <a:xfrm>
+            <a:off x="2590800" y="4440500"/>
+            <a:ext cx="1241097" cy="236841"/>
+          </a:xfrm>
+          <a:prstGeom prst="rect">
+            <a:avLst/>
+          </a:prstGeom>
+          <a:ln w="19050">
+            <a:solidFill>
+              <a:schemeClr val="accent3"/>
+            </a:solidFill>
+          </a:ln>
+          <a:effectLst/>
+        </p:spPr>
+        <p:style>
+          <a:lnRef idx="1">
+            <a:schemeClr val="accent3"/>
+          </a:lnRef>
+          <a:fillRef idx="2">
+            <a:schemeClr val="accent3"/>
+          </a:fillRef>
+          <a:effectRef idx="1">
+            <a:schemeClr val="accent3"/>
+          </a:effectRef>
+          <a:fontRef idx="minor">
+            <a:schemeClr val="dk1"/>
+          </a:fontRef>
+        </p:style>
+        <p:txBody>
+          <a:bodyPr rtlCol="0" anchor="ctr"/>
+          <a:lstStyle/>
+          <a:p>
+            <a:pPr algn="ctr"/>
+            <a:r>
+              <a:rPr lang="en-US" sz="1050" b="1" dirty="0" err="1" smtClean="0">
+                <a:solidFill>
+                  <a:schemeClr val="accent3">
+                    <a:lumMod val="75000"/>
+                  </a:schemeClr>
+                </a:solidFill>
+              </a:rPr>
+              <a:t>InsuranceListPanel</a:t>
+            </a:r>
+            <a:endParaRPr lang="en-SG" sz="1050" b="1" dirty="0">
+              <a:solidFill>
+                <a:schemeClr val="accent3">
+                  <a:lumMod val="75000"/>
+                </a:schemeClr>
+              </a:solidFill>
+            </a:endParaRPr>
+          </a:p>
+        </p:txBody>
+      </p:sp>
+      <p:sp>
+        <p:nvSpPr>
+          <p:cNvPr id="67" name="Rectangle 11"/>
+          <p:cNvSpPr/>
+          <p:nvPr/>
+        </p:nvSpPr>
+        <p:spPr>
+          <a:xfrm>
+            <a:off x="4033084" y="4624562"/>
+            <a:ext cx="1110863" cy="236841"/>
+          </a:xfrm>
+          <a:prstGeom prst="rect">
+            <a:avLst/>
+          </a:prstGeom>
+          <a:ln w="19050">
+            <a:solidFill>
+              <a:schemeClr val="accent3"/>
+            </a:solidFill>
+          </a:ln>
+          <a:effectLst/>
+        </p:spPr>
+        <p:style>
+          <a:lnRef idx="1">
+            <a:schemeClr val="accent3"/>
+          </a:lnRef>
+          <a:fillRef idx="2">
+            <a:schemeClr val="accent3"/>
+          </a:fillRef>
+          <a:effectRef idx="1">
+            <a:schemeClr val="accent3"/>
+          </a:effectRef>
+          <a:fontRef idx="minor">
+            <a:schemeClr val="dk1"/>
+          </a:fontRef>
+        </p:style>
+        <p:txBody>
+          <a:bodyPr rtlCol="0" anchor="ctr"/>
+          <a:lstStyle/>
+          <a:p>
+            <a:pPr algn="ctr"/>
+            <a:r>
+              <a:rPr lang="en-US" sz="1050" b="1" dirty="0" err="1" smtClean="0">
+                <a:solidFill>
+                  <a:schemeClr val="accent3">
+                    <a:lumMod val="75000"/>
+                  </a:schemeClr>
+                </a:solidFill>
+              </a:rPr>
+              <a:t>InsuranceCard</a:t>
+            </a:r>
+            <a:endParaRPr lang="en-SG" sz="1050" b="1" dirty="0">
+              <a:solidFill>
+                <a:schemeClr val="accent3">
+                  <a:lumMod val="75000"/>
+                </a:schemeClr>
+              </a:solidFill>
+            </a:endParaRPr>
+          </a:p>
+        </p:txBody>
+      </p:sp>
+      <p:cxnSp>
+        <p:nvCxnSpPr>
+          <p:cNvPr id="68" name="Elbow Connector 63"/>
+          <p:cNvCxnSpPr>
+            <a:endCxn id="66" idx="3"/>
+          </p:cNvCxnSpPr>
+          <p:nvPr/>
+        </p:nvCxnSpPr>
+        <p:spPr>
+          <a:xfrm rot="5400000">
+            <a:off x="3372311" y="2398987"/>
+            <a:ext cx="2619521" cy="1700347"/>
+          </a:xfrm>
+          <a:prstGeom prst="bentConnector2">
+            <a:avLst/>
+          </a:prstGeom>
+          <a:ln w="6350">
+            <a:solidFill>
+              <a:schemeClr val="accent3"/>
+            </a:solidFill>
+            <a:headEnd type="none" w="med" len="med"/>
+            <a:tailEnd type="none" w="med" len="med"/>
+          </a:ln>
+          <a:effectLst/>
+        </p:spPr>
+        <p:style>
+          <a:lnRef idx="1">
+            <a:schemeClr val="accent2"/>
+          </a:lnRef>
+          <a:fillRef idx="2">
+            <a:schemeClr val="accent2"/>
+          </a:fillRef>
+          <a:effectRef idx="1">
+            <a:schemeClr val="accent2"/>
+          </a:effectRef>
+          <a:fontRef idx="minor">
+            <a:schemeClr val="dk1"/>
+          </a:fontRef>
+        </p:style>
+      </p:cxnSp>
+      <p:sp>
+        <p:nvSpPr>
+          <p:cNvPr id="69" name="Freeform 68"/>
+          <p:cNvSpPr/>
+          <p:nvPr/>
+        </p:nvSpPr>
+        <p:spPr>
+          <a:xfrm>
+            <a:off x="5143946" y="4760975"/>
+            <a:ext cx="1592924" cy="5"/>
+          </a:xfrm>
+          <a:custGeom>
+            <a:avLst/>
+            <a:gdLst>
+              <a:gd name="connsiteX0" fmla="*/ 0 w 3048000"/>
+              <a:gd name="connsiteY0" fmla="*/ 203200 h 203200"/>
+              <a:gd name="connsiteX1" fmla="*/ 221673 w 3048000"/>
+              <a:gd name="connsiteY1" fmla="*/ 0 h 203200"/>
+              <a:gd name="connsiteX2" fmla="*/ 3048000 w 3048000"/>
+              <a:gd name="connsiteY2" fmla="*/ 0 h 203200"/>
+            </a:gdLst>
+            <a:ahLst/>
+            <a:cxnLst>
+              <a:cxn ang="0">
+                <a:pos x="connsiteX0" y="connsiteY0"/>
+              </a:cxn>
+              <a:cxn ang="0">
+                <a:pos x="connsiteX1" y="connsiteY1"/>
+              </a:cxn>
+              <a:cxn ang="0">
+                <a:pos x="connsiteX2" y="connsiteY2"/>
+              </a:cxn>
+            </a:cxnLst>
+            <a:rect l="l" t="t" r="r" b="b"/>
+            <a:pathLst>
+              <a:path w="3048000" h="203200">
+                <a:moveTo>
+                  <a:pt x="0" y="203200"/>
+                </a:moveTo>
+                <a:lnTo>
+                  <a:pt x="221673" y="0"/>
+                </a:lnTo>
+                <a:lnTo>
+                  <a:pt x="3048000" y="0"/>
+                </a:lnTo>
+              </a:path>
+            </a:pathLst>
+          </a:custGeom>
+          <a:noFill/>
+          <a:ln w="19050">
+            <a:solidFill>
+              <a:schemeClr val="accent3"/>
+            </a:solidFill>
+            <a:prstDash val="sysDot"/>
+            <a:headEnd type="none" w="med" len="med"/>
+            <a:tailEnd type="arrow" w="med" len="med"/>
+          </a:ln>
+          <a:effectLst/>
+        </p:spPr>
+        <p:style>
+          <a:lnRef idx="1">
+            <a:schemeClr val="accent2"/>
+          </a:lnRef>
+          <a:fillRef idx="2">
+            <a:schemeClr val="accent2"/>
+          </a:fillRef>
+          <a:effectRef idx="1">
+            <a:schemeClr val="accent2"/>
+          </a:effectRef>
+          <a:fontRef idx="minor">
+            <a:schemeClr val="dk1"/>
+          </a:fontRef>
+        </p:style>
+        <p:txBody>
+          <a:bodyPr rtlCol="0" anchor="ctr"/>
+          <a:lstStyle/>
+          <a:p>
+            <a:pPr algn="ctr"/>
+            <a:endParaRPr lang="en-SG"/>
+          </a:p>
+        </p:txBody>
+      </p:sp>
+      <p:cxnSp>
+        <p:nvCxnSpPr>
+          <p:cNvPr id="70" name="Elbow Connector 69"/>
+          <p:cNvCxnSpPr>
+            <a:stCxn id="66" idx="2"/>
+            <a:endCxn id="67" idx="1"/>
+          </p:cNvCxnSpPr>
+          <p:nvPr/>
+        </p:nvCxnSpPr>
+        <p:spPr>
+          <a:xfrm rot="16200000" flipH="1">
+            <a:off x="3589395" y="4299294"/>
+            <a:ext cx="65642" cy="821735"/>
+          </a:xfrm>
+          <a:prstGeom prst="bentConnector2">
+            <a:avLst/>
+          </a:prstGeom>
+          <a:ln w="19050">
+            <a:solidFill>
+              <a:schemeClr val="accent3"/>
+            </a:solidFill>
+            <a:headEnd type="none" w="med" len="med"/>
+            <a:tailEnd type="arrow" w="med" len="med"/>
+          </a:ln>
+          <a:effectLst/>
+        </p:spPr>
+        <p:style>
+          <a:lnRef idx="1">
+            <a:schemeClr val="accent2"/>
+          </a:lnRef>
+          <a:fillRef idx="2">
+            <a:schemeClr val="accent2"/>
+          </a:fillRef>
+          <a:effectRef idx="1">
+            <a:schemeClr val="accent2"/>
+          </a:effectRef>
+          <a:fontRef idx="minor">
+            <a:schemeClr val="dk1"/>
+          </a:fontRef>
+        </p:style>
+      </p:cxnSp>
     </p:spTree>
     <p:extLst>
       <p:ext uri="{BB962C8B-B14F-4D97-AF65-F5344CB8AC3E}">

</xml_diff>

<commit_message>
Update documentation for autocomplete feature
</commit_message>
<xml_diff>
--- a/docs/diagrams/UiComponentClassDiagram.pptx
+++ b/docs/diagrams/UiComponentClassDiagram.pptx
@@ -208,7 +208,7 @@
           <a:p>
             <a:fld id="{F5CC4B3F-88C1-4FFA-B1B6-F41C21DC6924}" type="datetimeFigureOut">
               <a:rPr lang="en-US" smtClean="0"/>
-              <a:t>11/1/17</a:t>
+              <a:t>11/11/17</a:t>
             </a:fld>
             <a:endParaRPr lang="en-US"/>
           </a:p>
@@ -654,7 +654,7 @@
           <a:p>
             <a:fld id="{78C97017-6FC3-485B-9764-EAC9E56C1D49}" type="datetimeFigureOut">
               <a:rPr lang="en-US" smtClean="0"/>
-              <a:t>11/1/17</a:t>
+              <a:t>11/11/17</a:t>
             </a:fld>
             <a:endParaRPr lang="en-US"/>
           </a:p>
@@ -822,7 +822,7 @@
           <a:p>
             <a:fld id="{78C97017-6FC3-485B-9764-EAC9E56C1D49}" type="datetimeFigureOut">
               <a:rPr lang="en-US" smtClean="0"/>
-              <a:t>11/1/17</a:t>
+              <a:t>11/11/17</a:t>
             </a:fld>
             <a:endParaRPr lang="en-US"/>
           </a:p>
@@ -1000,7 +1000,7 @@
           <a:p>
             <a:fld id="{78C97017-6FC3-485B-9764-EAC9E56C1D49}" type="datetimeFigureOut">
               <a:rPr lang="en-US" smtClean="0"/>
-              <a:t>11/1/17</a:t>
+              <a:t>11/11/17</a:t>
             </a:fld>
             <a:endParaRPr lang="en-US"/>
           </a:p>
@@ -1168,7 +1168,7 @@
           <a:p>
             <a:fld id="{78C97017-6FC3-485B-9764-EAC9E56C1D49}" type="datetimeFigureOut">
               <a:rPr lang="en-US" smtClean="0"/>
-              <a:t>11/1/17</a:t>
+              <a:t>11/11/17</a:t>
             </a:fld>
             <a:endParaRPr lang="en-US"/>
           </a:p>
@@ -1413,7 +1413,7 @@
           <a:p>
             <a:fld id="{78C97017-6FC3-485B-9764-EAC9E56C1D49}" type="datetimeFigureOut">
               <a:rPr lang="en-US" smtClean="0"/>
-              <a:t>11/1/17</a:t>
+              <a:t>11/11/17</a:t>
             </a:fld>
             <a:endParaRPr lang="en-US"/>
           </a:p>
@@ -1698,7 +1698,7 @@
           <a:p>
             <a:fld id="{78C97017-6FC3-485B-9764-EAC9E56C1D49}" type="datetimeFigureOut">
               <a:rPr lang="en-US" smtClean="0"/>
-              <a:t>11/1/17</a:t>
+              <a:t>11/11/17</a:t>
             </a:fld>
             <a:endParaRPr lang="en-US"/>
           </a:p>
@@ -2117,7 +2117,7 @@
           <a:p>
             <a:fld id="{78C97017-6FC3-485B-9764-EAC9E56C1D49}" type="datetimeFigureOut">
               <a:rPr lang="en-US" smtClean="0"/>
-              <a:t>11/1/17</a:t>
+              <a:t>11/11/17</a:t>
             </a:fld>
             <a:endParaRPr lang="en-US"/>
           </a:p>
@@ -2234,7 +2234,7 @@
           <a:p>
             <a:fld id="{78C97017-6FC3-485B-9764-EAC9E56C1D49}" type="datetimeFigureOut">
               <a:rPr lang="en-US" smtClean="0"/>
-              <a:t>11/1/17</a:t>
+              <a:t>11/11/17</a:t>
             </a:fld>
             <a:endParaRPr lang="en-US"/>
           </a:p>
@@ -2329,7 +2329,7 @@
           <a:p>
             <a:fld id="{78C97017-6FC3-485B-9764-EAC9E56C1D49}" type="datetimeFigureOut">
               <a:rPr lang="en-US" smtClean="0"/>
-              <a:t>11/1/17</a:t>
+              <a:t>11/11/17</a:t>
             </a:fld>
             <a:endParaRPr lang="en-US"/>
           </a:p>
@@ -2604,7 +2604,7 @@
           <a:p>
             <a:fld id="{78C97017-6FC3-485B-9764-EAC9E56C1D49}" type="datetimeFigureOut">
               <a:rPr lang="en-US" smtClean="0"/>
-              <a:t>11/1/17</a:t>
+              <a:t>11/11/17</a:t>
             </a:fld>
             <a:endParaRPr lang="en-US"/>
           </a:p>
@@ -2856,7 +2856,7 @@
           <a:p>
             <a:fld id="{78C97017-6FC3-485B-9764-EAC9E56C1D49}" type="datetimeFigureOut">
               <a:rPr lang="en-US" smtClean="0"/>
-              <a:t>11/1/17</a:t>
+              <a:t>11/11/17</a:t>
             </a:fld>
             <a:endParaRPr lang="en-US"/>
           </a:p>
@@ -3067,7 +3067,7 @@
           <a:p>
             <a:fld id="{78C97017-6FC3-485B-9764-EAC9E56C1D49}" type="datetimeFigureOut">
               <a:rPr lang="en-US" smtClean="0"/>
-              <a:t>11/1/17</a:t>
+              <a:t>11/11/17</a:t>
             </a:fld>
             <a:endParaRPr lang="en-US"/>
           </a:p>
@@ -3451,7 +3451,7 @@
         <p:spPr>
           <a:xfrm>
             <a:off x="1217465" y="1447800"/>
-            <a:ext cx="4917083" cy="3962400"/>
+            <a:ext cx="4878535" cy="4191000"/>
           </a:xfrm>
           <a:prstGeom prst="roundRect">
             <a:avLst>
@@ -3885,7 +3885,7 @@
         </p:nvSpPr>
         <p:spPr>
           <a:xfrm>
-            <a:off x="2592528" y="3649359"/>
+            <a:off x="2592528" y="3856718"/>
             <a:ext cx="1093635" cy="236841"/>
           </a:xfrm>
           <a:prstGeom prst="rect">
@@ -3945,7 +3945,7 @@
         </p:nvSpPr>
         <p:spPr>
           <a:xfrm>
-            <a:off x="2592527" y="4563759"/>
+            <a:off x="2592527" y="4771118"/>
             <a:ext cx="1093635" cy="236841"/>
           </a:xfrm>
           <a:prstGeom prst="rect">
@@ -4005,7 +4005,7 @@
         </p:nvSpPr>
         <p:spPr>
           <a:xfrm>
-            <a:off x="2592526" y="3991960"/>
+            <a:off x="2592526" y="4199319"/>
             <a:ext cx="1093635" cy="236841"/>
           </a:xfrm>
           <a:prstGeom prst="rect">
@@ -4065,7 +4065,7 @@
         </p:nvSpPr>
         <p:spPr>
           <a:xfrm>
-            <a:off x="3839323" y="4228801"/>
+            <a:off x="3839323" y="4436160"/>
             <a:ext cx="1040906" cy="236841"/>
           </a:xfrm>
           <a:prstGeom prst="rect">
@@ -4125,7 +4125,7 @@
         </p:nvSpPr>
         <p:spPr>
           <a:xfrm>
-            <a:off x="2592528" y="4966000"/>
+            <a:off x="2592528" y="5173359"/>
             <a:ext cx="1093635" cy="236841"/>
           </a:xfrm>
           <a:prstGeom prst="rect">
@@ -4274,7 +4274,7 @@
         </p:nvSpPr>
         <p:spPr>
           <a:xfrm>
-            <a:off x="2590799" y="3304308"/>
+            <a:off x="2590799" y="3511667"/>
             <a:ext cx="1095361" cy="236841"/>
           </a:xfrm>
           <a:prstGeom prst="rect">
@@ -4337,8 +4337,8 @@
         </p:nvCxnSpPr>
         <p:spPr>
           <a:xfrm rot="16200000" flipH="1">
-            <a:off x="2054450" y="3229701"/>
-            <a:ext cx="899755" cy="176402"/>
+            <a:off x="1950770" y="3333381"/>
+            <a:ext cx="1107114" cy="176402"/>
           </a:xfrm>
           <a:prstGeom prst="bentConnector2">
             <a:avLst/>
@@ -4378,8 +4378,8 @@
         </p:nvCxnSpPr>
         <p:spPr>
           <a:xfrm rot="16200000" flipH="1">
-            <a:off x="1883148" y="3401003"/>
-            <a:ext cx="1242356" cy="176400"/>
+            <a:off x="1779469" y="3504682"/>
+            <a:ext cx="1449715" cy="176400"/>
           </a:xfrm>
           <a:prstGeom prst="bentConnector2">
             <a:avLst/>
@@ -4419,8 +4419,8 @@
         </p:nvCxnSpPr>
         <p:spPr>
           <a:xfrm rot="16200000" flipH="1">
-            <a:off x="1597249" y="3686901"/>
-            <a:ext cx="1814155" cy="176401"/>
+            <a:off x="1493569" y="3790581"/>
+            <a:ext cx="2021514" cy="176401"/>
           </a:xfrm>
           <a:prstGeom prst="bentConnector2">
             <a:avLst/>
@@ -4459,8 +4459,8 @@
         </p:nvCxnSpPr>
         <p:spPr>
           <a:xfrm rot="16200000" flipH="1">
-            <a:off x="1184119" y="3676012"/>
-            <a:ext cx="2396440" cy="420377"/>
+            <a:off x="1108502" y="3807754"/>
+            <a:ext cx="2585326" cy="382726"/>
           </a:xfrm>
           <a:prstGeom prst="bentConnector2">
             <a:avLst/>
@@ -4580,7 +4580,7 @@
         <p:spPr>
           <a:xfrm flipV="1">
             <a:off x="3686160" y="2286000"/>
-            <a:ext cx="1843809" cy="1136729"/>
+            <a:ext cx="1843809" cy="1344088"/>
           </a:xfrm>
           <a:prstGeom prst="bentConnector2">
             <a:avLst/>
@@ -4620,8 +4620,8 @@
         </p:nvCxnSpPr>
         <p:spPr>
           <a:xfrm rot="5400000">
-            <a:off x="4174488" y="2991741"/>
-            <a:ext cx="2061222" cy="649740"/>
+            <a:off x="4070809" y="3095420"/>
+            <a:ext cx="2268581" cy="649740"/>
           </a:xfrm>
           <a:prstGeom prst="bentConnector2">
             <a:avLst/>
@@ -4661,8 +4661,8 @@
         </p:nvCxnSpPr>
         <p:spPr>
           <a:xfrm rot="5400000">
-            <a:off x="3867176" y="2104987"/>
-            <a:ext cx="1481780" cy="1843806"/>
+            <a:off x="3763497" y="2208666"/>
+            <a:ext cx="1689139" cy="1843806"/>
           </a:xfrm>
           <a:prstGeom prst="bentConnector2">
             <a:avLst/>
@@ -4743,8 +4743,8 @@
         </p:nvCxnSpPr>
         <p:spPr>
           <a:xfrm rot="5400000">
-            <a:off x="3409976" y="2562187"/>
-            <a:ext cx="2396180" cy="1843807"/>
+            <a:off x="3306297" y="2665866"/>
+            <a:ext cx="2603539" cy="1843807"/>
           </a:xfrm>
           <a:prstGeom prst="bentConnector2">
             <a:avLst/>
@@ -4784,8 +4784,8 @@
         </p:nvCxnSpPr>
         <p:spPr>
           <a:xfrm rot="5400000">
-            <a:off x="3208856" y="2763307"/>
-            <a:ext cx="2798421" cy="1843806"/>
+            <a:off x="3105176" y="2866987"/>
+            <a:ext cx="3005780" cy="1843806"/>
           </a:xfrm>
           <a:prstGeom prst="bentConnector2">
             <a:avLst/>
@@ -5086,8 +5086,8 @@
         </p:nvCxnSpPr>
         <p:spPr>
           <a:xfrm rot="16200000" flipH="1">
-            <a:off x="2226110" y="3058040"/>
-            <a:ext cx="554704" cy="174673"/>
+            <a:off x="2122431" y="3161719"/>
+            <a:ext cx="762063" cy="174673"/>
           </a:xfrm>
           <a:prstGeom prst="bentConnector2">
             <a:avLst/>
@@ -5168,7 +5168,7 @@
         </p:nvCxnSpPr>
         <p:spPr>
           <a:xfrm rot="16200000" flipH="1">
-            <a:off x="3430123" y="3938021"/>
+            <a:off x="3430123" y="4145380"/>
             <a:ext cx="118421" cy="699979"/>
           </a:xfrm>
           <a:prstGeom prst="bentConnector2">
@@ -5209,8 +5209,8 @@
         </p:nvCxnSpPr>
         <p:spPr>
           <a:xfrm rot="5400000">
-            <a:off x="3695875" y="2276286"/>
-            <a:ext cx="1824381" cy="1843808"/>
+            <a:off x="3592195" y="2379966"/>
+            <a:ext cx="2031740" cy="1843808"/>
           </a:xfrm>
           <a:prstGeom prst="bentConnector2">
             <a:avLst/>
@@ -5435,7 +5435,7 @@
         </p:nvSpPr>
         <p:spPr>
           <a:xfrm flipV="1">
-            <a:off x="4114799" y="4472708"/>
+            <a:off x="4114799" y="4680067"/>
             <a:ext cx="2642195" cy="101600"/>
           </a:xfrm>
           <a:custGeom>
@@ -5509,6 +5509,92 @@
           </a:p>
         </p:txBody>
       </p:sp>
+      <p:cxnSp>
+        <p:nvCxnSpPr>
+          <p:cNvPr id="55" name="Elbow Connector 122"/>
+          <p:cNvCxnSpPr/>
+          <p:nvPr/>
+        </p:nvCxnSpPr>
+        <p:spPr>
+          <a:xfrm rot="5400000">
+            <a:off x="2743654" y="3359721"/>
+            <a:ext cx="303026" cy="866"/>
+          </a:xfrm>
+          <a:prstGeom prst="bentConnector3">
+            <a:avLst>
+              <a:gd name="adj1" fmla="val 50000"/>
+            </a:avLst>
+          </a:prstGeom>
+          <a:ln w="19050">
+            <a:solidFill>
+              <a:schemeClr val="bg1">
+                <a:lumMod val="75000"/>
+              </a:schemeClr>
+            </a:solidFill>
+            <a:prstDash val="sysDot"/>
+            <a:headEnd type="none" w="med" len="med"/>
+            <a:tailEnd type="arrow" w="med" len="med"/>
+          </a:ln>
+          <a:effectLst/>
+        </p:spPr>
+        <p:style>
+          <a:lnRef idx="1">
+            <a:schemeClr val="accent2"/>
+          </a:lnRef>
+          <a:fillRef idx="2">
+            <a:schemeClr val="accent2"/>
+          </a:fillRef>
+          <a:effectRef idx="1">
+            <a:schemeClr val="accent2"/>
+          </a:effectRef>
+          <a:fontRef idx="minor">
+            <a:schemeClr val="dk1"/>
+          </a:fontRef>
+        </p:style>
+      </p:cxnSp>
+      <p:cxnSp>
+        <p:nvCxnSpPr>
+          <p:cNvPr id="64" name="Elbow Connector 122"/>
+          <p:cNvCxnSpPr/>
+          <p:nvPr/>
+        </p:nvCxnSpPr>
+        <p:spPr>
+          <a:xfrm rot="5400000" flipH="1" flipV="1">
+            <a:off x="3277054" y="3359721"/>
+            <a:ext cx="303026" cy="866"/>
+          </a:xfrm>
+          <a:prstGeom prst="bentConnector3">
+            <a:avLst>
+              <a:gd name="adj1" fmla="val 50000"/>
+            </a:avLst>
+          </a:prstGeom>
+          <a:ln w="19050">
+            <a:solidFill>
+              <a:schemeClr val="bg1">
+                <a:lumMod val="75000"/>
+              </a:schemeClr>
+            </a:solidFill>
+            <a:prstDash val="sysDot"/>
+            <a:headEnd type="none" w="med" len="med"/>
+            <a:tailEnd type="arrow" w="med" len="med"/>
+          </a:ln>
+          <a:effectLst/>
+        </p:spPr>
+        <p:style>
+          <a:lnRef idx="1">
+            <a:schemeClr val="accent2"/>
+          </a:lnRef>
+          <a:fillRef idx="2">
+            <a:schemeClr val="accent2"/>
+          </a:fillRef>
+          <a:effectRef idx="1">
+            <a:schemeClr val="accent2"/>
+          </a:effectRef>
+          <a:fontRef idx="minor">
+            <a:schemeClr val="dk1"/>
+          </a:fontRef>
+        </p:style>
+      </p:cxnSp>
     </p:spTree>
     <p:extLst>
       <p:ext uri="{BB962C8B-B14F-4D97-AF65-F5344CB8AC3E}">

</xml_diff>

<commit_message>
Update UG + DG (#163)
* Branding

* Colon fixes

* Massive UG/DG update

* Update UI class diagram

* Update UI Class Diagram pptx

* Some more updates

* Capitalize words in DG
</commit_message>
<xml_diff>
--- a/docs/diagrams/UiComponentClassDiagram.pptx
+++ b/docs/diagrams/UiComponentClassDiagram.pptx
@@ -208,7 +208,7 @@
           <a:p>
             <a:fld id="{F5CC4B3F-88C1-4FFA-B1B6-F41C21DC6924}" type="datetimeFigureOut">
               <a:rPr lang="en-US" smtClean="0"/>
-              <a:t>1/7/2017</a:t>
+              <a:t>11/11/2017</a:t>
             </a:fld>
             <a:endParaRPr lang="en-US"/>
           </a:p>
@@ -654,7 +654,7 @@
           <a:p>
             <a:fld id="{78C97017-6FC3-485B-9764-EAC9E56C1D49}" type="datetimeFigureOut">
               <a:rPr lang="en-US" smtClean="0"/>
-              <a:t>1/7/2017</a:t>
+              <a:t>11/11/2017</a:t>
             </a:fld>
             <a:endParaRPr lang="en-US"/>
           </a:p>
@@ -822,7 +822,7 @@
           <a:p>
             <a:fld id="{78C97017-6FC3-485B-9764-EAC9E56C1D49}" type="datetimeFigureOut">
               <a:rPr lang="en-US" smtClean="0"/>
-              <a:t>1/7/2017</a:t>
+              <a:t>11/11/2017</a:t>
             </a:fld>
             <a:endParaRPr lang="en-US"/>
           </a:p>
@@ -1000,7 +1000,7 @@
           <a:p>
             <a:fld id="{78C97017-6FC3-485B-9764-EAC9E56C1D49}" type="datetimeFigureOut">
               <a:rPr lang="en-US" smtClean="0"/>
-              <a:t>1/7/2017</a:t>
+              <a:t>11/11/2017</a:t>
             </a:fld>
             <a:endParaRPr lang="en-US"/>
           </a:p>
@@ -1168,7 +1168,7 @@
           <a:p>
             <a:fld id="{78C97017-6FC3-485B-9764-EAC9E56C1D49}" type="datetimeFigureOut">
               <a:rPr lang="en-US" smtClean="0"/>
-              <a:t>1/7/2017</a:t>
+              <a:t>11/11/2017</a:t>
             </a:fld>
             <a:endParaRPr lang="en-US"/>
           </a:p>
@@ -1413,7 +1413,7 @@
           <a:p>
             <a:fld id="{78C97017-6FC3-485B-9764-EAC9E56C1D49}" type="datetimeFigureOut">
               <a:rPr lang="en-US" smtClean="0"/>
-              <a:t>1/7/2017</a:t>
+              <a:t>11/11/2017</a:t>
             </a:fld>
             <a:endParaRPr lang="en-US"/>
           </a:p>
@@ -1698,7 +1698,7 @@
           <a:p>
             <a:fld id="{78C97017-6FC3-485B-9764-EAC9E56C1D49}" type="datetimeFigureOut">
               <a:rPr lang="en-US" smtClean="0"/>
-              <a:t>1/7/2017</a:t>
+              <a:t>11/11/2017</a:t>
             </a:fld>
             <a:endParaRPr lang="en-US"/>
           </a:p>
@@ -2117,7 +2117,7 @@
           <a:p>
             <a:fld id="{78C97017-6FC3-485B-9764-EAC9E56C1D49}" type="datetimeFigureOut">
               <a:rPr lang="en-US" smtClean="0"/>
-              <a:t>1/7/2017</a:t>
+              <a:t>11/11/2017</a:t>
             </a:fld>
             <a:endParaRPr lang="en-US"/>
           </a:p>
@@ -2234,7 +2234,7 @@
           <a:p>
             <a:fld id="{78C97017-6FC3-485B-9764-EAC9E56C1D49}" type="datetimeFigureOut">
               <a:rPr lang="en-US" smtClean="0"/>
-              <a:t>1/7/2017</a:t>
+              <a:t>11/11/2017</a:t>
             </a:fld>
             <a:endParaRPr lang="en-US"/>
           </a:p>
@@ -2329,7 +2329,7 @@
           <a:p>
             <a:fld id="{78C97017-6FC3-485B-9764-EAC9E56C1D49}" type="datetimeFigureOut">
               <a:rPr lang="en-US" smtClean="0"/>
-              <a:t>1/7/2017</a:t>
+              <a:t>11/11/2017</a:t>
             </a:fld>
             <a:endParaRPr lang="en-US"/>
           </a:p>
@@ -2604,7 +2604,7 @@
           <a:p>
             <a:fld id="{78C97017-6FC3-485B-9764-EAC9E56C1D49}" type="datetimeFigureOut">
               <a:rPr lang="en-US" smtClean="0"/>
-              <a:t>1/7/2017</a:t>
+              <a:t>11/11/2017</a:t>
             </a:fld>
             <a:endParaRPr lang="en-US"/>
           </a:p>
@@ -2856,7 +2856,7 @@
           <a:p>
             <a:fld id="{78C97017-6FC3-485B-9764-EAC9E56C1D49}" type="datetimeFigureOut">
               <a:rPr lang="en-US" smtClean="0"/>
-              <a:t>1/7/2017</a:t>
+              <a:t>11/11/2017</a:t>
             </a:fld>
             <a:endParaRPr lang="en-US"/>
           </a:p>
@@ -3067,7 +3067,7 @@
           <a:p>
             <a:fld id="{78C97017-6FC3-485B-9764-EAC9E56C1D49}" type="datetimeFigureOut">
               <a:rPr lang="en-US" smtClean="0"/>
-              <a:t>1/7/2017</a:t>
+              <a:t>11/11/2017</a:t>
             </a:fld>
             <a:endParaRPr lang="en-US"/>
           </a:p>
@@ -3978,14 +3978,14 @@
           <a:p>
             <a:pPr algn="ctr"/>
             <a:r>
-              <a:rPr lang="en-US" sz="1050" b="1" dirty="0" err="1">
+              <a:rPr lang="en-US" sz="1050" b="1" dirty="0" err="1" smtClean="0">
                 <a:solidFill>
                   <a:schemeClr val="accent3">
                     <a:lumMod val="75000"/>
                   </a:schemeClr>
                 </a:solidFill>
               </a:rPr>
-              <a:t>StatusBarFooter</a:t>
+              <a:t>PeopleCount</a:t>
             </a:r>
             <a:endParaRPr lang="en-SG" sz="1050" b="1" dirty="0">
               <a:solidFill>

</xml_diff>

<commit_message>
Update developer guide with latest diagrams
</commit_message>
<xml_diff>
--- a/docs/diagrams/UiComponentClassDiagram.pptx
+++ b/docs/diagrams/UiComponentClassDiagram.pptx
@@ -126,6 +126,10 @@
 </p:presentation>
 </file>
 
+<file path=ppt/revisionInfo.xml><?xml version="1.0" encoding="utf-8"?>
+<p1510:revInfo xmlns:a="http://schemas.openxmlformats.org/drawingml/2006/main" xmlns:r="http://schemas.openxmlformats.org/officeDocument/2006/relationships" xmlns:p1510="http://schemas.microsoft.com/office/powerpoint/2015/10/main"/>
+</file>
+
 <file path=ppt/notesMasters/notesMaster1.xml><?xml version="1.0" encoding="utf-8"?>
 <p:notesMaster xmlns:a="http://schemas.openxmlformats.org/drawingml/2006/main" xmlns:r="http://schemas.openxmlformats.org/officeDocument/2006/relationships" xmlns:p="http://schemas.openxmlformats.org/presentationml/2006/main">
   <p:cSld>
@@ -208,7 +212,7 @@
           <a:p>
             <a:fld id="{F5CC4B3F-88C1-4FFA-B1B6-F41C21DC6924}" type="datetimeFigureOut">
               <a:rPr lang="en-US" smtClean="0"/>
-              <a:t>1/7/2017</a:t>
+              <a:t>11/13/2017</a:t>
             </a:fld>
             <a:endParaRPr lang="en-US"/>
           </a:p>
@@ -654,7 +658,7 @@
           <a:p>
             <a:fld id="{78C97017-6FC3-485B-9764-EAC9E56C1D49}" type="datetimeFigureOut">
               <a:rPr lang="en-US" smtClean="0"/>
-              <a:t>1/7/2017</a:t>
+              <a:t>11/13/2017</a:t>
             </a:fld>
             <a:endParaRPr lang="en-US"/>
           </a:p>
@@ -822,7 +826,7 @@
           <a:p>
             <a:fld id="{78C97017-6FC3-485B-9764-EAC9E56C1D49}" type="datetimeFigureOut">
               <a:rPr lang="en-US" smtClean="0"/>
-              <a:t>1/7/2017</a:t>
+              <a:t>11/13/2017</a:t>
             </a:fld>
             <a:endParaRPr lang="en-US"/>
           </a:p>
@@ -1000,7 +1004,7 @@
           <a:p>
             <a:fld id="{78C97017-6FC3-485B-9764-EAC9E56C1D49}" type="datetimeFigureOut">
               <a:rPr lang="en-US" smtClean="0"/>
-              <a:t>1/7/2017</a:t>
+              <a:t>11/13/2017</a:t>
             </a:fld>
             <a:endParaRPr lang="en-US"/>
           </a:p>
@@ -1168,7 +1172,7 @@
           <a:p>
             <a:fld id="{78C97017-6FC3-485B-9764-EAC9E56C1D49}" type="datetimeFigureOut">
               <a:rPr lang="en-US" smtClean="0"/>
-              <a:t>1/7/2017</a:t>
+              <a:t>11/13/2017</a:t>
             </a:fld>
             <a:endParaRPr lang="en-US"/>
           </a:p>
@@ -1413,7 +1417,7 @@
           <a:p>
             <a:fld id="{78C97017-6FC3-485B-9764-EAC9E56C1D49}" type="datetimeFigureOut">
               <a:rPr lang="en-US" smtClean="0"/>
-              <a:t>1/7/2017</a:t>
+              <a:t>11/13/2017</a:t>
             </a:fld>
             <a:endParaRPr lang="en-US"/>
           </a:p>
@@ -1698,7 +1702,7 @@
           <a:p>
             <a:fld id="{78C97017-6FC3-485B-9764-EAC9E56C1D49}" type="datetimeFigureOut">
               <a:rPr lang="en-US" smtClean="0"/>
-              <a:t>1/7/2017</a:t>
+              <a:t>11/13/2017</a:t>
             </a:fld>
             <a:endParaRPr lang="en-US"/>
           </a:p>
@@ -2117,7 +2121,7 @@
           <a:p>
             <a:fld id="{78C97017-6FC3-485B-9764-EAC9E56C1D49}" type="datetimeFigureOut">
               <a:rPr lang="en-US" smtClean="0"/>
-              <a:t>1/7/2017</a:t>
+              <a:t>11/13/2017</a:t>
             </a:fld>
             <a:endParaRPr lang="en-US"/>
           </a:p>
@@ -2234,7 +2238,7 @@
           <a:p>
             <a:fld id="{78C97017-6FC3-485B-9764-EAC9E56C1D49}" type="datetimeFigureOut">
               <a:rPr lang="en-US" smtClean="0"/>
-              <a:t>1/7/2017</a:t>
+              <a:t>11/13/2017</a:t>
             </a:fld>
             <a:endParaRPr lang="en-US"/>
           </a:p>
@@ -2329,7 +2333,7 @@
           <a:p>
             <a:fld id="{78C97017-6FC3-485B-9764-EAC9E56C1D49}" type="datetimeFigureOut">
               <a:rPr lang="en-US" smtClean="0"/>
-              <a:t>1/7/2017</a:t>
+              <a:t>11/13/2017</a:t>
             </a:fld>
             <a:endParaRPr lang="en-US"/>
           </a:p>
@@ -2604,7 +2608,7 @@
           <a:p>
             <a:fld id="{78C97017-6FC3-485B-9764-EAC9E56C1D49}" type="datetimeFigureOut">
               <a:rPr lang="en-US" smtClean="0"/>
-              <a:t>1/7/2017</a:t>
+              <a:t>11/13/2017</a:t>
             </a:fld>
             <a:endParaRPr lang="en-US"/>
           </a:p>
@@ -2856,7 +2860,7 @@
           <a:p>
             <a:fld id="{78C97017-6FC3-485B-9764-EAC9E56C1D49}" type="datetimeFigureOut">
               <a:rPr lang="en-US" smtClean="0"/>
-              <a:t>1/7/2017</a:t>
+              <a:t>11/13/2017</a:t>
             </a:fld>
             <a:endParaRPr lang="en-US"/>
           </a:p>
@@ -3067,7 +3071,7 @@
           <a:p>
             <a:fld id="{78C97017-6FC3-485B-9764-EAC9E56C1D49}" type="datetimeFigureOut">
               <a:rPr lang="en-US" smtClean="0"/>
-              <a:t>1/7/2017</a:t>
+              <a:t>11/13/2017</a:t>
             </a:fld>
             <a:endParaRPr lang="en-US"/>
           </a:p>
@@ -3925,7 +3929,7 @@
                   </a:schemeClr>
                 </a:solidFill>
               </a:rPr>
-              <a:t>BrowserPanel</a:t>
+              <a:t>MapsPanel</a:t>
             </a:r>
             <a:endParaRPr lang="en-SG" sz="1050" b="1" dirty="0">
               <a:solidFill>

</xml_diff>